<commit_message>
Cap 06 resultados fases
</commit_message>
<xml_diff>
--- a/tesis.pptx
+++ b/tesis.pptx
@@ -8,23 +8,20 @@
     <p:sldId id="256" r:id="rId2"/>
     <p:sldId id="267" r:id="rId3"/>
     <p:sldId id="283" r:id="rId4"/>
-    <p:sldId id="290" r:id="rId5"/>
-    <p:sldId id="258" r:id="rId6"/>
-    <p:sldId id="260" r:id="rId7"/>
-    <p:sldId id="261" r:id="rId8"/>
-    <p:sldId id="262" r:id="rId9"/>
-    <p:sldId id="263" r:id="rId10"/>
-    <p:sldId id="264" r:id="rId11"/>
-    <p:sldId id="265" r:id="rId12"/>
-    <p:sldId id="268" r:id="rId13"/>
-    <p:sldId id="266" r:id="rId14"/>
-    <p:sldId id="271" r:id="rId15"/>
-    <p:sldId id="284" r:id="rId16"/>
-    <p:sldId id="285" r:id="rId17"/>
-    <p:sldId id="286" r:id="rId18"/>
-    <p:sldId id="287" r:id="rId19"/>
-    <p:sldId id="289" r:id="rId20"/>
-    <p:sldId id="288" r:id="rId21"/>
+    <p:sldId id="260" r:id="rId5"/>
+    <p:sldId id="261" r:id="rId6"/>
+    <p:sldId id="263" r:id="rId7"/>
+    <p:sldId id="264" r:id="rId8"/>
+    <p:sldId id="265" r:id="rId9"/>
+    <p:sldId id="268" r:id="rId10"/>
+    <p:sldId id="266" r:id="rId11"/>
+    <p:sldId id="271" r:id="rId12"/>
+    <p:sldId id="284" r:id="rId13"/>
+    <p:sldId id="285" r:id="rId14"/>
+    <p:sldId id="286" r:id="rId15"/>
+    <p:sldId id="287" r:id="rId16"/>
+    <p:sldId id="289" r:id="rId17"/>
+    <p:sldId id="288" r:id="rId18"/>
   </p:sldIdLst>
   <p:sldSz cx="9144000" cy="6858000" type="screen4x3"/>
   <p:notesSz cx="6858000" cy="9144000"/>
@@ -621,7 +618,7 @@
           <a:p>
             <a:fld id="{79C9A5DB-47D5-4ED4-8579-1AD92982EBF2}" type="datetimeFigureOut">
               <a:rPr lang="es-PE" smtClean="0"/>
-              <a:t>05/07/2014</a:t>
+              <a:t>08/12/2014</a:t>
             </a:fld>
             <a:endParaRPr lang="es-PE"/>
           </a:p>
@@ -847,7 +844,7 @@
           <a:p>
             <a:fld id="{79C9A5DB-47D5-4ED4-8579-1AD92982EBF2}" type="datetimeFigureOut">
               <a:rPr lang="es-PE" smtClean="0"/>
-              <a:t>05/07/2014</a:t>
+              <a:t>08/12/2014</a:t>
             </a:fld>
             <a:endParaRPr lang="es-PE"/>
           </a:p>
@@ -1022,7 +1019,7 @@
           <a:p>
             <a:fld id="{79C9A5DB-47D5-4ED4-8579-1AD92982EBF2}" type="datetimeFigureOut">
               <a:rPr lang="es-PE" smtClean="0"/>
-              <a:t>05/07/2014</a:t>
+              <a:t>08/12/2014</a:t>
             </a:fld>
             <a:endParaRPr lang="es-PE"/>
           </a:p>
@@ -1187,7 +1184,7 @@
           <a:p>
             <a:fld id="{79C9A5DB-47D5-4ED4-8579-1AD92982EBF2}" type="datetimeFigureOut">
               <a:rPr lang="es-PE" smtClean="0"/>
-              <a:t>05/07/2014</a:t>
+              <a:t>08/12/2014</a:t>
             </a:fld>
             <a:endParaRPr lang="es-PE"/>
           </a:p>
@@ -1428,7 +1425,7 @@
           <a:p>
             <a:fld id="{79C9A5DB-47D5-4ED4-8579-1AD92982EBF2}" type="datetimeFigureOut">
               <a:rPr lang="es-PE" smtClean="0"/>
-              <a:t>05/07/2014</a:t>
+              <a:t>08/12/2014</a:t>
             </a:fld>
             <a:endParaRPr lang="es-PE"/>
           </a:p>
@@ -1541,7 +1538,7 @@
           <a:p>
             <a:fld id="{79C9A5DB-47D5-4ED4-8579-1AD92982EBF2}" type="datetimeFigureOut">
               <a:rPr lang="es-PE" smtClean="0"/>
-              <a:t>05/07/2014</a:t>
+              <a:t>08/12/2014</a:t>
             </a:fld>
             <a:endParaRPr lang="es-PE"/>
           </a:p>
@@ -1918,7 +1915,7 @@
           <a:p>
             <a:fld id="{79C9A5DB-47D5-4ED4-8579-1AD92982EBF2}" type="datetimeFigureOut">
               <a:rPr lang="es-PE" smtClean="0"/>
-              <a:t>05/07/2014</a:t>
+              <a:t>08/12/2014</a:t>
             </a:fld>
             <a:endParaRPr lang="es-PE"/>
           </a:p>
@@ -7563,7 +7560,7 @@
           <a:p>
             <a:fld id="{79C9A5DB-47D5-4ED4-8579-1AD92982EBF2}" type="datetimeFigureOut">
               <a:rPr lang="es-PE" smtClean="0"/>
-              <a:t>05/07/2014</a:t>
+              <a:t>08/12/2014</a:t>
             </a:fld>
             <a:endParaRPr lang="es-PE"/>
           </a:p>
@@ -7653,7 +7650,7 @@
           <a:p>
             <a:fld id="{79C9A5DB-47D5-4ED4-8579-1AD92982EBF2}" type="datetimeFigureOut">
               <a:rPr lang="es-PE" smtClean="0"/>
-              <a:t>05/07/2014</a:t>
+              <a:t>08/12/2014</a:t>
             </a:fld>
             <a:endParaRPr lang="es-PE"/>
           </a:p>
@@ -7925,7 +7922,7 @@
           <a:p>
             <a:fld id="{79C9A5DB-47D5-4ED4-8579-1AD92982EBF2}" type="datetimeFigureOut">
               <a:rPr lang="es-PE" smtClean="0"/>
-              <a:t>05/07/2014</a:t>
+              <a:t>08/12/2014</a:t>
             </a:fld>
             <a:endParaRPr lang="es-PE"/>
           </a:p>
@@ -8233,7 +8230,7 @@
           <a:p>
             <a:fld id="{79C9A5DB-47D5-4ED4-8579-1AD92982EBF2}" type="datetimeFigureOut">
               <a:rPr lang="es-PE" smtClean="0"/>
-              <a:t>05/07/2014</a:t>
+              <a:t>08/12/2014</a:t>
             </a:fld>
             <a:endParaRPr lang="es-PE"/>
           </a:p>
@@ -8470,7 +8467,7 @@
           <a:p>
             <a:fld id="{79C9A5DB-47D5-4ED4-8579-1AD92982EBF2}" type="datetimeFigureOut">
               <a:rPr lang="es-PE" smtClean="0"/>
-              <a:t>05/07/2014</a:t>
+              <a:t>08/12/2014</a:t>
             </a:fld>
             <a:endParaRPr lang="es-PE"/>
           </a:p>
@@ -9074,549 +9071,6 @@
       </p:grpSpPr>
       <p:pic>
         <p:nvPicPr>
-          <p:cNvPr id="9222" name="Picture 6" descr="http://fivan.org/wp-content/uploads/2011/06/Diana.jpg"/>
-          <p:cNvPicPr>
-            <a:picLocks noChangeAspect="1" noChangeArrowheads="1"/>
-          </p:cNvPicPr>
-          <p:nvPr/>
-        </p:nvPicPr>
-        <p:blipFill>
-          <a:blip r:embed="rId2" cstate="print">
-            <a:lum bright="70000" contrast="-70000"/>
-            <a:extLst>
-              <a:ext uri="{28A0092B-C50C-407E-A947-70E740481C1C}">
-                <a14:useLocalDpi xmlns:a14="http://schemas.microsoft.com/office/drawing/2010/main" val="0"/>
-              </a:ext>
-            </a:extLst>
-          </a:blip>
-          <a:srcRect/>
-          <a:stretch>
-            <a:fillRect/>
-          </a:stretch>
-        </p:blipFill>
-        <p:spPr bwMode="auto">
-          <a:xfrm>
-            <a:off x="3347864" y="1478304"/>
-            <a:ext cx="5103958" cy="4746682"/>
-          </a:xfrm>
-          <a:prstGeom prst="rect">
-            <a:avLst/>
-          </a:prstGeom>
-          <a:noFill/>
-          <a:extLst>
-            <a:ext uri="{909E8E84-426E-40DD-AFC4-6F175D3DCCD1}">
-              <a14:hiddenFill xmlns:a14="http://schemas.microsoft.com/office/drawing/2010/main">
-                <a:solidFill>
-                  <a:srgbClr val="FFFFFF"/>
-                </a:solidFill>
-              </a14:hiddenFill>
-            </a:ext>
-          </a:extLst>
-        </p:spPr>
-      </p:pic>
-      <p:sp>
-        <p:nvSpPr>
-          <p:cNvPr id="2" name="1 Título"/>
-          <p:cNvSpPr>
-            <a:spLocks noGrp="1"/>
-          </p:cNvSpPr>
-          <p:nvPr>
-            <p:ph type="title"/>
-          </p:nvPr>
-        </p:nvSpPr>
-        <p:spPr/>
-        <p:txBody>
-          <a:bodyPr/>
-          <a:lstStyle/>
-          <a:p>
-            <a:r>
-              <a:rPr lang="es-PE" dirty="0" smtClean="0"/>
-              <a:t>OBJETIVOS ESPECÍFICOS</a:t>
-            </a:r>
-            <a:endParaRPr lang="es-PE" dirty="0"/>
-          </a:p>
-        </p:txBody>
-      </p:sp>
-      <p:sp>
-        <p:nvSpPr>
-          <p:cNvPr id="3" name="2 Marcador de contenido"/>
-          <p:cNvSpPr>
-            <a:spLocks noGrp="1"/>
-          </p:cNvSpPr>
-          <p:nvPr>
-            <p:ph idx="1"/>
-          </p:nvPr>
-        </p:nvSpPr>
-        <p:spPr/>
-        <p:txBody>
-          <a:bodyPr>
-            <a:normAutofit/>
-          </a:bodyPr>
-          <a:lstStyle/>
-          <a:p>
-            <a:r>
-              <a:rPr lang="es-PE" dirty="0"/>
-              <a:t>Investigar sobre diferentes </a:t>
-            </a:r>
-            <a:r>
-              <a:rPr lang="es-PE" dirty="0" smtClean="0"/>
-              <a:t>técnicas </a:t>
-            </a:r>
-            <a:r>
-              <a:rPr lang="es-PE" dirty="0"/>
-              <a:t>y herramientas </a:t>
-            </a:r>
-            <a:r>
-              <a:rPr lang="es-PE" dirty="0" smtClean="0"/>
-              <a:t>informáticas </a:t>
-            </a:r>
-            <a:r>
-              <a:rPr lang="es-PE" dirty="0"/>
-              <a:t>para </a:t>
-            </a:r>
-            <a:r>
-              <a:rPr lang="es-PE" dirty="0" smtClean="0"/>
-              <a:t>el aprendizaje colaborativo.</a:t>
-            </a:r>
-          </a:p>
-          <a:p>
-            <a:r>
-              <a:rPr lang="es-PE" dirty="0" smtClean="0"/>
-              <a:t>Investigar sobre </a:t>
-            </a:r>
-            <a:r>
-              <a:rPr lang="es-PE" dirty="0" err="1" smtClean="0"/>
-              <a:t>frameworks</a:t>
-            </a:r>
-            <a:r>
-              <a:rPr lang="es-PE" dirty="0" smtClean="0"/>
-              <a:t> que sirven para realizar aplicativos web de tiempo real.</a:t>
-            </a:r>
-          </a:p>
-          <a:p>
-            <a:r>
-              <a:rPr lang="es-PE" dirty="0" smtClean="0"/>
-              <a:t>Definir 3 métricas de calidad para el desarrollo del sistema.</a:t>
-            </a:r>
-          </a:p>
-          <a:p>
-            <a:r>
-              <a:rPr lang="es-PE" dirty="0" smtClean="0"/>
-              <a:t>Aplicar el sistema web a la enseñanza de algoritmos y programación en la FISI – UNMSM.</a:t>
-            </a:r>
-            <a:endParaRPr lang="es-PE" dirty="0"/>
-          </a:p>
-        </p:txBody>
-      </p:sp>
-      <p:sp>
-        <p:nvSpPr>
-          <p:cNvPr id="4" name="AutoShape 2" descr="data:image/jpeg;base64,/9j/4AAQSkZJRgABAQAAAQABAAD/2wCEAAkGBxQQEhMUExMWEhUXFxcXGBQYFRQYGBgaFxUWFhcYFBgYHCggGBolGxYXITEhJSkrLi4vGR8zODMsNygtLisBCgoKDg0OGxAQGywkICQsLCwvLC8sLCw0LC4uLSwsLi8sLC8sLCwsLCwsLCwsLCwsLCwsLCwvLCwsLCwsLCwsLP/AABEIANgA6QMBEQACEQEDEQH/xAAcAAEAAwEBAQEBAAAAAAAAAAAABQYHBAMBAgj/xABFEAACAQICBgYGBwcCBgMAAAABAgADEQQFBhIhMUFREyJhcYGRBzJScqGxI0JigpLB8BQzQ6KywtFT4RUWVGOT8SRzw//EABsBAQACAwEBAAAAAAAAAAAAAAAEBQEDBgIH/8QAOBEAAgIAAgYJBAEDBAMBAAAAAAECAwQRBRIhMUFRE2FxgZGhscHRIjLh8EIUFfEGIzNSNFOSQ//aAAwDAQACEQMRAD8A3GAIAgCAIAgCAIAgCAIAgCAIAgCAIAgCAIAgCAIAgCAIAgCAIAgCAIAgCAIAgCAIB8LAb9kw5Jb2Msz6DMgQBAEAQBAEAQBAEAQBAEAQBAEAQBAEAQBAEAQBAEAQBAEAQCGr4nWN+HCc5fiuklrcCdCvVWR9wWO1XCk7G2dx4TZgcbq2KuT2P1/J5tqzjrLgTEvyGIAgCAeFfGU6fr1ET3mUfMzDaW89xrlLcmzm/wCO4b/qaH/lp/5mNePNHv8Aprv+j8Ge9HMKT+rVpt3Op+RmU09x4lXOO9NHQDMng+wBAEAQBAEAQBAEAQBAEAQBAEAQBAEAQDmzKrqUqjclPykXGzcMPZJb9V+hspWdiXWVvp+qD2D5TjOlyii01dpHYnEngds0u155o2KJeMHX6Smj+0oPmJ31FnS1xnzSZSzjqyceRD5/pfhcFcVKmtU/0k6z+I3L94iJ3QhvJWGwF9+2K2c3sX57ig5t6UMQ5IoU0or7TfSP38FXus0iyxUn9uwu6dC1R22Nt+C+fQqmOz7E1/3uIqv2a5C/gWy/CaJWTlvZZV4Wiv7YJd3u9pGag5CeCRmz7aDA1RyEGc2d2DzevRP0daovZrEr+Frr8J7Vko7mR7MLTZ98E+733lpyr0i4inYVQKg5jqt4g3U9w1Zuji5L7lmVl2hapba20+vavn1LzkmmVLE7FILcUPVcfdJ63epMl13QnuZSYjA3UfetnNbv3tyJ/D49H3Hwm0iHVAEAQBAEAQBAEAQBAEAQBAEA+M1t8xKSis2ZSzOd8fTG9reB/wASHLSOHh90vJ/BsVE3uRG55jErUKtOk6tUZbKusASfGab8Xh76ZRhNPNczbVVOE05J5EOcuq6i21WIABAYcBt32nMT0fe9scn2P5yJ6uhxIfG03Q9ZSvePlzkSdFlb+tNG2Moy3Mg9INLcSiLhqbdEgXa63121iTbW+oBu2bdm/hOmwGIk8NGK4ZomYTA0ybtks3ye5fPf4FOAueZJ8SSfiSZuLYtWTaAYzEWLIMOh+tVuGt2Ux1vxas3ww85dRW36Vw9WxPWfV87vDMuGXei3DpY1qtSseIFqa+Qu380kRwseLKu3Tdr+yKXm/jyJzDaD4CmLDDI3vl3/AKyZsVFa4EOWksVL+b7tnodH/KWB/wCjof8AiT/E9dFDkjx/X4n/ANkvFnNidBcBU34ZV9xnT+hhPLorfA2Q0nio/wA/HJ+pA5j6LKLXNCtUpHk4FRfyb4mapYSL3MmVabsX/JFPs2fK8inZzoTi8Lcmn0qD69K7W95baw8rdsi2YeceBa0aSw92xPJ8ns89xAIdxB7QR8CDI5Oa4MtmSaWstlxBLDhVHrr7/wDqD498l1Ytx2T2rmUuM0TGf1U7Hy4Ps5enYX7A50VCkkOjC6uDcEdhlipJrNHOzhKEnGSyaLBhcUtQXBmTye8AQBAEAQBAEAQBAEAQBAPLEUA4sb+BII7QRNV1MLo6svjwZ6hNxeaIfGZA7eriGX3lVvjsMqp6HUt0335P4JUcXlviivYvRmpRYO2JUjbs1CDYgg263bIGMwNeFrzlLeSqsT0jyUSAqYgoTZipHEEjd2ysqi8s0SmuZ7UtI6ybCRVXiri9/Hf85NjOeWTfia3VF7TkxeSpmFRKlJhQHq1Q121bXINMD1r3ItccN09V4urDPUs2J7c0syZRinTW01ny/Je9GsjwWCANKzVLbar7XPOxIso7FtLejSWA/jYu/Z6lRi78Ve/r3clu/PeWIYhD9ZfMSbHG4eW6yPiiD0cuTP10q8x5ibFfU90l4oxqvkfdccx5z0rIPivExkz9XnvMwIAgCAVjSXQmhjLso6Gt/qKNjH/uLubv2Htke3Dxnt3MscJpK2jY9seT9nw9DKc5yatg6nR1lsfqsNquOaHj3bxxlXZXKt5SOloxNd8daD+V2nRkWdNhjY9ekx61P+5OTfPjzHqm91Pq5GjG4KGJjylwfs+r0Lxhcd0erUptr022q3zB5MOIlvGSktaO45SyuVcnCayaLZleZrVG/bPZrJGAIAgCAIAgCAIAgCAIAgHwm0w3ks2CmZrjTVcnhwHZw/XbPnukMa8Tc5cOHZw+e8vcPSq4ZcSp4yntPeZvplsRtZw0MC9aotOmLuxsPzJ7ANp7pY0p2NRW9muclFZs0vDaJU6dNVR2VgBrNvDNbaxU/IGWWJ0JTct7T57/AC+MitWMnntWw4sXlmIpbdXpV5pv8V3+V5QYnQF9W2H1Lq+PjMkQxNct+w4aWZdtpUuuyDJGqmddPMDzmY3TieHWjqp5gZLhi5o1upHTSzISZVpFria3SeGY1Hca1Gu9KoO0MrdhVwQO8WlnRpXb9T2HlQ1d8U+35WTIGnp9XwrhMXRWop3VKfVJHuMSCfES3liJVvKSzXNEmrR9WKhrUyaa3p7cu9cO4ueS57Qxi61GoGtvXc6+8p2jv3SRXbCf2sr78LbQ8rFl6eJJTYRzizbK6WKpmnVXWU+angyngRPFlcZrVkbab50z14PaY1pJkFTA1dR+spuUqW2MPyYcR/mU11LqlkzrcJi4YmGst/Fcvwemjua9CxSptov632Twdfz7O6esNiOilk9z8us0aQwfTw1o/ct3X1fBaUqth6m/ZvB4EcCJcnKl1ynMBVUc5kwSEAQBAEAQBAEAQBAEAQDgzutq0jzYhPxG3yvK3S03HCyUd8so+L2+RIw0c7Fnw2lYqYacdPD5FtGwhcbgzrWAJJOwAbTflPdMJbIraz25LLNly0X0fGFUu1jVYbT7I9kfmf8AE7HAYPoI5y+5+XUU+JxHSPJbiXxuLSijVKjBEUXLE7B/v2Sc2ks2aYVyskoxWbZkWlun9XFE06BajR3XGypUH2iPUXsG3meEgW4hy2R2I6fBaKhT9Vn1S8l8/vaVPCY16XqNYezw8pBtors+5FjZTCz7l3k7gtIb7G6p+HnKu7R2W2O0rrcHOG2O1E1h85POQHh5R+0htIkaWcg7wp7xt8xMNy/lFM8anI/f/EALm9gNu/cJGylrfSZ1eZz6aZczYGg+oxcMhICkkBka+tYbBu8QJ3LqksLBPekvQ16LtjHEyzaSae95cUUPCYhqbh0Yo6nYymxH65SEpNPNbzo5xjOOUlmmapobpsMQRRxFlq7lfctTs+y/ZuPDlLLD4tT+me/1Obx+jXV/uVbY8uX4LrJpUEdn2UJjKLUqnHarcVYbmH62gkcZrtqVkdVm/DYiVFinH/KMUx+BfD1HpVBZkNjyPEEdhFiO+UM4OEnFnYVWxtgpx3MsWQ4rp6JpH95SF07U4r4f4llgbtaOo+G7s/BQaWwupPpY7nv7fz6knkuYmmw2yeVBoOErh1BEyYPaAIAgCAIAgCAIAgCAUv0j6QrhVo0wNZ2cPb2VQ7/FrDuDcpAx6U69Tjnn4Fpo3CSu1pLcll2t/vofjLM/w2LZEpOTUf8Ah6rXFhc6xA1QBzv8dkqlhXY8oo22UW1RcprJLiWrBZctM6xsW58u6WuEwEKPq3y5/BW23yns4HRicQtJGd2CooLMx3AAXJMnN5LNmqMXOSjFZtmH6aaVPmFTZdaCn6NN1/tuPaPLgNnMmtutdj6jr8BgY4aG3bJ737Lq9SuTSTyd0Z0TxGPN6Y1KV7Gs19XZvCje57tnMiba6ZT3biFi8fVhtktr5L35fuw03JvR5g6ABdP2l+JqbV8Kfq277ntk2GHhHftOfv0tiLPtequr53kjm+ieGxA9TomAsHpgKdm4EWsR3jyni7B1W71k+aIcMTZF78+0p+aaEYmipaiy4i31R1HPcGOqfOVs9ENvY0SljY8UR2UZVi3qDpMNVABvqMpVCQd7u1gw42GzvkjDaLrqlry2s024qU1kthI6eVaz9EadcirTBuikqCTa5DgjbYAbdndJl1c5NOLyyNmDvprTjbBPPjy/eoolTNa2IOrX2uhO0oofbb1mAu3jK/ESm9kuBfYGuqKcqtz680fVkRk81fQLSc4lehqm9VBsY/xFHH3hx57+ctsJiekWpLevM5jSWC6GXSQ+1+T+C4SaVRSPSXknSUxiUHWp7H7UJ2H7pPkTylfjqc4664en4LjRGJ1Z9E9z3dv5+DPcvxRo1EqD6pvbmOI8ReVldjrkpLgXt9KurcHxLLmICuHX1XAdT37/ANds6FNNZo4yUXFuL3otOi2Y36pM9HktcAQBAEAQBAEAQBAPhNoB/PulObnGYqrWvdSdWn2U12J5+t3sZVWz15Nnb4PD9BTGvjx7Xv8AjuNC9EmSdHSbFMOtV6qdlNTtI95h5KslYWGS1nxKPTOJ1pqlbltfb+F6s0GSykMp9KuknSP+yUz1EINUj6z7Cqdy7Ce23syDibc3qI6TQ+D1Y9PLe93Zxffu7O0z2RC8LroDoX+2EV64Iw4PVXcapB27eCA7zx3c5Joo1/qluKnSWkeg/wBuv7vT8+hsFGkqKFUBVAACgAAAbgANwlglkcs25PN7z9wYBMA/KuDuIPjBnJkVpLmPQUjb1jsEGDPcJhnxD2AJJO0zBktWY6D0q2HCiy1lF1qdvstzU/DeO3TfQrY9ZMwWNlh584vevjrMtxGGak7I6lXUkMp4EfrfKSacXkzrITjOKlF5pntgcU1GolRDZkOsD+R7CLg9hnmM3BqUd6PNlcbIOEtzNvyjMFxNGnVXc4vbkdzKe0EEeE6CqxWQUlxONvqdVjhLgdNekHVlYXVgVI5gixHlPbSayZrjJxaa3owzM8CcPWqUjvRiL8xvU+KkHxnO2w1JuPI7Sm1W1xmuKJnBVOkwlvrUm/lP/v8AllrgLNarLkc7pWrUv1l/Lb38TqyLFarDsPzk0rTTMFW10BmTB7wBAEAQBAEA/FVwqljuAJ8heZSzeRiTyWbKdjcyZmLax7LHd3SzhUksimsvbeeZHZ7pcVweIpm/SFdRGHJyFYk8CFJIPG0hY+h11Ocd3oXGg7434qFdj6115bcv3gZngMI1apTpJ61R1QdmsQL9wvfwlAlm8kd/ZYq4OctyWZ/ReCwq0aaU0FlRQqjkFFh8pbpZLJHCTm5ycpb3tOHSbNhg8NVrHaVXqg8XbqoPxEeF55snqRbN2Eod90a+fpxP59qVCxLMdZmJZmO8km5J7SSTKredukksluJnQ/ITj8StPaKY69VhwQHcDwZjsHieE2VV68siLjsUsNU58dy7fwbzQorTVURQqqAqqBYAAWAA5WlmlkskcXKTk3J7Wz9VHCgliAACSSbAAbSSeAmQk28kZjpR6S2JNPBAADYa7C9//qU7Lfaa/dxkKzE8IeJ0GE0Msta//wCfl+y8SgY/MKuIJNaq9W/tszDwB2DuAkWUnLey7rqrr+yKXYjnoDVN16pHEbD5ieGbJPNZPadtPSbEs6o1RqyL9V2JI7nO0eNx2SRC+UI7XmUWJwVV0/oWT6vjcbPoU+HqUQ9E3O5wfWU8mH57jJtVsbFnEpMRhp0T1Z/5LHNpHKH6TcjDIMUg6y2Wp2qTZW7wTbuPZK7H05rpFw3l1ojE5S6GW57V2/n93mdrKlnQGg+jDMf3tAn/ALi/BXH9J85ZaOt31vt+Si0xT9tq7H7e5f5alEZn6TsFqYinVG6olj7yHf5MvlKfSMMpqXNeh0eh7daqUOT9f8ENoy/XdDudCPL/AGJnnR08rHHmvQaXr1qVLk/X9R8wNTVqWPaPH/2JcnOmlaMYjWS0yYJyAIAgCAIAgHBnz6uGrnlSc+Skzdh1nbFdaNGKeVE31P0M1q43qA33gfKXar2nNuzNFZzTFXvNjrjKLjJbGK7pVzU4PJp5p9aJf0V4HpccHIuKSM9/tGyL8GY+E49Yd1YiUH/H9XkfTMVj44jR0bY/zy2dm9dzWRtElnPGZemPMv3GHB51WHmieH7zykPFy3ROg0HT91r7F6v2M0kI6A2j0X5R0GDWoR16/wBIT9jdTHdq9bvcyxw0NWGfM5PS9/SXuK3R2d/H47i4SQVZk/pQ0oNSocJSa1ND9KR9d9+p7q7L8z7u2Dibc3qI6XRGCUY9PNbXu6lz7X6dpnlSoFFzIqWZcykorNnI+YjgJsVbI0sXHgfg5gSLWmOjNUsU2skSeVBbbN/GR7W8zbRq5bCz6NZu2DrLUW5Xc6+0vEd43jt8ZrqudU9Zd54xeHjfW4PfwfJm2UaodVZTdWAIPMEXB8p0EWpLNHHSi4tp70fjF4daqPTYXV1KkdhFjMSipJp8TMJuElJb1tMLr4c03dG3ozKe9SQflObnHVbi+B20JqcVJcVmS+iGK6LGUG4FtQ9z9T5kHwmzCz1bovu8SLjq9fDyXVn4bTY50RyJT/Sbh9bDI/FKo8mVl+erIGkY51J8mW2h55XOPNGf5O+rWpn7VvMFfzlZhZZXRfX67C4x0dbDzXVn4bT2xx1K7dj38zrfnOhOSL3opVs1oMFvmQIAgCAIAgHjjKHSU3Q/WVl/ECPznqMtWSfI8yjrRa5mK4DA4mrRXVoubXU7LbiRsJtfwnRu6tPazlXhrc8lEjswyHFi5OHqHuXW/pvHT1vcz2sNat6Lb6GSEq4qm4K1StNgGBB1VLhth2ixZfOVekK1rK1cdhd4C+fRdBLcm2u/JP08zVJXE4wz0j4rpMwr8k1KY7ggJ/mZpWYh52M7DRcNTCx6835/CK9hqHS1Epg2LuqDvdgv5zUlm8ifOWpFz5JvwP6JXE0qShQ6gKAoFxsAFgLCXUa5cEfPZ3wzblJZnPjc3UU36Ihqmq2oDcAtY6oJtsF7T06bMtiPMMTTrLWezj2GMYrRPFi7FRVJJLFXUsSTckg2uSeUrpYG9bcs+862vTuAlsUsu1P2zIHHYFh1XUr3iR2pQe1E+NlWJj9Ek+wi62B1Re89KeZoswyis8zz/ZmAvaNdbiPKqSWZ15YxDi01WpOJmmTUthZ6YlfIsGaz6PsWamECnaabMnhsYfBreEutHz1qcuWw5fSlepfmuKz9vYssnFcY/pvQ1MdX5Eq34kUn43lBjFldL94HWaOnrYaPevMicNU1GVvZYN5EH8pFUtVp8iVNaya5m7TqTiSv6epfA1uzUPlUSRMas6Jd3qT9GPLEx7/RmU4Q2dD9pf6hKSt5WR7V6nS3rOqS6n6HRpAbV37l/pE6U4xFz0afrjwgF7mTAgCAIAgFQzvSV0LKoqUyCRboHJ8DqkHvEsacLBrN5PvXyVd+Lszaimu5/BTMwzjMqp+iGLI+zSqL8Qok1QwsFt1fEg54yb3y/e4iM2zLFIQKtR6bEbU17EWJB1tU77g75IrjU1nFEW12qWTZHDPaw3V6ni5PzM9OuHJCMrObO/K9MMTTqK2uHI4kDdxBtw5zXLD1zWq0bFdbX9UXtRYW9ImJO40x3IPzJmr+3UdfiHpXFdXgV7EY1KlR6joru5LMTtuTv2bhMf2vC556i7836m/+/wCktVQVrSXLJeiTPajm4TYqqvcAPlN8cLXD7Ul2IhW47EWvOyUpdrb9ToTPmMy6onhWyOlMzqncL+I/zPDhA2KVjPlfOKtMXYFRz4fCYVcHuMudkVm0fvKKqY+o1FxfWQsDxBUqDbt6wPhK3SOGjqp8y60NjrIz+l7VtXx2MpmY4ApVem2+m7Ke3VNr+O/xnMS+htH0uOV1cZ8Gkz2ppwkds2NLce9GiBuE1ykzXqpbjtpiaJBmkejL91W5a4/pF/yltov7Jdvsc9pj/kj2e5c5aFOZR6Qj/wDNb3E+Uosf/wAz7EdRor/xl2srwEgSLA3dZ1hw5Bacm2Br9yfGogkXGPKiX7xJujv/ACYd/ozJ8MOuvvL8xKKv749q9Tp7v+OXY/Q/ekb/AE7dy/0idMcYi6aODrjuEAv4mTAgCAIAgCAcOeY79noVanFV2e8eqvxIm2ivpLFE0Ym3oqpT5Lz4GAZpWNVmc7bn4bhOmSyWRyqk3LaRjrPLNyZp3oWycWr4o2Jv0K9gsrufG6eR5yo0hbm1WuG8u8BS1HpHx3dn+VkaLi8poVf3lClU96mh+JEgRtnH7W13kyVUJfck+4wTSCj0WKxKABQtaqFA3BddtUD7tpH/ALriq5Na2e3iv8PzOgj/AKd0fiKYy1Mm4ram1ty27Nq39RMaJZVTqK1WqNYX1UU7tguzHnvAA7+yWNekrbq92XZ+7Cuf+m8Nh7t7kstz4eG/wPbSHKKZUtSGo4+qPVbstwMk0YucXlN5o143/T9d0HKhZSXDg+rqf6ylnEGWmsca6cnkz5+0RrGOjL56M6KUTWxuJboqa0yia2y6khqlQjl1VC8+twIJpMdiVY9VbkXujsHKCzy2vgVvEaYviK1Q6lLVdmKh6FIsFJOqC1r3AttvKGyyW3YvA7OjC1pqKlJZZbmeVISuZcs6qYmpnhnVTE1M8s1TQDCdHhAx31GZ/DYo+C38ZeaOhq0583mcxpSzXvy5LL39yySeVxjml+I6TG4gjcG1fwKEPxUznsXLWukzrcBDUw8F1Z+O05Mro9JWpJ7VRF82Aketa04rrXqbrpatcpck/Q26dScYVj0i1tXBMPbdF8m1/wC2QtIPKlrm0WWio54hPkn8e5mmAW9RPeHwN/ylPh1rWxXWvkvsXLVom+pnLm7a+Jcc2C/ALOkOQNC0cS9SAXqZMCAIAgCAIBUfSXUP7MiD69QA9yqzfMCWGjkukcnwRWaVb6JRXF/LMrq5cZcqxMoejaIyvhiu+acTiIUVOyXDz6ifgMHZi740w48eS4vu/BqPoar/AEOJp8qivbsdAv8A+c5Si2VjlKW9vM7nS2HhR0UILKKjqruf5NEkgqDC/SLhejzCvyfUqDuZAD/MrSsxCysZ2Oi56+Fj1Zrz+Mj10dxdqOry/NmMs8JH/ZXf6s2X1ZyzPzj8beS0jZVUW3QejhsxoPSxFGnUqUuqHKLr9G19Sz2vssw+6J5nOcH9LazOc03gYV3KzVWUvVb/AB3ma5xljYKvUpOBrU22EgWYb1cd4sezdwlXZjMTm4ylmT6tF6PtrVsIZdjezmuO4g8xzSrX6rOSoOxeHeQN/jPLnJraeI0V1v6EdGWYS3WMi2z4IsMPTl9TJqmJEkSmdNMTSzyyXyLLGxVZaS8drH2VHrN+uJEVVO6agv1EXE3xprc33dbNloUgiqqiyqAoHIAWAnTxiopJHISk5Nye9nhmmNFCjUqtuRS1uZG4d5Nh4zzZNQg5Pge6a3bYoLizEWcsSzbSSSTzJNz8ZzLbe1naJJLJFj0DwfSYtDwphnPlqj4sD4STgIa1yfLb7FfpOzUw7XPZ7mqzoDlyh+lHFbKFLmWc+A1V/qbylXpOeyMe/wDfEu9DV7Zz7F7+xT8oX6QHkCfy/ORcBHWuT5Jv29yZpSerh2ubS9/YicsPTYkHm5fyu3ztL05k1PROldrwYLfMgQBAEAQBAKzp9hGeglRVLdDUDsoFyUsVewG8gNreBkvB2KM2nxWRDxtTnBNcHmVWhg0ravRMtTW9XVIN+636Emuxx+7YV/Q624hfSDkhwhw9zfXVybbgyldnkw+MotJ3ytlHkdr/AKZw0KoTeX1bM31cvH93HV6I8bqYx6Z3VaRt2tTOsB+Ev5SJhZZTy5k/TVetQp8n6/qNglgcuZj6Y8t20MQBzpMfN08P3nmJCxcd0joNB3fdU+1ej9ijZHTqOzrTpu+wX1VJtt4kbuO+ScDZ9Oq+BdzshF/W0u06cXlmJG/D1h29E9vMC0sE1zNtd9D3Tj4olPRzjzQx6KdgqBqTA7NpGstxz1lA+9PNqziRdMU9LhHJfx2+z8i0+lfJ0xKJq7MQNitzX2H7L7QeHibwLKlLbxOWwmNlRnH+L/c1+7TIRk1Sg+rXRqbjbqsLbOY4Edo2SBbJrYdHhYQnHXTzRIUxIsmTjqpiaZHhktk2U1cU2rSTW5tuVfebh3b5iumdrygiPfiK6Y6038vsNY0cyJMHT1V6zt6722k8hyUcBL3DYaNMclv4s5bF4uWInm9iW5EvJBFM+9JOdXK4ZDus1Tv3on9x+7KrSF//AOa7y+0Thss7pdi937eJR1lSy6Zpno6y3o6DVSNtU7PcW4HmSx7rS60dVq1ub4+hzmlrte1QX8fVltliVRkWmuO6fGVCDdUtTH3L638xac/jbNe59Wz97zq9HVdHh1nx2+P4yIp6vRYeq/FhqDx2bPP4SZo2vKMp89ngV2mLM5xr5bfE8dD6Fy9TlZB47T/b5yzKY1zRjD6qXmTBOQBAEAQBAEAQDzp0VUkqoUneQAL99t8zm2MioelbLulwWuBc0XV/unqN4ANrfdkbExzhnyLXQ92piNV/yWXuvgybJswOGxFGsP4bhj2rucDvUsPGQIS1ZJnTX1dNVKvmv8eZtmf5hXUKaFKpVRlBD0ujJ28wxBtaxuL75cxye05PC1UtvpZJNcHn7e5n+fU8wxSlOgxTKbdVxZdhuNmtbfMTlHLLVzLum3B0bU4580QOXYmth6dRWvRC1CpF7Nr2swtv2as01tuL1VkkyTNK1qSWezPuPv8AzBWHq12/Ff5zDskuJqdEeMT7/wA01rqz6tQqQykqNYFTcFTwIMwsTKO/aYVUUmlsT2MnE01Zqgq1KC1DwGuQB4WMmqtPiR/7FW91j8PydeZacDErqVcHSdeAYlrdq7AQe0TEsPCSye021aI6J60LWuzYVpzRLXFLUHshqhH8xJ+MjvR9PX4liq7EsnLPw9kjrw9eiv8ADU99z8zPawNC/iu/b6mqVVj4k1hdIyihVOqo3KDYDuAm6NcYrJLIiTwCk82s2d1HSph9c+ZjURolo6L4HZhNKKza6oVqMVJXWAFj3rvAJGw+c02xkk9XeVmIwSokpSz1c9vMoNYsXYuSXLHWJ3619t+285iees9bedNDV1Vq7stnYSOj+VNiqy0xcA7Xb2VG89/AdpE9UUu6aiu/sNGKxCorc33dpstGkEVVUWVQAAOAAsAJ0kUorJHISk5Nt72R+keZjC4epU+sBZBzY7F+O3uBmrEW9FW5G/CUdNaoePYYwLntJ8yZze1nYPJLqObSavbo6I+qNZveO78/OdJRX0dahyOPxFvS2ynz9OBbNGsu1Ep0+O9u87T/AI8JtNBp+Ao6iATJg6IAgCAIAgCAIAgHji8OtVHpuLq6lWHMMLEeRmGs1kz1CbhJSjvW0/nbM8A2GrVKL+tTYqTztubuIsfGVMouLaZ3VVqtgrI7ms/3s3GseirPOnw3QMevQsB20z6lu7avgvOTsNPOOq+BzWmMN0d3SLdL14+O8utSoFBYmwAJJ5AbTJJUpNvJGAaSZocVWeodgJJA5X/OwA8JK1MoNHfYbDKilQXIg2EgTieJRPIVTTZWChipBsdxtzkZ5RkmQ763KDiuJZ8sx+HxNhqhX40z1W+6RbW8PhJcLdYoZzxeHf3PLx9S+UtAKNekro9SixG42dfI2P8ANNqkzZXpi6P3JPy/fAhcx0CxdK5TVrj7J1W/C2zyJmddk+rS9cvuzRXKyNSbVqI1NvZZSp8jM9IT44lSWaeaPajjLcFPeAZnpEHOLPV8QGFtRB2qCD8DaZ10ZjJJ72Smh2HL42kAdiK7vysUamoPezC3unlMTkmiv0tdHodTiz9Z/gqdTF1RTrJrF9XUK1L6wABAKoQTcGUV+Hjba9Saz5GvDYqVNEdeEskt6y3F+0RyMYSiL7aj2Z2+Si/AX87ydhcOqY5cXvKrG4t4iefBbkTslEMy3T/O/wBordEhvTpEjsZ9zHw9X8UpMdfrz1VuXqdLozC9FXry3y9Pzv8AAruHIUNUb1UF+88B+uyYwNOvZrPcvX92mdKYjo6tRb5enH4ODR/DHE1zVfcp1jyLfVUd2/wHOXZzRqujGBudYwYLdMgQBAEAQBAEAQBAEAzT0t5DfVxaDdZKtuV+o57idU968pDxVf8ANF/oXFb6Jdq917+PMoej2cPgsQlZNursZfbQ+sv5jtAMi1zcJZousTh431OuXHyfB/vA2DSrNVqZZUq0W1lqoqqeyq60zfkQGII5iW9TUmmjmcBQ442MJ74tvwWfsZTWyuS8zrI4gjK2AYGwBOwnYCTYC5OzgACfCRbUo5tmJTiciLKec9Z5hRyPy1BTttPOszDri+BZMp0wxmGAVK7Mo+pUAcebdYdwM9xvsjuZFt0dhrN8cn1bPx5E7R9J2L+tToN92oP757/rJ8kQ5aFo4OXivg5sz06xGJUo9PDleRpFrdo12Iv22niWMsfI2V6KpreacvH4SK1q8jaeY4ua37SVKiPDYfTr8CP1ym2OOj/JMj20Wpf7eXfmdmGzmpQBp0FvVfe29r7tYns8hNn9U7NlaZU2YRxl0mIkn+/uxE3oblz06ysT0lQnad4F94H5njNtNCr28SJicVK3ZwNhXdJJDKtpzpH+y0+ipn6Zxw+op2Fu/gPPhIWMxHRx1Y735Fno7B9NPXl9q83y+TLqa3IAlJGLk1FbzpJzUIuUtyOXNqhqMuHpbdvW7W7ewfrdOioqVUFFHI4m932Ob7upFz0eykIqU1223nmTvP67JtI5pGX4YU0AmTB1QBAEAQBAEAQBAEAQDyxWHWqjI6hkYFWU7iCLEGYaTWTPUJOElKLyaMF0ryB8BXNM3KG7U39pe37Q3HwPESrtrcJZHZ4PFRxNeut/Fcn8Ph+D5lWdNTo1sMzfRVLMt72p1VZXR/dJUBhy2jaCDspucHlwM34dSsjdH7l5p7Gu3l4dl1wODOIC6tKorEC4NNrbRfZUtqMvJgSDLSNqazKuWJjXvkv3q3lx0f0fTC3Y2aoRYtyHsr2fOYlLMqsXjJX7P4ogtJ/R1RxJNSgRh6h2kW+jY9qj1D2r5GRLMNGW1bGSsJpeyr6bPqXmvnv8TNc40ZxWEJ6WiwUfxF69Pv1h6v3rGQ51TjvRf0Y2i77JbeT2Pw+MyKQ3mlkpnqs8s8nqs8MwdGGoNUbVRWdvZVSx8htnlJvYtp4nKMVnJ5LrLXl2g9YqalciggF7bGc9wGxfE+ElV4Gcts9i8yqxGlqobK/qfl+/uZ44HKwzlaKbzv3k9rGWddUa1lFFBdfO6WtNmjaP5IuGW52ud5m00njpVpMmCSws9Zh1Kf8Ac/Jfnw4kRsRiVUuvkTsFgpYiXKK3v2XX6GS4nEtVdqlRizsbsx4n8h2cJRTk5NylvOphCMIqMVkkeWNxXQLYbar+qOKg7L25ngJbYLDai15b35HPaSxvSvo4fat/W/hfvAl9GckNIazC9Vt/HVHLv5yeVRpmQZZ0Y1iNsyYJuAIAgCAIAgCAIAgCAIAgETpLkNPH0TSqbDvRwNqNwI+RHETxZWprJknC4qeHs14965owrOcqq4Sq1Ksuqw3H6rDgyHiD/tvlXODg8mdjRfC+CnB7PTqZOaG6aVMAQj3q4cnal+sl95pX+KnYew3vtqvcNj3EPHaOhiVrR2S58+35NjyrNKWKpipRcVFPLeDyYHap7DLCMlJZo5a6mymWrYsmdk9GoQCLxujuFrG9TDUmb2tRQ34htmuVUJb0iRXi761lGbS7SObQPAH+BbuqVh8nmt4Wp8PNkhaUxS/n5L4OjD6HYJN2GQ+9rP8A1kzKw1S/ieJaRxMt833bPQl8Ph6dIaqKtMclAUeQm5RUVkkRJTlN5yefaQGk+KNQihT2lt9uEyeSQyPJ1wyfa4mAV/SfTtKN6eGIq1Nxfeid3tt3bPlIOIxqj9MNrLfB6LlZ9VuxcuL+DN69dqjM7sXZjdmJuTKiUnJ5s6GEIwioxWSR8q1uits16repT379xYfISxwmE/nZ3L3ZR6Q0hnnVU+1+y92SuQZEwbpKvXrNt56t/wC75bhLMpDRsiybVszTJgsQFoB9gCAIAgCAIAgCAIAgCAIAgETpHo/Rx1Lo6o2jajj1kPNT8xuM8WVxmsmScLirMPPWh3rgzFtJdGq+Ae1QayE9WqoOo3YfZb7J8L75XWVSg9p1mExtWJjnHfxXH8rr9DhyzMquGfpKNRqbcxuI5MDsYdhE8Rk4vNG+2mu6OrYs0aHkfpSBsuLpap/1ae0d7Ido8C3cJLhiv+yKLEaEe+mXc/n5yLxlef4bFfua6VD7IazDvQ2YeIkmNkZbmU92Fup++LXp47iSns0HwwCjZ7pBXDsqgoB2TAK/ic7qLterqjmSB84bS3nqMXLYlmR2F09TDVNZb128h+Ij5AzTK+K3bSXXgpyf1bF+8D5nGl+IxwszalM/w0uAffO9vHZ2SruxFk9j2LkdBhcDTSlKKzfN+3L1IimhOwC8jxi5PKKzZLssjXHWm8ke2HVnOrRAduNQ/u07j9Zv1tlrh8GofVPa/Q53G6Slb9FeyPm/hFjyHR7UNxepUPrVDv7bchJpVF9yfJAli2+ZME4BaAfYAgCAIAgCAIAgCAIAgCAIAgCAeWJw61VKOodWFirAEEciDvmGs9jPUZOLUovJozrSP0Zg3fCNqceickr91t69xv4SLZhU9sS7w2mpR+m5Z9a3963PyM+zPKa2GNq1Jk7SLqe5hs+MiThKH3IvKcTVd/xyT6uPhvOEgHtngkZ5Hfhc4xFL1MRWQchVqAfhvaelZJbmzRPD0z+6CfciQXS3G/8AVVPNT8xHTWf9jT/QYb/ojmxec4ir+8r1W++w+RE8u6x8WZWDw8d0F4EEuH6VmJv3nafMxKbSNUaVJvZkj8tlb8No58u88J6hPX2JGi6pV7ZNJdZO5Tlj6oAUt3bF/Gdn4dabVg3N5y2ESWlY1x1a1m+b3fL8iw4PRwvsqdYf6aXCfePrP42HZJ1dUa1lFFRdiLLpa03mXDKtG9gFgqjcALAdwns0lpweXrTGwTJg64AgCAIAgCAIAgCAIAgCAIAgCAIAgCAIB418KrizAGAVnMtA8LVueiVTzW6H+W15qlRCXAm16QxNe6b79vqV/FejRL9Vqg7LqR8ReanhIPiyXHTd63qL8fk4W9HpH8RvITz/AEcebNn98s/6LxYXQI8WY+AhYOHNniWmrnujHz+Tqw+gyjgT3zZHDVrgRZ6SxMv5Zdmz8kthNDwLdQbOJFyO4nbN6SWxEKUnJ5t5smsNo2o3zJ5JXD5eibhAOoCAfYAgCAIAgCAIAgCAIAgCAIAgCAIAgCAIAgCAIAgCAfLQD7AEAQBAEAQBAEAQBAEAQBAEAQBAEAQBAEAQBAEAQBAEAQBAEAQBAEAQBAEAQBAEAQBAEAQBAEA//9k="/>
-          <p:cNvSpPr>
-            <a:spLocks noChangeAspect="1" noChangeArrowheads="1"/>
-          </p:cNvSpPr>
-          <p:nvPr/>
-        </p:nvSpPr>
-        <p:spPr bwMode="auto">
-          <a:xfrm>
-            <a:off x="155575" y="-144463"/>
-            <a:ext cx="304800" cy="304801"/>
-          </a:xfrm>
-          <a:prstGeom prst="rect">
-            <a:avLst/>
-          </a:prstGeom>
-          <a:noFill/>
-          <a:extLst>
-            <a:ext uri="{909E8E84-426E-40DD-AFC4-6F175D3DCCD1}">
-              <a14:hiddenFill xmlns:a14="http://schemas.microsoft.com/office/drawing/2010/main">
-                <a:solidFill>
-                  <a:srgbClr val="FFFFFF"/>
-                </a:solidFill>
-              </a14:hiddenFill>
-            </a:ext>
-          </a:extLst>
-        </p:spPr>
-        <p:txBody>
-          <a:bodyPr vert="horz" wrap="square" lIns="91440" tIns="45720" rIns="91440" bIns="45720" numCol="1" anchor="t" anchorCtr="0" compatLnSpc="1">
-            <a:prstTxWarp prst="textNoShape">
-              <a:avLst/>
-            </a:prstTxWarp>
-          </a:bodyPr>
-          <a:lstStyle/>
-          <a:p>
-            <a:endParaRPr lang="es-PE"/>
-          </a:p>
-        </p:txBody>
-      </p:sp>
-      <p:sp>
-        <p:nvSpPr>
-          <p:cNvPr id="5" name="AutoShape 4" descr="data:image/jpeg;base64,/9j/4AAQSkZJRgABAQAAAQABAAD/2wCEAAkGBxQQEhMUExMWEhUXFxcXGBQYFRQYGBgaFxUWFhcYFBgYHCggGBolGxYXITEhJSkrLi4vGR8zODMsNygtLisBCgoKDg0OGxAQGywkICQsLCwvLC8sLCw0LC4uLSwsLi8sLC8sLCwsLCwsLCwsLCwsLCwsLCwvLCwsLCwsLCwsLP/AABEIANgA6QMBEQACEQEDEQH/xAAcAAEAAwEBAQEBAAAAAAAAAAAABQYHBAMBAgj/xABFEAACAQICBgYGBwcCBgMAAAABAgADEQQFBhIhMUFREyJhcYGRBzJScqGxI0JigpLB8BQzQ6KywtFT4RUWVGOT8SRzw//EABsBAQACAwEBAAAAAAAAAAAAAAAEBQEDBgIH/8QAOBEAAgIAAgYJBAEDBAMBAAAAAAECAwQRBRIhMUFRE2FxgZGhscHRIjLh8EIUFfEGIzNSNFOSQ//aAAwDAQACEQMRAD8A3GAIAgCAIAgCAIAgCAIAgCAIAgCAIAgCAIAgCAIAgCAIAgCAIAgCAIAgCAIAgCAIB8LAb9kw5Jb2Msz6DMgQBAEAQBAEAQBAEAQBAEAQBAEAQBAEAQBAEAQBAEAQBAEAQCGr4nWN+HCc5fiuklrcCdCvVWR9wWO1XCk7G2dx4TZgcbq2KuT2P1/J5tqzjrLgTEvyGIAgCAeFfGU6fr1ET3mUfMzDaW89xrlLcmzm/wCO4b/qaH/lp/5mNePNHv8Aprv+j8Ge9HMKT+rVpt3Op+RmU09x4lXOO9NHQDMng+wBAEAQBAEAQBAEAQBAEAQBAEAQBAEAQDmzKrqUqjclPykXGzcMPZJb9V+hspWdiXWVvp+qD2D5TjOlyii01dpHYnEngds0u155o2KJeMHX6Smj+0oPmJ31FnS1xnzSZSzjqyceRD5/pfhcFcVKmtU/0k6z+I3L94iJ3QhvJWGwF9+2K2c3sX57ig5t6UMQ5IoU0or7TfSP38FXus0iyxUn9uwu6dC1R22Nt+C+fQqmOz7E1/3uIqv2a5C/gWy/CaJWTlvZZV4Wiv7YJd3u9pGag5CeCRmz7aDA1RyEGc2d2DzevRP0daovZrEr+Frr8J7Vko7mR7MLTZ98E+733lpyr0i4inYVQKg5jqt4g3U9w1Zuji5L7lmVl2hapba20+vavn1LzkmmVLE7FILcUPVcfdJ63epMl13QnuZSYjA3UfetnNbv3tyJ/D49H3Hwm0iHVAEAQBAEAQBAEAQBAEAQBAEA+M1t8xKSis2ZSzOd8fTG9reB/wASHLSOHh90vJ/BsVE3uRG55jErUKtOk6tUZbKusASfGab8Xh76ZRhNPNczbVVOE05J5EOcuq6i21WIABAYcBt32nMT0fe9scn2P5yJ6uhxIfG03Q9ZSvePlzkSdFlb+tNG2Moy3Mg9INLcSiLhqbdEgXa63121iTbW+oBu2bdm/hOmwGIk8NGK4ZomYTA0ybtks3ye5fPf4FOAueZJ8SSfiSZuLYtWTaAYzEWLIMOh+tVuGt2Ux1vxas3ww85dRW36Vw9WxPWfV87vDMuGXei3DpY1qtSseIFqa+Qu380kRwseLKu3Tdr+yKXm/jyJzDaD4CmLDDI3vl3/AKyZsVFa4EOWksVL+b7tnodH/KWB/wCjof8AiT/E9dFDkjx/X4n/ANkvFnNidBcBU34ZV9xnT+hhPLorfA2Q0nio/wA/HJ+pA5j6LKLXNCtUpHk4FRfyb4mapYSL3MmVabsX/JFPs2fK8inZzoTi8Lcmn0qD69K7W95baw8rdsi2YeceBa0aSw92xPJ8ns89xAIdxB7QR8CDI5Oa4MtmSaWstlxBLDhVHrr7/wDqD498l1Ytx2T2rmUuM0TGf1U7Hy4Ps5enYX7A50VCkkOjC6uDcEdhlipJrNHOzhKEnGSyaLBhcUtQXBmTye8AQBAEAQBAEAQBAEAQBAPLEUA4sb+BII7QRNV1MLo6svjwZ6hNxeaIfGZA7eriGX3lVvjsMqp6HUt0335P4JUcXlviivYvRmpRYO2JUjbs1CDYgg263bIGMwNeFrzlLeSqsT0jyUSAqYgoTZipHEEjd2ysqi8s0SmuZ7UtI6ybCRVXiri9/Hf85NjOeWTfia3VF7TkxeSpmFRKlJhQHq1Q121bXINMD1r3ItccN09V4urDPUs2J7c0syZRinTW01ny/Je9GsjwWCANKzVLbar7XPOxIso7FtLejSWA/jYu/Z6lRi78Ve/r3clu/PeWIYhD9ZfMSbHG4eW6yPiiD0cuTP10q8x5ibFfU90l4oxqvkfdccx5z0rIPivExkz9XnvMwIAgCAVjSXQmhjLso6Gt/qKNjH/uLubv2Htke3Dxnt3MscJpK2jY9seT9nw9DKc5yatg6nR1lsfqsNquOaHj3bxxlXZXKt5SOloxNd8daD+V2nRkWdNhjY9ekx61P+5OTfPjzHqm91Pq5GjG4KGJjylwfs+r0Lxhcd0erUptr022q3zB5MOIlvGSktaO45SyuVcnCayaLZleZrVG/bPZrJGAIAgCAIAgCAIAgCAIAgHwm0w3ks2CmZrjTVcnhwHZw/XbPnukMa8Tc5cOHZw+e8vcPSq4ZcSp4yntPeZvplsRtZw0MC9aotOmLuxsPzJ7ANp7pY0p2NRW9muclFZs0vDaJU6dNVR2VgBrNvDNbaxU/IGWWJ0JTct7T57/AC+MitWMnntWw4sXlmIpbdXpV5pv8V3+V5QYnQF9W2H1Lq+PjMkQxNct+w4aWZdtpUuuyDJGqmddPMDzmY3TieHWjqp5gZLhi5o1upHTSzISZVpFria3SeGY1Hca1Gu9KoO0MrdhVwQO8WlnRpXb9T2HlQ1d8U+35WTIGnp9XwrhMXRWop3VKfVJHuMSCfES3liJVvKSzXNEmrR9WKhrUyaa3p7cu9cO4ueS57Qxi61GoGtvXc6+8p2jv3SRXbCf2sr78LbQ8rFl6eJJTYRzizbK6WKpmnVXWU+angyngRPFlcZrVkbab50z14PaY1pJkFTA1dR+spuUqW2MPyYcR/mU11LqlkzrcJi4YmGst/Fcvwemjua9CxSptov632Twdfz7O6esNiOilk9z8us0aQwfTw1o/ct3X1fBaUqth6m/ZvB4EcCJcnKl1ynMBVUc5kwSEAQBAEAQBAEAQBAEAQDgzutq0jzYhPxG3yvK3S03HCyUd8so+L2+RIw0c7Fnw2lYqYacdPD5FtGwhcbgzrWAJJOwAbTflPdMJbIraz25LLNly0X0fGFUu1jVYbT7I9kfmf8AE7HAYPoI5y+5+XUU+JxHSPJbiXxuLSijVKjBEUXLE7B/v2Sc2ks2aYVyskoxWbZkWlun9XFE06BajR3XGypUH2iPUXsG3meEgW4hy2R2I6fBaKhT9Vn1S8l8/vaVPCY16XqNYezw8pBtors+5FjZTCz7l3k7gtIb7G6p+HnKu7R2W2O0rrcHOG2O1E1h85POQHh5R+0htIkaWcg7wp7xt8xMNy/lFM8anI/f/EALm9gNu/cJGylrfSZ1eZz6aZczYGg+oxcMhICkkBka+tYbBu8QJ3LqksLBPekvQ16LtjHEyzaSae95cUUPCYhqbh0Yo6nYymxH65SEpNPNbzo5xjOOUlmmapobpsMQRRxFlq7lfctTs+y/ZuPDlLLD4tT+me/1Obx+jXV/uVbY8uX4LrJpUEdn2UJjKLUqnHarcVYbmH62gkcZrtqVkdVm/DYiVFinH/KMUx+BfD1HpVBZkNjyPEEdhFiO+UM4OEnFnYVWxtgpx3MsWQ4rp6JpH95SF07U4r4f4llgbtaOo+G7s/BQaWwupPpY7nv7fz6knkuYmmw2yeVBoOErh1BEyYPaAIAgCAIAgCAIAgCAUv0j6QrhVo0wNZ2cPb2VQ7/FrDuDcpAx6U69Tjnn4Fpo3CSu1pLcll2t/vofjLM/w2LZEpOTUf8Ah6rXFhc6xA1QBzv8dkqlhXY8oo22UW1RcprJLiWrBZctM6xsW58u6WuEwEKPq3y5/BW23yns4HRicQtJGd2CooLMx3AAXJMnN5LNmqMXOSjFZtmH6aaVPmFTZdaCn6NN1/tuPaPLgNnMmtutdj6jr8BgY4aG3bJ737Lq9SuTSTyd0Z0TxGPN6Y1KV7Gs19XZvCje57tnMiba6ZT3biFi8fVhtktr5L35fuw03JvR5g6ABdP2l+JqbV8Kfq277ntk2GHhHftOfv0tiLPtequr53kjm+ieGxA9TomAsHpgKdm4EWsR3jyni7B1W71k+aIcMTZF78+0p+aaEYmipaiy4i31R1HPcGOqfOVs9ENvY0SljY8UR2UZVi3qDpMNVABvqMpVCQd7u1gw42GzvkjDaLrqlry2s024qU1kthI6eVaz9EadcirTBuikqCTa5DgjbYAbdndJl1c5NOLyyNmDvprTjbBPPjy/eoolTNa2IOrX2uhO0oofbb1mAu3jK/ESm9kuBfYGuqKcqtz680fVkRk81fQLSc4lehqm9VBsY/xFHH3hx57+ctsJiekWpLevM5jSWC6GXSQ+1+T+C4SaVRSPSXknSUxiUHWp7H7UJ2H7pPkTylfjqc4664en4LjRGJ1Z9E9z3dv5+DPcvxRo1EqD6pvbmOI8ReVldjrkpLgXt9KurcHxLLmICuHX1XAdT37/ANds6FNNZo4yUXFuL3otOi2Y36pM9HktcAQBAEAQBAEAQBAPhNoB/PulObnGYqrWvdSdWn2U12J5+t3sZVWz15Nnb4PD9BTGvjx7Xv8AjuNC9EmSdHSbFMOtV6qdlNTtI95h5KslYWGS1nxKPTOJ1pqlbltfb+F6s0GSykMp9KuknSP+yUz1EINUj6z7Cqdy7Ce23syDibc3qI6TQ+D1Y9PLe93Zxffu7O0z2RC8LroDoX+2EV64Iw4PVXcapB27eCA7zx3c5Joo1/qluKnSWkeg/wBuv7vT8+hsFGkqKFUBVAACgAAAbgANwlglkcs25PN7z9wYBMA/KuDuIPjBnJkVpLmPQUjb1jsEGDPcJhnxD2AJJO0zBktWY6D0q2HCiy1lF1qdvstzU/DeO3TfQrY9ZMwWNlh584vevjrMtxGGak7I6lXUkMp4EfrfKSacXkzrITjOKlF5pntgcU1GolRDZkOsD+R7CLg9hnmM3BqUd6PNlcbIOEtzNvyjMFxNGnVXc4vbkdzKe0EEeE6CqxWQUlxONvqdVjhLgdNekHVlYXVgVI5gixHlPbSayZrjJxaa3owzM8CcPWqUjvRiL8xvU+KkHxnO2w1JuPI7Sm1W1xmuKJnBVOkwlvrUm/lP/v8AllrgLNarLkc7pWrUv1l/Lb38TqyLFarDsPzk0rTTMFW10BmTB7wBAEAQBAEA/FVwqljuAJ8heZSzeRiTyWbKdjcyZmLax7LHd3SzhUksimsvbeeZHZ7pcVweIpm/SFdRGHJyFYk8CFJIPG0hY+h11Ocd3oXGg7434qFdj6115bcv3gZngMI1apTpJ61R1QdmsQL9wvfwlAlm8kd/ZYq4OctyWZ/ReCwq0aaU0FlRQqjkFFh8pbpZLJHCTm5ycpb3tOHSbNhg8NVrHaVXqg8XbqoPxEeF55snqRbN2Eod90a+fpxP59qVCxLMdZmJZmO8km5J7SSTKredukksluJnQ/ITj8StPaKY69VhwQHcDwZjsHieE2VV68siLjsUsNU58dy7fwbzQorTVURQqqAqqBYAAWAA5WlmlkskcXKTk3J7Wz9VHCgliAACSSbAAbSSeAmQk28kZjpR6S2JNPBAADYa7C9//qU7Lfaa/dxkKzE8IeJ0GE0Msta//wCfl+y8SgY/MKuIJNaq9W/tszDwB2DuAkWUnLey7rqrr+yKXYjnoDVN16pHEbD5ieGbJPNZPadtPSbEs6o1RqyL9V2JI7nO0eNx2SRC+UI7XmUWJwVV0/oWT6vjcbPoU+HqUQ9E3O5wfWU8mH57jJtVsbFnEpMRhp0T1Z/5LHNpHKH6TcjDIMUg6y2Wp2qTZW7wTbuPZK7H05rpFw3l1ojE5S6GW57V2/n93mdrKlnQGg+jDMf3tAn/ALi/BXH9J85ZaOt31vt+Si0xT9tq7H7e5f5alEZn6TsFqYinVG6olj7yHf5MvlKfSMMpqXNeh0eh7daqUOT9f8ENoy/XdDudCPL/AGJnnR08rHHmvQaXr1qVLk/X9R8wNTVqWPaPH/2JcnOmlaMYjWS0yYJyAIAgCAIAgHBnz6uGrnlSc+Skzdh1nbFdaNGKeVE31P0M1q43qA33gfKXar2nNuzNFZzTFXvNjrjKLjJbGK7pVzU4PJp5p9aJf0V4HpccHIuKSM9/tGyL8GY+E49Yd1YiUH/H9XkfTMVj44jR0bY/zy2dm9dzWRtElnPGZemPMv3GHB51WHmieH7zykPFy3ROg0HT91r7F6v2M0kI6A2j0X5R0GDWoR16/wBIT9jdTHdq9bvcyxw0NWGfM5PS9/SXuK3R2d/H47i4SQVZk/pQ0oNSocJSa1ND9KR9d9+p7q7L8z7u2Dibc3qI6XRGCUY9PNbXu6lz7X6dpnlSoFFzIqWZcykorNnI+YjgJsVbI0sXHgfg5gSLWmOjNUsU2skSeVBbbN/GR7W8zbRq5bCz6NZu2DrLUW5Xc6+0vEd43jt8ZrqudU9Zd54xeHjfW4PfwfJm2UaodVZTdWAIPMEXB8p0EWpLNHHSi4tp70fjF4daqPTYXV1KkdhFjMSipJp8TMJuElJb1tMLr4c03dG3ozKe9SQflObnHVbi+B20JqcVJcVmS+iGK6LGUG4FtQ9z9T5kHwmzCz1bovu8SLjq9fDyXVn4bTY50RyJT/Sbh9bDI/FKo8mVl+erIGkY51J8mW2h55XOPNGf5O+rWpn7VvMFfzlZhZZXRfX67C4x0dbDzXVn4bT2xx1K7dj38zrfnOhOSL3opVs1oMFvmQIAgCAIAgHjjKHSU3Q/WVl/ECPznqMtWSfI8yjrRa5mK4DA4mrRXVoubXU7LbiRsJtfwnRu6tPazlXhrc8lEjswyHFi5OHqHuXW/pvHT1vcz2sNat6Lb6GSEq4qm4K1StNgGBB1VLhth2ixZfOVekK1rK1cdhd4C+fRdBLcm2u/JP08zVJXE4wz0j4rpMwr8k1KY7ggJ/mZpWYh52M7DRcNTCx6835/CK9hqHS1Epg2LuqDvdgv5zUlm8ifOWpFz5JvwP6JXE0qShQ6gKAoFxsAFgLCXUa5cEfPZ3wzblJZnPjc3UU36Ihqmq2oDcAtY6oJtsF7T06bMtiPMMTTrLWezj2GMYrRPFi7FRVJJLFXUsSTckg2uSeUrpYG9bcs+862vTuAlsUsu1P2zIHHYFh1XUr3iR2pQe1E+NlWJj9Ek+wi62B1Re89KeZoswyis8zz/ZmAvaNdbiPKqSWZ15YxDi01WpOJmmTUthZ6YlfIsGaz6PsWamECnaabMnhsYfBreEutHz1qcuWw5fSlepfmuKz9vYssnFcY/pvQ1MdX5Eq34kUn43lBjFldL94HWaOnrYaPevMicNU1GVvZYN5EH8pFUtVp8iVNaya5m7TqTiSv6epfA1uzUPlUSRMas6Jd3qT9GPLEx7/RmU4Q2dD9pf6hKSt5WR7V6nS3rOqS6n6HRpAbV37l/pE6U4xFz0afrjwgF7mTAgCAIAgFQzvSV0LKoqUyCRboHJ8DqkHvEsacLBrN5PvXyVd+Lszaimu5/BTMwzjMqp+iGLI+zSqL8Qok1QwsFt1fEg54yb3y/e4iM2zLFIQKtR6bEbU17EWJB1tU77g75IrjU1nFEW12qWTZHDPaw3V6ni5PzM9OuHJCMrObO/K9MMTTqK2uHI4kDdxBtw5zXLD1zWq0bFdbX9UXtRYW9ImJO40x3IPzJmr+3UdfiHpXFdXgV7EY1KlR6joru5LMTtuTv2bhMf2vC556i7836m/+/wCktVQVrSXLJeiTPajm4TYqqvcAPlN8cLXD7Ul2IhW47EWvOyUpdrb9ToTPmMy6onhWyOlMzqncL+I/zPDhA2KVjPlfOKtMXYFRz4fCYVcHuMudkVm0fvKKqY+o1FxfWQsDxBUqDbt6wPhK3SOGjqp8y60NjrIz+l7VtXx2MpmY4ApVem2+m7Ke3VNr+O/xnMS+htH0uOV1cZ8Gkz2ppwkds2NLce9GiBuE1ykzXqpbjtpiaJBmkejL91W5a4/pF/yltov7Jdvsc9pj/kj2e5c5aFOZR6Qj/wDNb3E+Uosf/wAz7EdRor/xl2srwEgSLA3dZ1hw5Bacm2Br9yfGogkXGPKiX7xJujv/ACYd/ozJ8MOuvvL8xKKv749q9Tp7v+OXY/Q/ekb/AE7dy/0idMcYi6aODrjuEAv4mTAgCAIAgCAcOeY79noVanFV2e8eqvxIm2ivpLFE0Ym3oqpT5Lz4GAZpWNVmc7bn4bhOmSyWRyqk3LaRjrPLNyZp3oWycWr4o2Jv0K9gsrufG6eR5yo0hbm1WuG8u8BS1HpHx3dn+VkaLi8poVf3lClU96mh+JEgRtnH7W13kyVUJfck+4wTSCj0WKxKABQtaqFA3BddtUD7tpH/ALriq5Na2e3iv8PzOgj/AKd0fiKYy1Mm4ram1ty27Nq39RMaJZVTqK1WqNYX1UU7tguzHnvAA7+yWNekrbq92XZ+7Cuf+m8Nh7t7kstz4eG/wPbSHKKZUtSGo4+qPVbstwMk0YucXlN5o143/T9d0HKhZSXDg+rqf6ylnEGWmsca6cnkz5+0RrGOjL56M6KUTWxuJboqa0yia2y6khqlQjl1VC8+twIJpMdiVY9VbkXujsHKCzy2vgVvEaYviK1Q6lLVdmKh6FIsFJOqC1r3AttvKGyyW3YvA7OjC1pqKlJZZbmeVISuZcs6qYmpnhnVTE1M8s1TQDCdHhAx31GZ/DYo+C38ZeaOhq0583mcxpSzXvy5LL39yySeVxjml+I6TG4gjcG1fwKEPxUznsXLWukzrcBDUw8F1Z+O05Mro9JWpJ7VRF82Aketa04rrXqbrpatcpck/Q26dScYVj0i1tXBMPbdF8m1/wC2QtIPKlrm0WWio54hPkn8e5mmAW9RPeHwN/ylPh1rWxXWvkvsXLVom+pnLm7a+Jcc2C/ALOkOQNC0cS9SAXqZMCAIAgCAIBUfSXUP7MiD69QA9yqzfMCWGjkukcnwRWaVb6JRXF/LMrq5cZcqxMoejaIyvhiu+acTiIUVOyXDz6ifgMHZi740w48eS4vu/BqPoar/AEOJp8qivbsdAv8A+c5Si2VjlKW9vM7nS2HhR0UILKKjqruf5NEkgqDC/SLhejzCvyfUqDuZAD/MrSsxCysZ2Oi56+Fj1Zrz+Mj10dxdqOry/NmMs8JH/ZXf6s2X1ZyzPzj8beS0jZVUW3QejhsxoPSxFGnUqUuqHKLr9G19Sz2vssw+6J5nOcH9LazOc03gYV3KzVWUvVb/AB3ma5xljYKvUpOBrU22EgWYb1cd4sezdwlXZjMTm4ylmT6tF6PtrVsIZdjezmuO4g8xzSrX6rOSoOxeHeQN/jPLnJraeI0V1v6EdGWYS3WMi2z4IsMPTl9TJqmJEkSmdNMTSzyyXyLLGxVZaS8drH2VHrN+uJEVVO6agv1EXE3xprc33dbNloUgiqqiyqAoHIAWAnTxiopJHISk5Nye9nhmmNFCjUqtuRS1uZG4d5Nh4zzZNQg5Pge6a3bYoLizEWcsSzbSSSTzJNz8ZzLbe1naJJLJFj0DwfSYtDwphnPlqj4sD4STgIa1yfLb7FfpOzUw7XPZ7mqzoDlyh+lHFbKFLmWc+A1V/qbylXpOeyMe/wDfEu9DV7Zz7F7+xT8oX6QHkCfy/ORcBHWuT5Jv29yZpSerh2ubS9/YicsPTYkHm5fyu3ztL05k1PROldrwYLfMgQBAEAQBAKzp9hGeglRVLdDUDsoFyUsVewG8gNreBkvB2KM2nxWRDxtTnBNcHmVWhg0ravRMtTW9XVIN+636Emuxx+7YV/Q624hfSDkhwhw9zfXVybbgyldnkw+MotJ3ytlHkdr/AKZw0KoTeX1bM31cvH93HV6I8bqYx6Z3VaRt2tTOsB+Ev5SJhZZTy5k/TVetQp8n6/qNglgcuZj6Y8t20MQBzpMfN08P3nmJCxcd0joNB3fdU+1ej9ijZHTqOzrTpu+wX1VJtt4kbuO+ScDZ9Oq+BdzshF/W0u06cXlmJG/D1h29E9vMC0sE1zNtd9D3Tj4olPRzjzQx6KdgqBqTA7NpGstxz1lA+9PNqziRdMU9LhHJfx2+z8i0+lfJ0xKJq7MQNitzX2H7L7QeHibwLKlLbxOWwmNlRnH+L/c1+7TIRk1Sg+rXRqbjbqsLbOY4Edo2SBbJrYdHhYQnHXTzRIUxIsmTjqpiaZHhktk2U1cU2rSTW5tuVfebh3b5iumdrygiPfiK6Y6038vsNY0cyJMHT1V6zt6722k8hyUcBL3DYaNMclv4s5bF4uWInm9iW5EvJBFM+9JOdXK4ZDus1Tv3on9x+7KrSF//AOa7y+0Thss7pdi937eJR1lSy6Zpno6y3o6DVSNtU7PcW4HmSx7rS60dVq1ub4+hzmlrte1QX8fVltliVRkWmuO6fGVCDdUtTH3L638xac/jbNe59Wz97zq9HVdHh1nx2+P4yIp6vRYeq/FhqDx2bPP4SZo2vKMp89ngV2mLM5xr5bfE8dD6Fy9TlZB47T/b5yzKY1zRjD6qXmTBOQBAEAQBAEAQDzp0VUkqoUneQAL99t8zm2MioelbLulwWuBc0XV/unqN4ANrfdkbExzhnyLXQ92piNV/yWXuvgybJswOGxFGsP4bhj2rucDvUsPGQIS1ZJnTX1dNVKvmv8eZtmf5hXUKaFKpVRlBD0ujJ28wxBtaxuL75cxye05PC1UtvpZJNcHn7e5n+fU8wxSlOgxTKbdVxZdhuNmtbfMTlHLLVzLum3B0bU4580QOXYmth6dRWvRC1CpF7Nr2swtv2as01tuL1VkkyTNK1qSWezPuPv8AzBWHq12/Ff5zDskuJqdEeMT7/wA01rqz6tQqQykqNYFTcFTwIMwsTKO/aYVUUmlsT2MnE01Zqgq1KC1DwGuQB4WMmqtPiR/7FW91j8PydeZacDErqVcHSdeAYlrdq7AQe0TEsPCSye021aI6J60LWuzYVpzRLXFLUHshqhH8xJ+MjvR9PX4liq7EsnLPw9kjrw9eiv8ADU99z8zPawNC/iu/b6mqVVj4k1hdIyihVOqo3KDYDuAm6NcYrJLIiTwCk82s2d1HSph9c+ZjURolo6L4HZhNKKza6oVqMVJXWAFj3rvAJGw+c02xkk9XeVmIwSokpSz1c9vMoNYsXYuSXLHWJ3619t+285iees9bedNDV1Vq7stnYSOj+VNiqy0xcA7Xb2VG89/AdpE9UUu6aiu/sNGKxCorc33dpstGkEVVUWVQAAOAAsAJ0kUorJHISk5Nt72R+keZjC4epU+sBZBzY7F+O3uBmrEW9FW5G/CUdNaoePYYwLntJ8yZze1nYPJLqObSavbo6I+qNZveO78/OdJRX0dahyOPxFvS2ynz9OBbNGsu1Ep0+O9u87T/AI8JtNBp+Ao6iATJg6IAgCAIAgCAIAgHji8OtVHpuLq6lWHMMLEeRmGs1kz1CbhJSjvW0/nbM8A2GrVKL+tTYqTztubuIsfGVMouLaZ3VVqtgrI7ms/3s3GseirPOnw3QMevQsB20z6lu7avgvOTsNPOOq+BzWmMN0d3SLdL14+O8utSoFBYmwAJJ5AbTJJUpNvJGAaSZocVWeodgJJA5X/OwA8JK1MoNHfYbDKilQXIg2EgTieJRPIVTTZWChipBsdxtzkZ5RkmQ763KDiuJZ8sx+HxNhqhX40z1W+6RbW8PhJcLdYoZzxeHf3PLx9S+UtAKNekro9SixG42dfI2P8ANNqkzZXpi6P3JPy/fAhcx0CxdK5TVrj7J1W/C2zyJmddk+rS9cvuzRXKyNSbVqI1NvZZSp8jM9IT44lSWaeaPajjLcFPeAZnpEHOLPV8QGFtRB2qCD8DaZ10ZjJJ72Smh2HL42kAdiK7vysUamoPezC3unlMTkmiv0tdHodTiz9Z/gqdTF1RTrJrF9XUK1L6wABAKoQTcGUV+Hjba9Saz5GvDYqVNEdeEskt6y3F+0RyMYSiL7aj2Z2+Si/AX87ydhcOqY5cXvKrG4t4iefBbkTslEMy3T/O/wBordEhvTpEjsZ9zHw9X8UpMdfrz1VuXqdLozC9FXry3y9Pzv8AAruHIUNUb1UF+88B+uyYwNOvZrPcvX92mdKYjo6tRb5enH4ODR/DHE1zVfcp1jyLfVUd2/wHOXZzRqujGBudYwYLdMgQBAEAQBAEAQBAEAzT0t5DfVxaDdZKtuV+o57idU968pDxVf8ANF/oXFb6Jdq917+PMoej2cPgsQlZNursZfbQ+sv5jtAMi1zcJZousTh431OuXHyfB/vA2DSrNVqZZUq0W1lqoqqeyq60zfkQGII5iW9TUmmjmcBQ442MJ74tvwWfsZTWyuS8zrI4gjK2AYGwBOwnYCTYC5OzgACfCRbUo5tmJTiciLKec9Z5hRyPy1BTttPOszDri+BZMp0wxmGAVK7Mo+pUAcebdYdwM9xvsjuZFt0dhrN8cn1bPx5E7R9J2L+tToN92oP757/rJ8kQ5aFo4OXivg5sz06xGJUo9PDleRpFrdo12Iv22niWMsfI2V6KpreacvH4SK1q8jaeY4ua37SVKiPDYfTr8CP1ym2OOj/JMj20Wpf7eXfmdmGzmpQBp0FvVfe29r7tYns8hNn9U7NlaZU2YRxl0mIkn+/uxE3oblz06ysT0lQnad4F94H5njNtNCr28SJicVK3ZwNhXdJJDKtpzpH+y0+ipn6Zxw+op2Fu/gPPhIWMxHRx1Y735Fno7B9NPXl9q83y+TLqa3IAlJGLk1FbzpJzUIuUtyOXNqhqMuHpbdvW7W7ewfrdOioqVUFFHI4m932Ob7upFz0eykIqU1223nmTvP67JtI5pGX4YU0AmTB1QBAEAQBAEAQBAEAQDyxWHWqjI6hkYFWU7iCLEGYaTWTPUJOElKLyaMF0ryB8BXNM3KG7U39pe37Q3HwPESrtrcJZHZ4PFRxNeut/Fcn8Ph+D5lWdNTo1sMzfRVLMt72p1VZXR/dJUBhy2jaCDspucHlwM34dSsjdH7l5p7Gu3l4dl1wODOIC6tKorEC4NNrbRfZUtqMvJgSDLSNqazKuWJjXvkv3q3lx0f0fTC3Y2aoRYtyHsr2fOYlLMqsXjJX7P4ogtJ/R1RxJNSgRh6h2kW+jY9qj1D2r5GRLMNGW1bGSsJpeyr6bPqXmvnv8TNc40ZxWEJ6WiwUfxF69Pv1h6v3rGQ51TjvRf0Y2i77JbeT2Pw+MyKQ3mlkpnqs8s8nqs8MwdGGoNUbVRWdvZVSx8htnlJvYtp4nKMVnJ5LrLXl2g9YqalciggF7bGc9wGxfE+ElV4Gcts9i8yqxGlqobK/qfl+/uZ44HKwzlaKbzv3k9rGWddUa1lFFBdfO6WtNmjaP5IuGW52ud5m00njpVpMmCSws9Zh1Kf8Ac/Jfnw4kRsRiVUuvkTsFgpYiXKK3v2XX6GS4nEtVdqlRizsbsx4n8h2cJRTk5NylvOphCMIqMVkkeWNxXQLYbar+qOKg7L25ngJbYLDai15b35HPaSxvSvo4fat/W/hfvAl9GckNIazC9Vt/HVHLv5yeVRpmQZZ0Y1iNsyYJuAIAgCAIAgCAIAgCAIAgETpLkNPH0TSqbDvRwNqNwI+RHETxZWprJknC4qeHs14965owrOcqq4Sq1Ksuqw3H6rDgyHiD/tvlXODg8mdjRfC+CnB7PTqZOaG6aVMAQj3q4cnal+sl95pX+KnYew3vtqvcNj3EPHaOhiVrR2S58+35NjyrNKWKpipRcVFPLeDyYHap7DLCMlJZo5a6mymWrYsmdk9GoQCLxujuFrG9TDUmb2tRQ34htmuVUJb0iRXi761lGbS7SObQPAH+BbuqVh8nmt4Wp8PNkhaUxS/n5L4OjD6HYJN2GQ+9rP8A1kzKw1S/ieJaRxMt833bPQl8Ph6dIaqKtMclAUeQm5RUVkkRJTlN5yefaQGk+KNQihT2lt9uEyeSQyPJ1wyfa4mAV/SfTtKN6eGIq1Nxfeid3tt3bPlIOIxqj9MNrLfB6LlZ9VuxcuL+DN69dqjM7sXZjdmJuTKiUnJ5s6GEIwioxWSR8q1uits16repT379xYfISxwmE/nZ3L3ZR6Q0hnnVU+1+y92SuQZEwbpKvXrNt56t/wC75bhLMpDRsiybVszTJgsQFoB9gCAIAgCAIAgCAIAgCAIAgETpHo/Rx1Lo6o2jajj1kPNT8xuM8WVxmsmScLirMPPWh3rgzFtJdGq+Ae1QayE9WqoOo3YfZb7J8L75XWVSg9p1mExtWJjnHfxXH8rr9DhyzMquGfpKNRqbcxuI5MDsYdhE8Rk4vNG+2mu6OrYs0aHkfpSBsuLpap/1ae0d7Ido8C3cJLhiv+yKLEaEe+mXc/n5yLxlef4bFfua6VD7IazDvQ2YeIkmNkZbmU92Fup++LXp47iSns0HwwCjZ7pBXDsqgoB2TAK/ic7qLterqjmSB84bS3nqMXLYlmR2F09TDVNZb128h+Ij5AzTK+K3bSXXgpyf1bF+8D5nGl+IxwszalM/w0uAffO9vHZ2SruxFk9j2LkdBhcDTSlKKzfN+3L1IimhOwC8jxi5PKKzZLssjXHWm8ke2HVnOrRAduNQ/u07j9Zv1tlrh8GofVPa/Q53G6Slb9FeyPm/hFjyHR7UNxepUPrVDv7bchJpVF9yfJAli2+ZME4BaAfYAgCAIAgCAIAgCAIAgCAIAgCAeWJw61VKOodWFirAEEciDvmGs9jPUZOLUovJozrSP0Zg3fCNqceickr91t69xv4SLZhU9sS7w2mpR+m5Z9a3963PyM+zPKa2GNq1Jk7SLqe5hs+MiThKH3IvKcTVd/xyT6uPhvOEgHtngkZ5Hfhc4xFL1MRWQchVqAfhvaelZJbmzRPD0z+6CfciQXS3G/8AVVPNT8xHTWf9jT/QYb/ojmxec4ir+8r1W++w+RE8u6x8WZWDw8d0F4EEuH6VmJv3nafMxKbSNUaVJvZkj8tlb8No58u88J6hPX2JGi6pV7ZNJdZO5Tlj6oAUt3bF/Gdn4dabVg3N5y2ESWlY1x1a1m+b3fL8iw4PRwvsqdYf6aXCfePrP42HZJ1dUa1lFFRdiLLpa03mXDKtG9gFgqjcALAdwns0lpweXrTGwTJg64AgCAIAgCAIAgCAIAgCAIAgCAIAgCAIB418KrizAGAVnMtA8LVueiVTzW6H+W15qlRCXAm16QxNe6b79vqV/FejRL9Vqg7LqR8ReanhIPiyXHTd63qL8fk4W9HpH8RvITz/AEcebNn98s/6LxYXQI8WY+AhYOHNniWmrnujHz+Tqw+gyjgT3zZHDVrgRZ6SxMv5Zdmz8kthNDwLdQbOJFyO4nbN6SWxEKUnJ5t5smsNo2o3zJ5JXD5eibhAOoCAfYAgCAIAgCAIAgCAIAgCAIAgCAIAgCAIAgCAIAgCAfLQD7AEAQBAEAQBAEAQBAEAQBAEAQBAEAQBAEAQBAEAQBAEAQBAEAQBAEAQBAEAQBAEAQBAEAQBAEA//9k="/>
-          <p:cNvSpPr>
-            <a:spLocks noChangeAspect="1" noChangeArrowheads="1"/>
-          </p:cNvSpPr>
-          <p:nvPr/>
-        </p:nvSpPr>
-        <p:spPr bwMode="auto">
-          <a:xfrm>
-            <a:off x="307975" y="7937"/>
-            <a:ext cx="304800" cy="304801"/>
-          </a:xfrm>
-          <a:prstGeom prst="rect">
-            <a:avLst/>
-          </a:prstGeom>
-          <a:noFill/>
-          <a:extLst>
-            <a:ext uri="{909E8E84-426E-40DD-AFC4-6F175D3DCCD1}">
-              <a14:hiddenFill xmlns:a14="http://schemas.microsoft.com/office/drawing/2010/main">
-                <a:solidFill>
-                  <a:srgbClr val="FFFFFF"/>
-                </a:solidFill>
-              </a14:hiddenFill>
-            </a:ext>
-          </a:extLst>
-        </p:spPr>
-        <p:txBody>
-          <a:bodyPr vert="horz" wrap="square" lIns="91440" tIns="45720" rIns="91440" bIns="45720" numCol="1" anchor="t" anchorCtr="0" compatLnSpc="1">
-            <a:prstTxWarp prst="textNoShape">
-              <a:avLst/>
-            </a:prstTxWarp>
-          </a:bodyPr>
-          <a:lstStyle/>
-          <a:p>
-            <a:endParaRPr lang="es-PE"/>
-          </a:p>
-        </p:txBody>
-      </p:sp>
-    </p:spTree>
-    <p:extLst>
-      <p:ext uri="{BB962C8B-B14F-4D97-AF65-F5344CB8AC3E}">
-        <p14:creationId xmlns:p14="http://schemas.microsoft.com/office/powerpoint/2010/main" val="1139305875"/>
-      </p:ext>
-    </p:extLst>
-  </p:cSld>
-  <p:clrMapOvr>
-    <a:masterClrMapping/>
-  </p:clrMapOvr>
-  <p:timing>
-    <p:tnLst>
-      <p:par>
-        <p:cTn id="1" dur="indefinite" restart="never" nodeType="tmRoot"/>
-      </p:par>
-    </p:tnLst>
-  </p:timing>
-</p:sld>
-</file>
-
-<file path=ppt/slides/slide11.xml><?xml version="1.0" encoding="utf-8"?>
-<p:sld xmlns:a="http://schemas.openxmlformats.org/drawingml/2006/main" xmlns:r="http://schemas.openxmlformats.org/officeDocument/2006/relationships" xmlns:p="http://schemas.openxmlformats.org/presentationml/2006/main">
-  <p:cSld>
-    <p:spTree>
-      <p:nvGrpSpPr>
-        <p:cNvPr id="1" name=""/>
-        <p:cNvGrpSpPr/>
-        <p:nvPr/>
-      </p:nvGrpSpPr>
-      <p:grpSpPr>
-        <a:xfrm>
-          <a:off x="0" y="0"/>
-          <a:ext cx="0" cy="0"/>
-          <a:chOff x="0" y="0"/>
-          <a:chExt cx="0" cy="0"/>
-        </a:xfrm>
-      </p:grpSpPr>
-      <p:pic>
-        <p:nvPicPr>
-          <p:cNvPr id="8194" name="Picture 2" descr="http://www.liderandotuvida.com/wp-content/uploads/2014/05/alcances2.jpg"/>
-          <p:cNvPicPr>
-            <a:picLocks noChangeAspect="1" noChangeArrowheads="1"/>
-          </p:cNvPicPr>
-          <p:nvPr/>
-        </p:nvPicPr>
-        <p:blipFill>
-          <a:blip r:embed="rId2">
-            <a:duotone>
-              <a:schemeClr val="bg2">
-                <a:shade val="45000"/>
-                <a:satMod val="135000"/>
-              </a:schemeClr>
-              <a:prstClr val="white"/>
-            </a:duotone>
-            <a:extLst>
-              <a:ext uri="{28A0092B-C50C-407E-A947-70E740481C1C}">
-                <a14:useLocalDpi xmlns:a14="http://schemas.microsoft.com/office/drawing/2010/main" val="0"/>
-              </a:ext>
-            </a:extLst>
-          </a:blip>
-          <a:srcRect/>
-          <a:stretch>
-            <a:fillRect/>
-          </a:stretch>
-        </p:blipFill>
-        <p:spPr bwMode="auto">
-          <a:xfrm>
-            <a:off x="3995936" y="2634430"/>
-            <a:ext cx="4490442" cy="3561384"/>
-          </a:xfrm>
-          <a:prstGeom prst="rect">
-            <a:avLst/>
-          </a:prstGeom>
-          <a:noFill/>
-          <a:extLst>
-            <a:ext uri="{909E8E84-426E-40DD-AFC4-6F175D3DCCD1}">
-              <a14:hiddenFill xmlns:a14="http://schemas.microsoft.com/office/drawing/2010/main">
-                <a:solidFill>
-                  <a:srgbClr val="FFFFFF"/>
-                </a:solidFill>
-              </a14:hiddenFill>
-            </a:ext>
-          </a:extLst>
-        </p:spPr>
-      </p:pic>
-      <p:sp>
-        <p:nvSpPr>
-          <p:cNvPr id="2" name="1 Título"/>
-          <p:cNvSpPr>
-            <a:spLocks noGrp="1"/>
-          </p:cNvSpPr>
-          <p:nvPr>
-            <p:ph type="title"/>
-          </p:nvPr>
-        </p:nvSpPr>
-        <p:spPr/>
-        <p:txBody>
-          <a:bodyPr/>
-          <a:lstStyle/>
-          <a:p>
-            <a:r>
-              <a:rPr lang="es-PE" dirty="0" smtClean="0"/>
-              <a:t>ALCANCES</a:t>
-            </a:r>
-            <a:endParaRPr lang="es-PE" dirty="0"/>
-          </a:p>
-        </p:txBody>
-      </p:sp>
-      <p:sp>
-        <p:nvSpPr>
-          <p:cNvPr id="3" name="2 Marcador de contenido"/>
-          <p:cNvSpPr>
-            <a:spLocks noGrp="1"/>
-          </p:cNvSpPr>
-          <p:nvPr>
-            <p:ph idx="1"/>
-          </p:nvPr>
-        </p:nvSpPr>
-        <p:spPr>
-          <a:xfrm>
-            <a:off x="838200" y="1700808"/>
-            <a:ext cx="7467600" cy="4248472"/>
-          </a:xfrm>
-        </p:spPr>
-        <p:txBody>
-          <a:bodyPr>
-            <a:normAutofit/>
-          </a:bodyPr>
-          <a:lstStyle/>
-          <a:p>
-            <a:pPr algn="just"/>
-            <a:r>
-              <a:rPr lang="es-PE" dirty="0" smtClean="0"/>
-              <a:t>Se investigará sobre las diferentes técnicas y herramientas informáticas usadas para el aprendizaje colaborativo.</a:t>
-            </a:r>
-          </a:p>
-          <a:p>
-            <a:pPr algn="just"/>
-            <a:r>
-              <a:rPr lang="es-PE" dirty="0" smtClean="0"/>
-              <a:t>Se investigará sobre los diferentes </a:t>
-            </a:r>
-            <a:r>
-              <a:rPr lang="es-PE" dirty="0" err="1" smtClean="0"/>
-              <a:t>frameworks</a:t>
-            </a:r>
-            <a:r>
-              <a:rPr lang="es-PE" dirty="0" smtClean="0"/>
-              <a:t> para aplicaciones web de tiempo real.</a:t>
-            </a:r>
-          </a:p>
-          <a:p>
-            <a:pPr algn="just"/>
-            <a:r>
-              <a:rPr lang="es-PE" dirty="0" smtClean="0"/>
-              <a:t>Se evaluará el sistema a desarrollar en base a las métricas definidas.</a:t>
-            </a:r>
-          </a:p>
-          <a:p>
-            <a:pPr algn="just"/>
-            <a:r>
-              <a:rPr lang="es-PE" dirty="0" smtClean="0"/>
-              <a:t>Se implementará el sistema en la FISI.</a:t>
-            </a:r>
-            <a:endParaRPr lang="es-PE" dirty="0"/>
-          </a:p>
-        </p:txBody>
-      </p:sp>
-    </p:spTree>
-    <p:extLst>
-      <p:ext uri="{BB962C8B-B14F-4D97-AF65-F5344CB8AC3E}">
-        <p14:creationId xmlns:p14="http://schemas.microsoft.com/office/powerpoint/2010/main" val="172080525"/>
-      </p:ext>
-    </p:extLst>
-  </p:cSld>
-  <p:clrMapOvr>
-    <a:masterClrMapping/>
-  </p:clrMapOvr>
-  <p:timing>
-    <p:tnLst>
-      <p:par>
-        <p:cTn id="1" dur="indefinite" restart="never" nodeType="tmRoot"/>
-      </p:par>
-    </p:tnLst>
-  </p:timing>
-</p:sld>
-</file>
-
-<file path=ppt/slides/slide12.xml><?xml version="1.0" encoding="utf-8"?>
-<p:sld xmlns:a="http://schemas.openxmlformats.org/drawingml/2006/main" xmlns:r="http://schemas.openxmlformats.org/officeDocument/2006/relationships" xmlns:p="http://schemas.openxmlformats.org/presentationml/2006/main">
-  <p:cSld>
-    <p:spTree>
-      <p:nvGrpSpPr>
-        <p:cNvPr id="1" name=""/>
-        <p:cNvGrpSpPr/>
-        <p:nvPr/>
-      </p:nvGrpSpPr>
-      <p:grpSpPr>
-        <a:xfrm>
-          <a:off x="0" y="0"/>
-          <a:ext cx="0" cy="0"/>
-          <a:chOff x="0" y="0"/>
-          <a:chExt cx="0" cy="0"/>
-        </a:xfrm>
-      </p:grpSpPr>
-      <p:pic>
-        <p:nvPicPr>
-          <p:cNvPr id="5122" name="Picture 2" descr="http://www.posicionamiento-eficaz.org/blog/wp-content/uploads/definiciones-rrpp1.jpg"/>
-          <p:cNvPicPr>
-            <a:picLocks noChangeAspect="1" noChangeArrowheads="1"/>
-          </p:cNvPicPr>
-          <p:nvPr/>
-        </p:nvPicPr>
-        <p:blipFill>
-          <a:blip r:embed="rId2">
-            <a:extLst>
-              <a:ext uri="{28A0092B-C50C-407E-A947-70E740481C1C}">
-                <a14:useLocalDpi xmlns:a14="http://schemas.microsoft.com/office/drawing/2010/main" val="0"/>
-              </a:ext>
-            </a:extLst>
-          </a:blip>
-          <a:srcRect/>
-          <a:stretch>
-            <a:fillRect/>
-          </a:stretch>
-        </p:blipFill>
-        <p:spPr bwMode="auto">
-          <a:xfrm>
-            <a:off x="4371319" y="1484784"/>
-            <a:ext cx="4261470" cy="4810104"/>
-          </a:xfrm>
-          <a:prstGeom prst="rect">
-            <a:avLst/>
-          </a:prstGeom>
-          <a:noFill/>
-          <a:extLst>
-            <a:ext uri="{909E8E84-426E-40DD-AFC4-6F175D3DCCD1}">
-              <a14:hiddenFill xmlns:a14="http://schemas.microsoft.com/office/drawing/2010/main">
-                <a:solidFill>
-                  <a:srgbClr val="FFFFFF"/>
-                </a:solidFill>
-              </a14:hiddenFill>
-            </a:ext>
-          </a:extLst>
-        </p:spPr>
-      </p:pic>
-      <p:sp>
-        <p:nvSpPr>
-          <p:cNvPr id="2" name="1 Título"/>
-          <p:cNvSpPr>
-            <a:spLocks noGrp="1"/>
-          </p:cNvSpPr>
-          <p:nvPr>
-            <p:ph type="title"/>
-          </p:nvPr>
-        </p:nvSpPr>
-        <p:spPr/>
-        <p:txBody>
-          <a:bodyPr/>
-          <a:lstStyle/>
-          <a:p>
-            <a:r>
-              <a:rPr lang="es-PE" dirty="0" smtClean="0"/>
-              <a:t>MARCO TEÓRICO</a:t>
-            </a:r>
-            <a:endParaRPr lang="es-PE" dirty="0"/>
-          </a:p>
-        </p:txBody>
-      </p:sp>
-      <p:sp>
-        <p:nvSpPr>
-          <p:cNvPr id="3" name="2 Marcador de texto"/>
-          <p:cNvSpPr>
-            <a:spLocks noGrp="1"/>
-          </p:cNvSpPr>
-          <p:nvPr>
-            <p:ph type="body" idx="1"/>
-          </p:nvPr>
-        </p:nvSpPr>
-        <p:spPr/>
-        <p:txBody>
-          <a:bodyPr/>
-          <a:lstStyle/>
-          <a:p>
-            <a:r>
-              <a:rPr lang="es-PE" dirty="0" smtClean="0"/>
-              <a:t>CAPÍTULO 2</a:t>
-            </a:r>
-            <a:endParaRPr lang="es-PE" dirty="0"/>
-          </a:p>
-        </p:txBody>
-      </p:sp>
-    </p:spTree>
-    <p:extLst>
-      <p:ext uri="{BB962C8B-B14F-4D97-AF65-F5344CB8AC3E}">
-        <p14:creationId xmlns:p14="http://schemas.microsoft.com/office/powerpoint/2010/main" val="204655190"/>
-      </p:ext>
-    </p:extLst>
-  </p:cSld>
-  <p:clrMapOvr>
-    <a:masterClrMapping/>
-  </p:clrMapOvr>
-  <p:timing>
-    <p:tnLst>
-      <p:par>
-        <p:cTn id="1" dur="indefinite" restart="never" nodeType="tmRoot"/>
-      </p:par>
-    </p:tnLst>
-  </p:timing>
-</p:sld>
-</file>
-
-<file path=ppt/slides/slide13.xml><?xml version="1.0" encoding="utf-8"?>
-<p:sld xmlns:a="http://schemas.openxmlformats.org/drawingml/2006/main" xmlns:r="http://schemas.openxmlformats.org/officeDocument/2006/relationships" xmlns:p="http://schemas.openxmlformats.org/presentationml/2006/main">
-  <p:cSld>
-    <p:spTree>
-      <p:nvGrpSpPr>
-        <p:cNvPr id="1" name=""/>
-        <p:cNvGrpSpPr/>
-        <p:nvPr/>
-      </p:nvGrpSpPr>
-      <p:grpSpPr>
-        <a:xfrm>
-          <a:off x="0" y="0"/>
-          <a:ext cx="0" cy="0"/>
-          <a:chOff x="0" y="0"/>
-          <a:chExt cx="0" cy="0"/>
-        </a:xfrm>
-      </p:grpSpPr>
-      <p:pic>
-        <p:nvPicPr>
           <p:cNvPr id="11266" name="Picture 2" descr="http://3.bp.blogspot.com/_g3e4bTfebGw/TGd6hr3D8KI/AAAAAAAAAFo/lYWLN3tP73A/s1600/aprendizaje+colaborativo.jpg"/>
           <p:cNvPicPr>
             <a:picLocks noChangeAspect="1" noChangeArrowheads="1"/>
@@ -9697,7 +9151,7 @@
         </p:spPr>
         <p:txBody>
           <a:bodyPr>
-            <a:normAutofit fontScale="92500" lnSpcReduction="10000"/>
+            <a:normAutofit lnSpcReduction="10000"/>
           </a:bodyPr>
           <a:lstStyle/>
           <a:p>
@@ -9711,11 +9165,7 @@
             <a:pPr algn="just"/>
             <a:r>
               <a:rPr lang="es-PE" dirty="0" smtClean="0"/>
-              <a:t>Elementos en el aprendizaje </a:t>
-            </a:r>
-            <a:r>
-              <a:rPr lang="es-PE" dirty="0" smtClean="0"/>
-              <a:t>colaborativo</a:t>
+              <a:t>Elementos en el aprendizaje colaborativo</a:t>
             </a:r>
           </a:p>
           <a:p>
@@ -9740,17 +9190,12 @@
               <a:rPr lang="es-PE" dirty="0" smtClean="0"/>
               <a:t>, responsabilidad individual, habilidades sociales, autoevaluación.</a:t>
             </a:r>
-            <a:endParaRPr lang="es-PE" dirty="0" smtClean="0"/>
           </a:p>
           <a:p>
             <a:pPr algn="just"/>
             <a:r>
               <a:rPr lang="es-PE" dirty="0" smtClean="0"/>
-              <a:t>Beneficios del aprendizaje </a:t>
-            </a:r>
-            <a:r>
-              <a:rPr lang="es-PE" dirty="0" smtClean="0"/>
-              <a:t>colaborativo</a:t>
+              <a:t>Beneficios del aprendizaje colaborativo</a:t>
             </a:r>
           </a:p>
           <a:p>
@@ -9759,7 +9204,6 @@
               <a:rPr lang="es-PE" dirty="0" smtClean="0"/>
               <a:t>Sociales, psicológicos,  académicos</a:t>
             </a:r>
-            <a:endParaRPr lang="es-PE" dirty="0" smtClean="0"/>
           </a:p>
           <a:p>
             <a:pPr algn="just"/>
@@ -9789,17 +9233,14 @@
             </a:r>
           </a:p>
           <a:p>
-            <a:pPr lvl="1" algn="just"/>
+            <a:pPr algn="just"/>
             <a:r>
               <a:rPr lang="es-PE" dirty="0" smtClean="0"/>
-              <a:t>El estudio de casos</a:t>
-            </a:r>
-          </a:p>
-          <a:p>
-            <a:pPr algn="just"/>
+              <a:t>Tecnologías </a:t>
+            </a:r>
             <a:r>
               <a:rPr lang="es-PE" dirty="0" smtClean="0"/>
-              <a:t>Tecnologías web</a:t>
+              <a:t>web</a:t>
             </a:r>
             <a:endParaRPr lang="es-PE" dirty="0"/>
           </a:p>
@@ -9829,7 +9270,7 @@
 </p:sld>
 </file>
 
-<file path=ppt/slides/slide14.xml><?xml version="1.0" encoding="utf-8"?>
+<file path=ppt/slides/slide11.xml><?xml version="1.0" encoding="utf-8"?>
 <p:sld xmlns:a="http://schemas.openxmlformats.org/drawingml/2006/main" xmlns:r="http://schemas.openxmlformats.org/officeDocument/2006/relationships" xmlns:p="http://schemas.openxmlformats.org/presentationml/2006/main">
   <p:cSld>
     <p:spTree>
@@ -9960,7 +9401,7 @@
 </p:sld>
 </file>
 
-<file path=ppt/slides/slide15.xml><?xml version="1.0" encoding="utf-8"?>
+<file path=ppt/slides/slide12.xml><?xml version="1.0" encoding="utf-8"?>
 <p:sld xmlns:a="http://schemas.openxmlformats.org/drawingml/2006/main" xmlns:r="http://schemas.openxmlformats.org/officeDocument/2006/relationships" xmlns:p="http://schemas.openxmlformats.org/presentationml/2006/main">
   <p:cSld>
     <p:spTree>
@@ -10079,7 +9520,7 @@
 </p:sld>
 </file>
 
-<file path=ppt/slides/slide16.xml><?xml version="1.0" encoding="utf-8"?>
+<file path=ppt/slides/slide13.xml><?xml version="1.0" encoding="utf-8"?>
 <p:sld xmlns:a="http://schemas.openxmlformats.org/drawingml/2006/main" xmlns:r="http://schemas.openxmlformats.org/officeDocument/2006/relationships" xmlns:p="http://schemas.openxmlformats.org/presentationml/2006/main">
   <p:cSld>
     <p:spTree>
@@ -10198,7 +9639,7 @@
 </p:sld>
 </file>
 
-<file path=ppt/slides/slide17.xml><?xml version="1.0" encoding="utf-8"?>
+<file path=ppt/slides/slide14.xml><?xml version="1.0" encoding="utf-8"?>
 <p:sld xmlns:a="http://schemas.openxmlformats.org/drawingml/2006/main" xmlns:r="http://schemas.openxmlformats.org/officeDocument/2006/relationships" xmlns:p="http://schemas.openxmlformats.org/presentationml/2006/main">
   <p:cSld>
     <p:spTree>
@@ -10317,7 +9758,7 @@
 </p:sld>
 </file>
 
-<file path=ppt/slides/slide18.xml><?xml version="1.0" encoding="utf-8"?>
+<file path=ppt/slides/slide15.xml><?xml version="1.0" encoding="utf-8"?>
 <p:sld xmlns:a="http://schemas.openxmlformats.org/drawingml/2006/main" xmlns:r="http://schemas.openxmlformats.org/officeDocument/2006/relationships" xmlns:p="http://schemas.openxmlformats.org/presentationml/2006/main">
   <p:cSld>
     <p:spTree>
@@ -10435,7 +9876,7 @@
 </p:sld>
 </file>
 
-<file path=ppt/slides/slide19.xml><?xml version="1.0" encoding="utf-8"?>
+<file path=ppt/slides/slide16.xml><?xml version="1.0" encoding="utf-8"?>
 <p:sld xmlns:a="http://schemas.openxmlformats.org/drawingml/2006/main" xmlns:r="http://schemas.openxmlformats.org/officeDocument/2006/relationships" xmlns:p="http://schemas.openxmlformats.org/presentationml/2006/main">
   <p:cSld>
     <p:spTree>
@@ -10949,6 +10390,419 @@
     <p:extLst>
       <p:ext uri="{BB962C8B-B14F-4D97-AF65-F5344CB8AC3E}">
         <p14:creationId xmlns:p14="http://schemas.microsoft.com/office/powerpoint/2010/main" val="3144462150"/>
+      </p:ext>
+    </p:extLst>
+  </p:cSld>
+  <p:clrMapOvr>
+    <a:masterClrMapping/>
+  </p:clrMapOvr>
+  <p:timing>
+    <p:tnLst>
+      <p:par>
+        <p:cTn id="1" dur="indefinite" restart="never" nodeType="tmRoot"/>
+      </p:par>
+    </p:tnLst>
+  </p:timing>
+</p:sld>
+</file>
+
+<file path=ppt/slides/slide17.xml><?xml version="1.0" encoding="utf-8"?>
+<p:sld xmlns:a="http://schemas.openxmlformats.org/drawingml/2006/main" xmlns:r="http://schemas.openxmlformats.org/officeDocument/2006/relationships" xmlns:p="http://schemas.openxmlformats.org/presentationml/2006/main">
+  <p:cSld>
+    <p:spTree>
+      <p:nvGrpSpPr>
+        <p:cNvPr id="1" name=""/>
+        <p:cNvGrpSpPr/>
+        <p:nvPr/>
+      </p:nvGrpSpPr>
+      <p:grpSpPr>
+        <a:xfrm>
+          <a:off x="0" y="0"/>
+          <a:ext cx="0" cy="0"/>
+          <a:chOff x="0" y="0"/>
+          <a:chExt cx="0" cy="0"/>
+        </a:xfrm>
+      </p:grpSpPr>
+      <p:sp>
+        <p:nvSpPr>
+          <p:cNvPr id="2" name="1 Título"/>
+          <p:cNvSpPr>
+            <a:spLocks noGrp="1"/>
+          </p:cNvSpPr>
+          <p:nvPr>
+            <p:ph type="title"/>
+          </p:nvPr>
+        </p:nvSpPr>
+        <p:spPr>
+          <a:xfrm>
+            <a:off x="551280" y="476672"/>
+            <a:ext cx="8041440" cy="826501"/>
+          </a:xfrm>
+        </p:spPr>
+        <p:txBody>
+          <a:bodyPr/>
+          <a:lstStyle/>
+          <a:p>
+            <a:r>
+              <a:rPr lang="es-PE" dirty="0" smtClean="0"/>
+              <a:t>Referencias</a:t>
+            </a:r>
+            <a:endParaRPr lang="es-PE" dirty="0"/>
+          </a:p>
+        </p:txBody>
+      </p:sp>
+      <p:sp>
+        <p:nvSpPr>
+          <p:cNvPr id="3" name="2 Marcador de contenido"/>
+          <p:cNvSpPr>
+            <a:spLocks noGrp="1"/>
+          </p:cNvSpPr>
+          <p:nvPr>
+            <p:ph idx="1"/>
+          </p:nvPr>
+        </p:nvSpPr>
+        <p:spPr>
+          <a:xfrm>
+            <a:off x="838200" y="1412776"/>
+            <a:ext cx="7467600" cy="4576949"/>
+          </a:xfrm>
+        </p:spPr>
+        <p:txBody>
+          <a:bodyPr>
+            <a:normAutofit/>
+          </a:bodyPr>
+          <a:lstStyle/>
+          <a:p>
+            <a:pPr algn="just"/>
+            <a:r>
+              <a:rPr lang="es-PE" sz="1500" dirty="0" err="1"/>
+              <a:t>Knobelsdorf</a:t>
+            </a:r>
+            <a:r>
+              <a:rPr lang="es-PE" sz="1500" dirty="0"/>
+              <a:t>, M., </a:t>
+            </a:r>
+            <a:r>
+              <a:rPr lang="es-PE" sz="1500" dirty="0" err="1"/>
+              <a:t>Kreitz</a:t>
+            </a:r>
+            <a:r>
+              <a:rPr lang="es-PE" sz="1500" dirty="0"/>
+              <a:t>, C., &amp; </a:t>
+            </a:r>
+            <a:r>
+              <a:rPr lang="es-PE" sz="1500" dirty="0" err="1"/>
+              <a:t>Bohne</a:t>
+            </a:r>
+            <a:r>
+              <a:rPr lang="es-PE" sz="1500" dirty="0"/>
+              <a:t>, S. (2014). </a:t>
+            </a:r>
+            <a:r>
+              <a:rPr lang="es-PE" sz="1500" dirty="0" err="1"/>
+              <a:t>Teaching</a:t>
+            </a:r>
+            <a:r>
+              <a:rPr lang="es-PE" sz="1500" dirty="0"/>
+              <a:t> </a:t>
+            </a:r>
+            <a:r>
+              <a:rPr lang="es-PE" sz="1500" dirty="0" err="1"/>
+              <a:t>theoretical</a:t>
+            </a:r>
+            <a:r>
+              <a:rPr lang="es-PE" sz="1500" dirty="0"/>
+              <a:t> </a:t>
+            </a:r>
+            <a:r>
+              <a:rPr lang="es-PE" sz="1500" dirty="0" err="1" smtClean="0"/>
+              <a:t>computer</a:t>
+            </a:r>
+            <a:r>
+              <a:rPr lang="es-PE" sz="1500" dirty="0" smtClean="0"/>
+              <a:t> </a:t>
+            </a:r>
+            <a:r>
+              <a:rPr lang="en-US" sz="1500" dirty="0" smtClean="0"/>
+              <a:t>science </a:t>
+            </a:r>
+            <a:r>
+              <a:rPr lang="en-US" sz="1500" dirty="0"/>
+              <a:t>using a cognitive apprenticeship approach. In </a:t>
+            </a:r>
+            <a:r>
+              <a:rPr lang="en-US" sz="1500" dirty="0" smtClean="0"/>
+              <a:t>Proceedings of </a:t>
+            </a:r>
+            <a:r>
+              <a:rPr lang="en-US" sz="1500" dirty="0"/>
+              <a:t>the 45th ACM technical symposium on computer science </a:t>
+            </a:r>
+            <a:r>
+              <a:rPr lang="en-US" sz="1500" dirty="0" smtClean="0"/>
+              <a:t>education </a:t>
+            </a:r>
+            <a:r>
+              <a:rPr lang="es-PE" sz="1500" dirty="0" smtClean="0"/>
+              <a:t>(</a:t>
+            </a:r>
+            <a:r>
+              <a:rPr lang="es-PE" sz="1500" dirty="0"/>
+              <a:t>p. </a:t>
+            </a:r>
+            <a:r>
+              <a:rPr lang="es-PE" sz="1500" dirty="0" smtClean="0"/>
+              <a:t>67 - 72).</a:t>
+            </a:r>
+          </a:p>
+          <a:p>
+            <a:pPr algn="just"/>
+            <a:r>
+              <a:rPr lang="en-US" sz="1500" dirty="0"/>
+              <a:t>Martinez, A., &amp; Camacho, A. (2011). A cooperative learning-based </a:t>
+            </a:r>
+            <a:r>
+              <a:rPr lang="en-US" sz="1500" dirty="0" smtClean="0"/>
+              <a:t>strategy for </a:t>
+            </a:r>
+            <a:r>
+              <a:rPr lang="en-US" sz="1500" dirty="0"/>
+              <a:t>teaching relational algebra. In Proceedings of the 16th annual </a:t>
+            </a:r>
+            <a:r>
+              <a:rPr lang="en-US" sz="1500" dirty="0" smtClean="0"/>
+              <a:t>joint conference </a:t>
+            </a:r>
+            <a:r>
+              <a:rPr lang="en-US" sz="1500" dirty="0"/>
+              <a:t>on innovation and technology in computer science </a:t>
+            </a:r>
+            <a:r>
+              <a:rPr lang="en-US" sz="1500" dirty="0" smtClean="0"/>
+              <a:t>education </a:t>
+            </a:r>
+            <a:r>
+              <a:rPr lang="nn-NO" sz="1500" dirty="0" smtClean="0"/>
+              <a:t>(</a:t>
+            </a:r>
+            <a:r>
+              <a:rPr lang="nn-NO" sz="1500" dirty="0"/>
+              <a:t>p. 263{267). New York, NY, USA: ACM</a:t>
+            </a:r>
+            <a:r>
+              <a:rPr lang="nn-NO" sz="1500" dirty="0" smtClean="0"/>
+              <a:t>.</a:t>
+            </a:r>
+          </a:p>
+          <a:p>
+            <a:pPr algn="just"/>
+            <a:r>
+              <a:rPr lang="en-US" sz="1500" dirty="0"/>
+              <a:t>Cliburn, D. C. (2014, May). Team-based learning in a data structures course</a:t>
+            </a:r>
+            <a:r>
+              <a:rPr lang="en-US" sz="1500" dirty="0" smtClean="0"/>
+              <a:t>. </a:t>
+            </a:r>
+            <a:r>
+              <a:rPr lang="it-IT" sz="1500" dirty="0" smtClean="0"/>
+              <a:t>J</a:t>
+            </a:r>
+            <a:r>
+              <a:rPr lang="it-IT" sz="1500" dirty="0"/>
+              <a:t>. Comput. Sci. Coll., 29 (5), </a:t>
+            </a:r>
+            <a:r>
+              <a:rPr lang="it-IT" sz="1500" dirty="0" smtClean="0"/>
+              <a:t>194 - 201</a:t>
+            </a:r>
+            <a:r>
+              <a:rPr lang="it-IT" sz="1500" dirty="0"/>
+              <a:t>.</a:t>
+            </a:r>
+            <a:endParaRPr lang="en-US" sz="1500" dirty="0" smtClean="0"/>
+          </a:p>
+          <a:p>
+            <a:pPr algn="just"/>
+            <a:r>
+              <a:rPr lang="en-US" sz="1500" dirty="0" err="1" smtClean="0"/>
+              <a:t>Buhr</a:t>
+            </a:r>
+            <a:r>
+              <a:rPr lang="en-US" sz="1500" dirty="0"/>
+              <a:t>, G. T., Hein, M. T., White, H. K., &amp; </a:t>
+            </a:r>
+            <a:r>
+              <a:rPr lang="en-US" sz="1500" dirty="0" err="1"/>
+              <a:t>Pinheiro</a:t>
+            </a:r>
+            <a:r>
+              <a:rPr lang="en-US" sz="1500" dirty="0"/>
+              <a:t>, S. O. (2014). Using </a:t>
+            </a:r>
+            <a:r>
+              <a:rPr lang="en-US" sz="1500" dirty="0" smtClean="0"/>
+              <a:t>the jigsaw </a:t>
+            </a:r>
+            <a:r>
+              <a:rPr lang="en-US" sz="1500" dirty="0"/>
+              <a:t>cooperative learning method to teach medical students </a:t>
+            </a:r>
+            <a:r>
+              <a:rPr lang="en-US" sz="1500" dirty="0" smtClean="0"/>
+              <a:t>about long-term </a:t>
+            </a:r>
+            <a:r>
+              <a:rPr lang="en-US" sz="1500" dirty="0"/>
+              <a:t>and </a:t>
+            </a:r>
+            <a:r>
+              <a:rPr lang="en-US" sz="1500" dirty="0" err="1"/>
+              <a:t>postacute</a:t>
+            </a:r>
+            <a:r>
+              <a:rPr lang="en-US" sz="1500" dirty="0"/>
+              <a:t> care. Journal of the American Medical </a:t>
+            </a:r>
+            <a:r>
+              <a:rPr lang="en-US" sz="1500" dirty="0" smtClean="0"/>
+              <a:t>Directors </a:t>
+            </a:r>
+            <a:r>
+              <a:rPr lang="en-US" sz="1500" dirty="0"/>
+              <a:t>Association, 15 (6), 429 - 434. </a:t>
+            </a:r>
+            <a:endParaRPr lang="en-US" sz="1500" dirty="0" smtClean="0"/>
+          </a:p>
+          <a:p>
+            <a:pPr algn="just"/>
+            <a:r>
+              <a:rPr lang="de-DE" sz="1500" dirty="0"/>
+              <a:t>Miller, R. C., Zhang, H., Gilbert, E., &amp; Gerber, E. (2014). Pair research</a:t>
+            </a:r>
+            <a:r>
+              <a:rPr lang="de-DE" sz="1500" dirty="0" smtClean="0"/>
+              <a:t>: </a:t>
+            </a:r>
+            <a:r>
+              <a:rPr lang="en-US" sz="1500" dirty="0" smtClean="0"/>
+              <a:t>Matching </a:t>
+            </a:r>
+            <a:r>
+              <a:rPr lang="en-US" sz="1500" dirty="0"/>
+              <a:t>people for collaboration, learning, and productivity. In </a:t>
+            </a:r>
+            <a:r>
+              <a:rPr lang="en-US" sz="1500" dirty="0" smtClean="0"/>
+              <a:t>Proceedings </a:t>
+            </a:r>
+            <a:r>
+              <a:rPr lang="en-US" sz="1500" dirty="0"/>
+              <a:t>of the 17th ACM conference on computer supported </a:t>
+            </a:r>
+            <a:r>
+              <a:rPr lang="en-US" sz="1500" dirty="0" smtClean="0"/>
+              <a:t>cooperative </a:t>
+            </a:r>
+            <a:r>
+              <a:rPr lang="en-US" sz="1500" dirty="0"/>
+              <a:t>work; social computing (p. </a:t>
+            </a:r>
+            <a:r>
+              <a:rPr lang="en-US" sz="1500" dirty="0" smtClean="0"/>
+              <a:t>1043-1048</a:t>
+            </a:r>
+            <a:r>
+              <a:rPr lang="en-US" sz="1500" dirty="0"/>
+              <a:t>). New York, NY, </a:t>
+            </a:r>
+            <a:r>
+              <a:rPr lang="en-US" sz="1500" dirty="0" smtClean="0"/>
+              <a:t>USA: ACM</a:t>
+            </a:r>
+            <a:r>
+              <a:rPr lang="en-US" sz="1500" dirty="0"/>
+              <a:t>. </a:t>
+            </a:r>
+            <a:endParaRPr lang="en-US" sz="1500" dirty="0" smtClean="0"/>
+          </a:p>
+          <a:p>
+            <a:pPr algn="just"/>
+            <a:r>
+              <a:rPr lang="en-US" sz="1500" dirty="0" err="1"/>
+              <a:t>Lipman</a:t>
+            </a:r>
+            <a:r>
+              <a:rPr lang="en-US" sz="1500" dirty="0"/>
+              <a:t>, D. (2014, June). </a:t>
+            </a:r>
+            <a:r>
+              <a:rPr lang="en-US" sz="1500" dirty="0" err="1"/>
+              <a:t>LearnCS</a:t>
+            </a:r>
+            <a:r>
+              <a:rPr lang="en-US" sz="1500" dirty="0"/>
+              <a:t>!: a new, browser-based c </a:t>
+            </a:r>
+            <a:r>
+              <a:rPr lang="en-US" sz="1500" dirty="0" smtClean="0"/>
+              <a:t>programming </a:t>
+            </a:r>
+            <a:r>
+              <a:rPr lang="es-PE" sz="1500" dirty="0" err="1" smtClean="0"/>
+              <a:t>environment</a:t>
+            </a:r>
+            <a:r>
+              <a:rPr lang="es-PE" sz="1500" dirty="0" smtClean="0"/>
+              <a:t> </a:t>
+            </a:r>
+            <a:r>
+              <a:rPr lang="es-PE" sz="1500" dirty="0" err="1"/>
+              <a:t>for</a:t>
+            </a:r>
+            <a:r>
+              <a:rPr lang="es-PE" sz="1500" dirty="0"/>
+              <a:t> CS1. J. </a:t>
+            </a:r>
+            <a:r>
+              <a:rPr lang="es-PE" sz="1500" dirty="0" err="1"/>
+              <a:t>Comput</a:t>
+            </a:r>
+            <a:r>
+              <a:rPr lang="es-PE" sz="1500" dirty="0"/>
+              <a:t>. </a:t>
+            </a:r>
+            <a:r>
+              <a:rPr lang="es-PE" sz="1500" dirty="0" err="1"/>
+              <a:t>Sci</a:t>
+            </a:r>
+            <a:r>
+              <a:rPr lang="es-PE" sz="1500" dirty="0"/>
+              <a:t>. </a:t>
+            </a:r>
+            <a:r>
+              <a:rPr lang="es-PE" sz="1500" dirty="0" err="1"/>
+              <a:t>Coll</a:t>
+            </a:r>
+            <a:r>
+              <a:rPr lang="es-PE" sz="1500" dirty="0"/>
+              <a:t>., 29 (6), </a:t>
+            </a:r>
+            <a:r>
+              <a:rPr lang="es-PE" sz="1500" dirty="0" smtClean="0"/>
+              <a:t>144 -150</a:t>
+            </a:r>
+            <a:r>
+              <a:rPr lang="es-PE" sz="1500" dirty="0"/>
+              <a:t>. </a:t>
+            </a:r>
+          </a:p>
+        </p:txBody>
+      </p:sp>
+    </p:spTree>
+    <p:extLst>
+      <p:ext uri="{BB962C8B-B14F-4D97-AF65-F5344CB8AC3E}">
+        <p14:creationId xmlns:p14="http://schemas.microsoft.com/office/powerpoint/2010/main" val="3204853567"/>
       </p:ext>
     </p:extLst>
   </p:cSld>
@@ -11082,420 +10936,6 @@
     <p:extLst>
       <p:ext uri="{BB962C8B-B14F-4D97-AF65-F5344CB8AC3E}">
         <p14:creationId xmlns:p14="http://schemas.microsoft.com/office/powerpoint/2010/main" val="2528110842"/>
-      </p:ext>
-    </p:extLst>
-  </p:cSld>
-  <p:clrMapOvr>
-    <a:masterClrMapping/>
-  </p:clrMapOvr>
-  <p:timing>
-    <p:tnLst>
-      <p:par>
-        <p:cTn id="1" dur="indefinite" restart="never" nodeType="tmRoot"/>
-      </p:par>
-    </p:tnLst>
-  </p:timing>
-</p:sld>
-</file>
-
-<file path=ppt/slides/slide20.xml><?xml version="1.0" encoding="utf-8"?>
-<p:sld xmlns:a="http://schemas.openxmlformats.org/drawingml/2006/main" xmlns:r="http://schemas.openxmlformats.org/officeDocument/2006/relationships" xmlns:p="http://schemas.openxmlformats.org/presentationml/2006/main">
-  <p:cSld>
-    <p:spTree>
-      <p:nvGrpSpPr>
-        <p:cNvPr id="1" name=""/>
-        <p:cNvGrpSpPr/>
-        <p:nvPr/>
-      </p:nvGrpSpPr>
-      <p:grpSpPr>
-        <a:xfrm>
-          <a:off x="0" y="0"/>
-          <a:ext cx="0" cy="0"/>
-          <a:chOff x="0" y="0"/>
-          <a:chExt cx="0" cy="0"/>
-        </a:xfrm>
-      </p:grpSpPr>
-      <p:sp>
-        <p:nvSpPr>
-          <p:cNvPr id="2" name="1 Título"/>
-          <p:cNvSpPr>
-            <a:spLocks noGrp="1"/>
-          </p:cNvSpPr>
-          <p:nvPr>
-            <p:ph type="title"/>
-          </p:nvPr>
-        </p:nvSpPr>
-        <p:spPr>
-          <a:xfrm>
-            <a:off x="551280" y="476672"/>
-            <a:ext cx="8041440" cy="826501"/>
-          </a:xfrm>
-        </p:spPr>
-        <p:txBody>
-          <a:bodyPr/>
-          <a:lstStyle/>
-          <a:p>
-            <a:r>
-              <a:rPr lang="es-PE" dirty="0" smtClean="0"/>
-              <a:t>Referencias</a:t>
-            </a:r>
-            <a:endParaRPr lang="es-PE" dirty="0"/>
-          </a:p>
-        </p:txBody>
-      </p:sp>
-      <p:sp>
-        <p:nvSpPr>
-          <p:cNvPr id="3" name="2 Marcador de contenido"/>
-          <p:cNvSpPr>
-            <a:spLocks noGrp="1"/>
-          </p:cNvSpPr>
-          <p:nvPr>
-            <p:ph idx="1"/>
-          </p:nvPr>
-        </p:nvSpPr>
-        <p:spPr>
-          <a:xfrm>
-            <a:off x="838200" y="1412776"/>
-            <a:ext cx="7467600" cy="4576949"/>
-          </a:xfrm>
-        </p:spPr>
-        <p:txBody>
-          <a:bodyPr>
-            <a:normAutofit/>
-          </a:bodyPr>
-          <a:lstStyle/>
-          <a:p>
-            <a:pPr algn="just"/>
-            <a:r>
-              <a:rPr lang="es-PE" sz="1500" dirty="0" err="1"/>
-              <a:t>Knobelsdorf</a:t>
-            </a:r>
-            <a:r>
-              <a:rPr lang="es-PE" sz="1500" dirty="0"/>
-              <a:t>, M., </a:t>
-            </a:r>
-            <a:r>
-              <a:rPr lang="es-PE" sz="1500" dirty="0" err="1"/>
-              <a:t>Kreitz</a:t>
-            </a:r>
-            <a:r>
-              <a:rPr lang="es-PE" sz="1500" dirty="0"/>
-              <a:t>, C., &amp; </a:t>
-            </a:r>
-            <a:r>
-              <a:rPr lang="es-PE" sz="1500" dirty="0" err="1"/>
-              <a:t>Bohne</a:t>
-            </a:r>
-            <a:r>
-              <a:rPr lang="es-PE" sz="1500" dirty="0"/>
-              <a:t>, S. (2014). </a:t>
-            </a:r>
-            <a:r>
-              <a:rPr lang="es-PE" sz="1500" dirty="0" err="1"/>
-              <a:t>Teaching</a:t>
-            </a:r>
-            <a:r>
-              <a:rPr lang="es-PE" sz="1500" dirty="0"/>
-              <a:t> </a:t>
-            </a:r>
-            <a:r>
-              <a:rPr lang="es-PE" sz="1500" dirty="0" err="1"/>
-              <a:t>theoretical</a:t>
-            </a:r>
-            <a:r>
-              <a:rPr lang="es-PE" sz="1500" dirty="0"/>
-              <a:t> </a:t>
-            </a:r>
-            <a:r>
-              <a:rPr lang="es-PE" sz="1500" dirty="0" err="1" smtClean="0"/>
-              <a:t>computer</a:t>
-            </a:r>
-            <a:r>
-              <a:rPr lang="es-PE" sz="1500" dirty="0" smtClean="0"/>
-              <a:t> </a:t>
-            </a:r>
-            <a:r>
-              <a:rPr lang="en-US" sz="1500" dirty="0" smtClean="0"/>
-              <a:t>science </a:t>
-            </a:r>
-            <a:r>
-              <a:rPr lang="en-US" sz="1500" dirty="0"/>
-              <a:t>using a cognitive apprenticeship approach. In </a:t>
-            </a:r>
-            <a:r>
-              <a:rPr lang="en-US" sz="1500" dirty="0" smtClean="0"/>
-              <a:t>Proceedings of </a:t>
-            </a:r>
-            <a:r>
-              <a:rPr lang="en-US" sz="1500" dirty="0"/>
-              <a:t>the 45th ACM technical symposium on computer science </a:t>
-            </a:r>
-            <a:r>
-              <a:rPr lang="en-US" sz="1500" dirty="0" smtClean="0"/>
-              <a:t>education </a:t>
-            </a:r>
-            <a:r>
-              <a:rPr lang="es-PE" sz="1500" dirty="0" smtClean="0"/>
-              <a:t>(</a:t>
-            </a:r>
-            <a:r>
-              <a:rPr lang="es-PE" sz="1500" dirty="0"/>
-              <a:t>p. </a:t>
-            </a:r>
-            <a:r>
-              <a:rPr lang="es-PE" sz="1500" dirty="0" smtClean="0"/>
-              <a:t>67 - 72).</a:t>
-            </a:r>
-          </a:p>
-          <a:p>
-            <a:pPr algn="just"/>
-            <a:r>
-              <a:rPr lang="en-US" sz="1500" dirty="0"/>
-              <a:t>Martinez, A., &amp; Camacho, A. (2011). A cooperative learning-based </a:t>
-            </a:r>
-            <a:r>
-              <a:rPr lang="en-US" sz="1500" dirty="0" smtClean="0"/>
-              <a:t>strategy for </a:t>
-            </a:r>
-            <a:r>
-              <a:rPr lang="en-US" sz="1500" dirty="0"/>
-              <a:t>teaching relational algebra. In Proceedings of the 16th annual </a:t>
-            </a:r>
-            <a:r>
-              <a:rPr lang="en-US" sz="1500" dirty="0" smtClean="0"/>
-              <a:t>joint conference </a:t>
-            </a:r>
-            <a:r>
-              <a:rPr lang="en-US" sz="1500" dirty="0"/>
-              <a:t>on innovation and technology in computer science </a:t>
-            </a:r>
-            <a:r>
-              <a:rPr lang="en-US" sz="1500" dirty="0" smtClean="0"/>
-              <a:t>education </a:t>
-            </a:r>
-            <a:r>
-              <a:rPr lang="nn-NO" sz="1500" dirty="0" smtClean="0"/>
-              <a:t>(</a:t>
-            </a:r>
-            <a:r>
-              <a:rPr lang="nn-NO" sz="1500" dirty="0"/>
-              <a:t>p. 263{267). New York, NY, USA: ACM</a:t>
-            </a:r>
-            <a:r>
-              <a:rPr lang="nn-NO" sz="1500" dirty="0" smtClean="0"/>
-              <a:t>.</a:t>
-            </a:r>
-          </a:p>
-          <a:p>
-            <a:pPr algn="just"/>
-            <a:r>
-              <a:rPr lang="en-US" sz="1500" dirty="0"/>
-              <a:t>Cliburn, D. C. (2014, May). Team-based learning in a data structures course</a:t>
-            </a:r>
-            <a:r>
-              <a:rPr lang="en-US" sz="1500" dirty="0" smtClean="0"/>
-              <a:t>. </a:t>
-            </a:r>
-            <a:r>
-              <a:rPr lang="it-IT" sz="1500" dirty="0" smtClean="0"/>
-              <a:t>J</a:t>
-            </a:r>
-            <a:r>
-              <a:rPr lang="it-IT" sz="1500" dirty="0"/>
-              <a:t>. Comput. Sci. Coll., 29 (5), </a:t>
-            </a:r>
-            <a:r>
-              <a:rPr lang="it-IT" sz="1500" dirty="0" smtClean="0"/>
-              <a:t>194 - 201</a:t>
-            </a:r>
-            <a:r>
-              <a:rPr lang="it-IT" sz="1500" dirty="0"/>
-              <a:t>.</a:t>
-            </a:r>
-            <a:endParaRPr lang="en-US" sz="1500" dirty="0" smtClean="0"/>
-          </a:p>
-          <a:p>
-            <a:pPr algn="just"/>
-            <a:r>
-              <a:rPr lang="en-US" sz="1500" dirty="0" err="1" smtClean="0"/>
-              <a:t>Buhr</a:t>
-            </a:r>
-            <a:r>
-              <a:rPr lang="en-US" sz="1500" dirty="0"/>
-              <a:t>, G. T., Hein, M. T., White, H. K., &amp; </a:t>
-            </a:r>
-            <a:r>
-              <a:rPr lang="en-US" sz="1500" dirty="0" err="1"/>
-              <a:t>Pinheiro</a:t>
-            </a:r>
-            <a:r>
-              <a:rPr lang="en-US" sz="1500" dirty="0"/>
-              <a:t>, S. O. (2014). Using </a:t>
-            </a:r>
-            <a:r>
-              <a:rPr lang="en-US" sz="1500" dirty="0" smtClean="0"/>
-              <a:t>the jigsaw </a:t>
-            </a:r>
-            <a:r>
-              <a:rPr lang="en-US" sz="1500" dirty="0"/>
-              <a:t>cooperative learning method to teach medical students </a:t>
-            </a:r>
-            <a:r>
-              <a:rPr lang="en-US" sz="1500" dirty="0" smtClean="0"/>
-              <a:t>about long-term </a:t>
-            </a:r>
-            <a:r>
-              <a:rPr lang="en-US" sz="1500" dirty="0"/>
-              <a:t>and </a:t>
-            </a:r>
-            <a:r>
-              <a:rPr lang="en-US" sz="1500" dirty="0" err="1"/>
-              <a:t>postacute</a:t>
-            </a:r>
-            <a:r>
-              <a:rPr lang="en-US" sz="1500" dirty="0"/>
-              <a:t> care. Journal of the American Medical </a:t>
-            </a:r>
-            <a:r>
-              <a:rPr lang="en-US" sz="1500" dirty="0" smtClean="0"/>
-              <a:t>Directors </a:t>
-            </a:r>
-            <a:r>
-              <a:rPr lang="en-US" sz="1500" dirty="0"/>
-              <a:t>Association, 15 (6), 429 - 434. </a:t>
-            </a:r>
-            <a:endParaRPr lang="en-US" sz="1500" dirty="0" smtClean="0"/>
-          </a:p>
-          <a:p>
-            <a:pPr algn="just"/>
-            <a:r>
-              <a:rPr lang="de-DE" sz="1500" dirty="0"/>
-              <a:t>Miller, R. C., Zhang, H., Gilbert, E., &amp; Gerber, E. (2014). Pair research</a:t>
-            </a:r>
-            <a:r>
-              <a:rPr lang="de-DE" sz="1500" dirty="0" smtClean="0"/>
-              <a:t>: </a:t>
-            </a:r>
-            <a:r>
-              <a:rPr lang="en-US" sz="1500" dirty="0" smtClean="0"/>
-              <a:t>Matching </a:t>
-            </a:r>
-            <a:r>
-              <a:rPr lang="en-US" sz="1500" dirty="0"/>
-              <a:t>people for collaboration, learning, and productivity. In </a:t>
-            </a:r>
-            <a:r>
-              <a:rPr lang="en-US" sz="1500" dirty="0" smtClean="0"/>
-              <a:t>Proceedings </a:t>
-            </a:r>
-            <a:r>
-              <a:rPr lang="en-US" sz="1500" dirty="0"/>
-              <a:t>of the 17th ACM conference on computer supported </a:t>
-            </a:r>
-            <a:r>
-              <a:rPr lang="en-US" sz="1500" dirty="0" smtClean="0"/>
-              <a:t>cooperative </a:t>
-            </a:r>
-            <a:r>
-              <a:rPr lang="en-US" sz="1500" dirty="0"/>
-              <a:t>work; social computing (p. </a:t>
-            </a:r>
-            <a:r>
-              <a:rPr lang="en-US" sz="1500" dirty="0" smtClean="0"/>
-              <a:t>1043-1048</a:t>
-            </a:r>
-            <a:r>
-              <a:rPr lang="en-US" sz="1500" dirty="0"/>
-              <a:t>). New York, NY, </a:t>
-            </a:r>
-            <a:r>
-              <a:rPr lang="en-US" sz="1500" dirty="0" smtClean="0"/>
-              <a:t>USA: ACM</a:t>
-            </a:r>
-            <a:r>
-              <a:rPr lang="en-US" sz="1500" dirty="0"/>
-              <a:t>. </a:t>
-            </a:r>
-            <a:endParaRPr lang="en-US" sz="1500" dirty="0" smtClean="0"/>
-          </a:p>
-          <a:p>
-            <a:pPr algn="just"/>
-            <a:r>
-              <a:rPr lang="en-US" sz="1500" dirty="0" err="1"/>
-              <a:t>Lipman</a:t>
-            </a:r>
-            <a:r>
-              <a:rPr lang="en-US" sz="1500" dirty="0"/>
-              <a:t>, D. (2014, June). </a:t>
-            </a:r>
-            <a:r>
-              <a:rPr lang="en-US" sz="1500" dirty="0" err="1"/>
-              <a:t>LearnCS</a:t>
-            </a:r>
-            <a:r>
-              <a:rPr lang="en-US" sz="1500" dirty="0"/>
-              <a:t>!: a new, browser-based c </a:t>
-            </a:r>
-            <a:r>
-              <a:rPr lang="en-US" sz="1500" dirty="0" smtClean="0"/>
-              <a:t>programming </a:t>
-            </a:r>
-            <a:r>
-              <a:rPr lang="es-PE" sz="1500" dirty="0" err="1" smtClean="0"/>
-              <a:t>environment</a:t>
-            </a:r>
-            <a:r>
-              <a:rPr lang="es-PE" sz="1500" dirty="0" smtClean="0"/>
-              <a:t> </a:t>
-            </a:r>
-            <a:r>
-              <a:rPr lang="es-PE" sz="1500" dirty="0" err="1"/>
-              <a:t>for</a:t>
-            </a:r>
-            <a:r>
-              <a:rPr lang="es-PE" sz="1500" dirty="0"/>
-              <a:t> CS1. J. </a:t>
-            </a:r>
-            <a:r>
-              <a:rPr lang="es-PE" sz="1500" dirty="0" err="1"/>
-              <a:t>Comput</a:t>
-            </a:r>
-            <a:r>
-              <a:rPr lang="es-PE" sz="1500" dirty="0"/>
-              <a:t>. </a:t>
-            </a:r>
-            <a:r>
-              <a:rPr lang="es-PE" sz="1500" dirty="0" err="1"/>
-              <a:t>Sci</a:t>
-            </a:r>
-            <a:r>
-              <a:rPr lang="es-PE" sz="1500" dirty="0"/>
-              <a:t>. </a:t>
-            </a:r>
-            <a:r>
-              <a:rPr lang="es-PE" sz="1500" dirty="0" err="1"/>
-              <a:t>Coll</a:t>
-            </a:r>
-            <a:r>
-              <a:rPr lang="es-PE" sz="1500" dirty="0"/>
-              <a:t>., 29 (6), </a:t>
-            </a:r>
-            <a:r>
-              <a:rPr lang="es-PE" sz="1500" dirty="0" smtClean="0"/>
-              <a:t>144 -150</a:t>
-            </a:r>
-            <a:r>
-              <a:rPr lang="es-PE" sz="1500" dirty="0"/>
-              <a:t>. </a:t>
-            </a:r>
-            <a:endParaRPr lang="es-PE" sz="1500" dirty="0"/>
-          </a:p>
-        </p:txBody>
-      </p:sp>
-    </p:spTree>
-    <p:extLst>
-      <p:ext uri="{BB962C8B-B14F-4D97-AF65-F5344CB8AC3E}">
-        <p14:creationId xmlns:p14="http://schemas.microsoft.com/office/powerpoint/2010/main" val="3204853567"/>
       </p:ext>
     </p:extLst>
   </p:cSld>
@@ -11589,8 +11029,8 @@
         </p:nvSpPr>
         <p:spPr>
           <a:xfrm>
-            <a:off x="551280" y="436563"/>
-            <a:ext cx="8197184" cy="1048221"/>
+            <a:off x="551280" y="260648"/>
+            <a:ext cx="8197184" cy="648072"/>
           </a:xfrm>
         </p:spPr>
         <p:txBody>
@@ -11605,239 +11045,595 @@
           </a:p>
         </p:txBody>
       </p:sp>
-      <p:sp>
-        <p:nvSpPr>
-          <p:cNvPr id="10" name="9 Marcador de contenido"/>
-          <p:cNvSpPr>
-            <a:spLocks noGrp="1"/>
-          </p:cNvSpPr>
+      <p:graphicFrame>
+        <p:nvGraphicFramePr>
+          <p:cNvPr id="3" name="2 Marcador de contenido"/>
+          <p:cNvGraphicFramePr>
+            <a:graphicFrameLocks noGrp="1"/>
+          </p:cNvGraphicFramePr>
           <p:nvPr>
             <p:ph idx="1"/>
+            <p:extLst>
+              <p:ext uri="{D42A27DB-BD31-4B8C-83A1-F6EECF244321}">
+                <p14:modId xmlns:p14="http://schemas.microsoft.com/office/powerpoint/2010/main" val="2454443364"/>
+              </p:ext>
+            </p:extLst>
           </p:nvPr>
-        </p:nvSpPr>
-        <p:spPr>
-          <a:xfrm>
-            <a:off x="838200" y="1484784"/>
-            <a:ext cx="7467600" cy="4824536"/>
-          </a:xfrm>
-        </p:spPr>
-        <p:txBody>
-          <a:bodyPr>
-            <a:normAutofit fontScale="92500" lnSpcReduction="20000"/>
-          </a:bodyPr>
-          <a:lstStyle/>
-          <a:p>
-            <a:pPr algn="just"/>
-            <a:r>
-              <a:rPr lang="es-PE" dirty="0" smtClean="0"/>
-              <a:t>Algunas </a:t>
-            </a:r>
-            <a:r>
-              <a:rPr lang="es-PE" dirty="0" smtClean="0"/>
-              <a:t>instituciones han </a:t>
-            </a:r>
-            <a:r>
-              <a:rPr lang="es-PE" dirty="0"/>
-              <a:t>logrado mejorar los cursos de </a:t>
-            </a:r>
-            <a:r>
-              <a:rPr lang="es-PE" dirty="0" smtClean="0"/>
-              <a:t>programación </a:t>
-            </a:r>
-            <a:r>
-              <a:rPr lang="es-PE" dirty="0"/>
-              <a:t>adoptando </a:t>
-            </a:r>
-            <a:r>
-              <a:rPr lang="es-PE" dirty="0" smtClean="0"/>
-              <a:t>Python como primer </a:t>
-            </a:r>
-            <a:r>
-              <a:rPr lang="es-PE" dirty="0"/>
-              <a:t>lenguaje de </a:t>
-            </a:r>
-            <a:r>
-              <a:rPr lang="es-PE" dirty="0" smtClean="0"/>
-              <a:t>programación (</a:t>
-            </a:r>
-            <a:r>
-              <a:rPr lang="es-PE" dirty="0" err="1" smtClean="0"/>
-              <a:t>Nikula</a:t>
-            </a:r>
-            <a:r>
-              <a:rPr lang="es-PE" dirty="0"/>
-              <a:t>, </a:t>
-            </a:r>
-            <a:r>
-              <a:rPr lang="es-PE" dirty="0" err="1"/>
-              <a:t>Sajaniemi</a:t>
-            </a:r>
-            <a:r>
-              <a:rPr lang="es-PE" dirty="0"/>
-              <a:t>, </a:t>
-            </a:r>
-            <a:r>
-              <a:rPr lang="es-PE" dirty="0" err="1"/>
-              <a:t>Tedre</a:t>
-            </a:r>
-            <a:r>
-              <a:rPr lang="es-PE" dirty="0"/>
-              <a:t>, &amp;</a:t>
-            </a:r>
-            <a:r>
-              <a:rPr lang="es-PE" dirty="0" smtClean="0"/>
-              <a:t> </a:t>
-            </a:r>
-            <a:r>
-              <a:rPr lang="es-PE" dirty="0" err="1" smtClean="0"/>
-              <a:t>Wray</a:t>
-            </a:r>
-            <a:r>
-              <a:rPr lang="es-PE" dirty="0" smtClean="0"/>
-              <a:t>, 2007).</a:t>
-            </a:r>
-          </a:p>
-          <a:p>
-            <a:pPr algn="just"/>
-            <a:r>
-              <a:rPr lang="es-PE" dirty="0" smtClean="0"/>
-              <a:t>Según </a:t>
-            </a:r>
-            <a:r>
-              <a:rPr lang="es-PE" dirty="0" err="1"/>
-              <a:t>Knobelsdorf</a:t>
-            </a:r>
-            <a:r>
-              <a:rPr lang="es-PE" dirty="0"/>
-              <a:t>, </a:t>
-            </a:r>
-            <a:r>
-              <a:rPr lang="es-PE" dirty="0" err="1"/>
-              <a:t>Kreitz</a:t>
-            </a:r>
-            <a:r>
-              <a:rPr lang="es-PE" dirty="0"/>
-              <a:t>, y </a:t>
-            </a:r>
-            <a:r>
-              <a:rPr lang="es-PE" dirty="0" err="1" smtClean="0"/>
-              <a:t>Böhne</a:t>
-            </a:r>
-            <a:r>
-              <a:rPr lang="es-PE" dirty="0" smtClean="0"/>
-              <a:t> </a:t>
-            </a:r>
-            <a:r>
-              <a:rPr lang="es-PE" dirty="0"/>
-              <a:t>(2014), los altos ratios de fracasos </a:t>
-            </a:r>
-            <a:r>
-              <a:rPr lang="es-PE" dirty="0" smtClean="0"/>
-              <a:t>en los </a:t>
-            </a:r>
-            <a:r>
-              <a:rPr lang="es-PE" dirty="0"/>
-              <a:t>cursos de </a:t>
-            </a:r>
-            <a:r>
-              <a:rPr lang="es-PE" dirty="0" smtClean="0"/>
-              <a:t>introducción </a:t>
-            </a:r>
-            <a:r>
-              <a:rPr lang="es-PE" dirty="0"/>
-              <a:t>a la </a:t>
-            </a:r>
-            <a:r>
-              <a:rPr lang="es-PE" dirty="0" smtClean="0"/>
-              <a:t>teoría </a:t>
-            </a:r>
-            <a:r>
-              <a:rPr lang="es-PE" dirty="0"/>
-              <a:t>de las ciencias de la </a:t>
-            </a:r>
-            <a:r>
-              <a:rPr lang="es-PE" dirty="0" smtClean="0"/>
-              <a:t>computación </a:t>
-            </a:r>
-            <a:r>
-              <a:rPr lang="es-PE" dirty="0"/>
-              <a:t>son </a:t>
-            </a:r>
-            <a:r>
-              <a:rPr lang="es-PE" dirty="0" smtClean="0"/>
-              <a:t>un problema común </a:t>
-            </a:r>
-            <a:r>
-              <a:rPr lang="es-PE" dirty="0"/>
-              <a:t>en las universidades de Alemania, Europa, y </a:t>
-            </a:r>
-            <a:r>
-              <a:rPr lang="es-PE" dirty="0" smtClean="0"/>
-              <a:t>Norte América</a:t>
-            </a:r>
-            <a:r>
-              <a:rPr lang="es-PE" dirty="0" smtClean="0"/>
-              <a:t>.</a:t>
-            </a:r>
-          </a:p>
-          <a:p>
-            <a:pPr algn="just"/>
-            <a:r>
-              <a:rPr lang="es-PE" dirty="0" err="1"/>
-              <a:t>Azizinezhad</a:t>
-            </a:r>
-            <a:r>
-              <a:rPr lang="es-PE" dirty="0"/>
-              <a:t>, </a:t>
-            </a:r>
-            <a:r>
-              <a:rPr lang="es-PE" dirty="0" err="1"/>
-              <a:t>Hashemi</a:t>
-            </a:r>
-            <a:r>
-              <a:rPr lang="es-PE" dirty="0"/>
-              <a:t>, y </a:t>
-            </a:r>
-            <a:r>
-              <a:rPr lang="es-PE" dirty="0" err="1"/>
-              <a:t>Darvishi</a:t>
-            </a:r>
-            <a:r>
-              <a:rPr lang="es-PE" dirty="0"/>
-              <a:t> (2013) realizaron un estudio para investigar los efectos del aprendizaje colaborativo en el aprendizaje del idioma inglés como lengua extranjera para los alumnos.</a:t>
-            </a:r>
-          </a:p>
-          <a:p>
-            <a:pPr algn="just"/>
-            <a:r>
-              <a:rPr lang="es-PE" dirty="0"/>
-              <a:t>La técnica de </a:t>
-            </a:r>
-            <a:r>
-              <a:rPr lang="es-PE" dirty="0" err="1"/>
-              <a:t>Jigsaw</a:t>
-            </a:r>
-            <a:r>
-              <a:rPr lang="es-PE" dirty="0"/>
-              <a:t>, fue implementada en un sistema web en el  2013 en la Universidad Pontificia Católica del Perú con el n de automatizar los procesos que se requiere aplicar dicha técnica al aprendizaje colaborativo (Pinzas &amp; </a:t>
-            </a:r>
-            <a:r>
-              <a:rPr lang="es-PE" dirty="0" err="1"/>
-              <a:t>Yatsen</a:t>
-            </a:r>
-            <a:r>
-              <a:rPr lang="es-PE" dirty="0"/>
-              <a:t>, 2013).</a:t>
-            </a:r>
-          </a:p>
-          <a:p>
-            <a:pPr marL="0" indent="0" algn="just">
-              <a:buNone/>
-            </a:pPr>
-            <a:endParaRPr lang="es-PE" dirty="0"/>
-          </a:p>
-        </p:txBody>
-      </p:sp>
+        </p:nvGraphicFramePr>
+        <p:xfrm>
+          <a:off x="395536" y="1137438"/>
+          <a:ext cx="8427780" cy="5171882"/>
+        </p:xfrm>
+        <a:graphic>
+          <a:graphicData uri="http://schemas.openxmlformats.org/drawingml/2006/table">
+            <a:tbl>
+              <a:tblPr firstRow="1" bandRow="1">
+                <a:tableStyleId>{5C22544A-7EE6-4342-B048-85BDC9FD1C3A}</a:tableStyleId>
+              </a:tblPr>
+              <a:tblGrid>
+                <a:gridCol w="6001759"/>
+                <a:gridCol w="2426021"/>
+              </a:tblGrid>
+              <a:tr h="437853">
+                <a:tc>
+                  <a:txBody>
+                    <a:bodyPr/>
+                    <a:lstStyle/>
+                    <a:p>
+                      <a:pPr algn="just"/>
+                      <a:r>
+                        <a:rPr lang="es-PE" sz="1400" dirty="0" smtClean="0"/>
+                        <a:t>Antecedente</a:t>
+                      </a:r>
+                      <a:endParaRPr lang="es-PE" sz="1400" dirty="0"/>
+                    </a:p>
+                  </a:txBody>
+                  <a:tcPr anchor="ctr"/>
+                </a:tc>
+                <a:tc>
+                  <a:txBody>
+                    <a:bodyPr/>
+                    <a:lstStyle/>
+                    <a:p>
+                      <a:pPr algn="just"/>
+                      <a:r>
+                        <a:rPr lang="es-PE" sz="1400" dirty="0" smtClean="0"/>
+                        <a:t>Referencia</a:t>
+                      </a:r>
+                      <a:endParaRPr lang="es-PE" sz="1400" dirty="0"/>
+                    </a:p>
+                  </a:txBody>
+                  <a:tcPr anchor="ctr"/>
+                </a:tc>
+              </a:tr>
+              <a:tr h="874835">
+                <a:tc>
+                  <a:txBody>
+                    <a:bodyPr/>
+                    <a:lstStyle/>
+                    <a:p>
+                      <a:pPr algn="just"/>
+                      <a:r>
+                        <a:rPr lang="es-PE" sz="1400" b="0" i="0" u="none" strike="noStrike" kern="1200" baseline="0" dirty="0" smtClean="0">
+                          <a:solidFill>
+                            <a:schemeClr val="dk1"/>
+                          </a:solidFill>
+                          <a:latin typeface="+mn-lt"/>
+                          <a:ea typeface="+mn-ea"/>
+                          <a:cs typeface="+mn-cs"/>
+                        </a:rPr>
+                        <a:t>Existen muchos estudios </a:t>
+                      </a:r>
+                      <a:r>
+                        <a:rPr lang="es-PE" sz="1400" b="0" i="0" u="none" strike="noStrike" kern="1200" baseline="0" dirty="0" err="1" smtClean="0">
+                          <a:solidFill>
+                            <a:schemeClr val="dk1"/>
+                          </a:solidFill>
+                          <a:latin typeface="+mn-lt"/>
+                          <a:ea typeface="+mn-ea"/>
+                          <a:cs typeface="+mn-cs"/>
+                        </a:rPr>
+                        <a:t>multi</a:t>
+                      </a:r>
+                      <a:r>
+                        <a:rPr lang="es-PE" sz="1400" b="0" i="0" u="none" strike="noStrike" kern="1200" baseline="0" dirty="0" smtClean="0">
+                          <a:solidFill>
+                            <a:schemeClr val="dk1"/>
+                          </a:solidFill>
+                          <a:latin typeface="+mn-lt"/>
+                          <a:ea typeface="+mn-ea"/>
+                          <a:cs typeface="+mn-cs"/>
+                        </a:rPr>
+                        <a:t> institucionales que indican que hay serias deficiencias en el aprendizaje de alumnos que han pasado uno o más cursos de programación.</a:t>
+                      </a:r>
+                      <a:endParaRPr lang="es-PE" sz="1400" dirty="0"/>
+                    </a:p>
+                  </a:txBody>
+                  <a:tcPr anchor="ctr"/>
+                </a:tc>
+                <a:tc>
+                  <a:txBody>
+                    <a:bodyPr/>
+                    <a:lstStyle/>
+                    <a:p>
+                      <a:pPr marL="0" marR="0" indent="0" algn="just" defTabSz="457200" rtl="0" eaLnBrk="1" fontAlgn="auto" latinLnBrk="0" hangingPunct="1">
+                        <a:lnSpc>
+                          <a:spcPct val="100000"/>
+                        </a:lnSpc>
+                        <a:spcBef>
+                          <a:spcPts val="0"/>
+                        </a:spcBef>
+                        <a:spcAft>
+                          <a:spcPts val="0"/>
+                        </a:spcAft>
+                        <a:buClrTx/>
+                        <a:buSzTx/>
+                        <a:buFontTx/>
+                        <a:buNone/>
+                        <a:tabLst/>
+                        <a:defRPr/>
+                      </a:pPr>
+                      <a:r>
+                        <a:rPr lang="es-PE" sz="1400" b="0" i="0" u="none" strike="noStrike" kern="1200" baseline="0" dirty="0" smtClean="0">
+                          <a:solidFill>
+                            <a:schemeClr val="dk1"/>
+                          </a:solidFill>
+                          <a:latin typeface="+mn-lt"/>
+                          <a:ea typeface="+mn-ea"/>
+                          <a:cs typeface="+mn-cs"/>
+                        </a:rPr>
+                        <a:t>(McCracken y cols., 2001; </a:t>
+                      </a:r>
+                      <a:r>
+                        <a:rPr lang="es-PE" sz="1400" b="0" i="0" u="none" strike="noStrike" kern="1200" baseline="0" dirty="0" err="1" smtClean="0">
+                          <a:solidFill>
+                            <a:schemeClr val="dk1"/>
+                          </a:solidFill>
+                          <a:latin typeface="+mn-lt"/>
+                          <a:ea typeface="+mn-ea"/>
+                          <a:cs typeface="+mn-cs"/>
+                        </a:rPr>
+                        <a:t>Lister</a:t>
+                      </a:r>
+                      <a:r>
+                        <a:rPr lang="es-PE" sz="1400" b="0" i="0" u="none" strike="noStrike" kern="1200" baseline="0" dirty="0" smtClean="0">
+                          <a:solidFill>
+                            <a:schemeClr val="dk1"/>
+                          </a:solidFill>
+                          <a:latin typeface="+mn-lt"/>
+                          <a:ea typeface="+mn-ea"/>
+                          <a:cs typeface="+mn-cs"/>
+                        </a:rPr>
+                        <a:t> y cols., 2004; </a:t>
+                      </a:r>
+                      <a:r>
+                        <a:rPr lang="es-PE" sz="1400" b="0" i="0" u="none" strike="noStrike" kern="1200" baseline="0" dirty="0" err="1" smtClean="0">
+                          <a:solidFill>
+                            <a:schemeClr val="dk1"/>
+                          </a:solidFill>
+                          <a:latin typeface="+mn-lt"/>
+                          <a:ea typeface="+mn-ea"/>
+                          <a:cs typeface="+mn-cs"/>
+                        </a:rPr>
+                        <a:t>Tenenberg</a:t>
+                      </a:r>
+                      <a:r>
+                        <a:rPr lang="es-PE" sz="1400" b="0" i="0" u="none" strike="noStrike" kern="1200" baseline="0" dirty="0" smtClean="0">
+                          <a:solidFill>
+                            <a:schemeClr val="dk1"/>
+                          </a:solidFill>
+                          <a:latin typeface="+mn-lt"/>
+                          <a:ea typeface="+mn-ea"/>
+                          <a:cs typeface="+mn-cs"/>
+                        </a:rPr>
+                        <a:t> y cols., 2005)</a:t>
+                      </a:r>
+                      <a:endParaRPr lang="es-PE" sz="1400" dirty="0" smtClean="0"/>
+                    </a:p>
+                  </a:txBody>
+                  <a:tcPr anchor="ctr"/>
+                </a:tc>
+              </a:tr>
+              <a:tr h="898154">
+                <a:tc>
+                  <a:txBody>
+                    <a:bodyPr/>
+                    <a:lstStyle/>
+                    <a:p>
+                      <a:pPr algn="just"/>
+                      <a:r>
+                        <a:rPr lang="es-PE" sz="1400" b="0" i="0" u="none" strike="noStrike" kern="1200" baseline="0" dirty="0" smtClean="0">
+                          <a:solidFill>
+                            <a:schemeClr val="dk1"/>
+                          </a:solidFill>
+                          <a:latin typeface="+mn-lt"/>
+                          <a:ea typeface="+mn-ea"/>
+                          <a:cs typeface="+mn-cs"/>
+                        </a:rPr>
+                        <a:t>Los altos ratios de fracasos en los cursos de introducción a la teoría de las ciencias de la computación son un problema común en las universidades de Alemania, Europa, y Norte América.</a:t>
+                      </a:r>
+                      <a:endParaRPr lang="es-PE" sz="1400" dirty="0"/>
+                    </a:p>
+                  </a:txBody>
+                  <a:tcPr anchor="ctr"/>
+                </a:tc>
+                <a:tc>
+                  <a:txBody>
+                    <a:bodyPr/>
+                    <a:lstStyle/>
+                    <a:p>
+                      <a:pPr algn="just"/>
+                      <a:r>
+                        <a:rPr lang="es-PE" sz="1400" b="0" i="0" u="none" strike="noStrike" kern="1200" baseline="0" dirty="0" smtClean="0">
+                          <a:solidFill>
+                            <a:schemeClr val="dk1"/>
+                          </a:solidFill>
+                          <a:latin typeface="+mn-lt"/>
+                          <a:ea typeface="+mn-ea"/>
+                          <a:cs typeface="+mn-cs"/>
+                        </a:rPr>
+                        <a:t>(</a:t>
+                      </a:r>
+                      <a:r>
+                        <a:rPr lang="es-PE" sz="1400" b="0" i="0" u="none" strike="noStrike" kern="1200" baseline="0" dirty="0" err="1" smtClean="0">
+                          <a:solidFill>
+                            <a:schemeClr val="dk1"/>
+                          </a:solidFill>
+                          <a:latin typeface="+mn-lt"/>
+                          <a:ea typeface="+mn-ea"/>
+                          <a:cs typeface="+mn-cs"/>
+                        </a:rPr>
+                        <a:t>Knobelsdorf</a:t>
+                      </a:r>
+                      <a:r>
+                        <a:rPr lang="es-PE" sz="1400" b="0" i="0" u="none" strike="noStrike" kern="1200" baseline="0" dirty="0" smtClean="0">
+                          <a:solidFill>
+                            <a:schemeClr val="dk1"/>
+                          </a:solidFill>
+                          <a:latin typeface="+mn-lt"/>
+                          <a:ea typeface="+mn-ea"/>
+                          <a:cs typeface="+mn-cs"/>
+                        </a:rPr>
+                        <a:t> y cols., 2014)</a:t>
+                      </a:r>
+                      <a:endParaRPr lang="es-PE" sz="1400" b="0" i="0" u="none" strike="noStrike" kern="1200" baseline="0" dirty="0">
+                        <a:solidFill>
+                          <a:schemeClr val="dk1"/>
+                        </a:solidFill>
+                        <a:latin typeface="+mn-lt"/>
+                        <a:ea typeface="+mn-ea"/>
+                        <a:cs typeface="+mn-cs"/>
+                      </a:endParaRPr>
+                    </a:p>
+                  </a:txBody>
+                  <a:tcPr anchor="ctr"/>
+                </a:tc>
+              </a:tr>
+              <a:tr h="759976">
+                <a:tc>
+                  <a:txBody>
+                    <a:bodyPr/>
+                    <a:lstStyle/>
+                    <a:p>
+                      <a:pPr algn="just"/>
+                      <a:r>
+                        <a:rPr lang="es-PE" sz="1400" dirty="0" smtClean="0"/>
+                        <a:t>La técnica de </a:t>
+                      </a:r>
+                      <a:r>
+                        <a:rPr lang="es-PE" sz="1400" dirty="0" err="1" smtClean="0"/>
+                        <a:t>Jigsaw</a:t>
+                      </a:r>
+                      <a:r>
+                        <a:rPr lang="es-PE" sz="1400" dirty="0" smtClean="0"/>
+                        <a:t> ha sido usada en los procesos educacionales en países de todos los continentes</a:t>
+                      </a:r>
+                      <a:r>
+                        <a:rPr lang="es-PE" sz="1400" baseline="0" dirty="0" smtClean="0"/>
+                        <a:t> y puede mejorar el rendimiento de los alumnos a través del aprendizaje colaborativo.</a:t>
+                      </a:r>
+                      <a:endParaRPr lang="es-PE" sz="1400" dirty="0"/>
+                    </a:p>
+                  </a:txBody>
+                  <a:tcPr anchor="ctr"/>
+                </a:tc>
+                <a:tc>
+                  <a:txBody>
+                    <a:bodyPr/>
+                    <a:lstStyle/>
+                    <a:p>
+                      <a:pPr algn="just"/>
+                      <a:r>
+                        <a:rPr lang="es-PE" sz="1400" b="0" i="0" u="none" strike="noStrike" kern="1200" baseline="0" dirty="0" smtClean="0">
+                          <a:solidFill>
+                            <a:schemeClr val="dk1"/>
+                          </a:solidFill>
+                          <a:latin typeface="+mn-lt"/>
+                          <a:ea typeface="+mn-ea"/>
+                          <a:cs typeface="+mn-cs"/>
+                        </a:rPr>
+                        <a:t>(</a:t>
+                      </a:r>
+                      <a:r>
+                        <a:rPr lang="es-PE" sz="1400" b="0" i="0" u="none" strike="noStrike" kern="1200" baseline="0" dirty="0" err="1" smtClean="0">
+                          <a:solidFill>
+                            <a:schemeClr val="dk1"/>
+                          </a:solidFill>
+                          <a:latin typeface="+mn-lt"/>
+                          <a:ea typeface="+mn-ea"/>
+                          <a:cs typeface="+mn-cs"/>
+                        </a:rPr>
+                        <a:t>Maftei</a:t>
+                      </a:r>
+                      <a:r>
+                        <a:rPr lang="es-PE" sz="1400" b="0" i="0" u="none" strike="noStrike" kern="1200" baseline="0" dirty="0" smtClean="0">
+                          <a:solidFill>
+                            <a:schemeClr val="dk1"/>
+                          </a:solidFill>
+                          <a:latin typeface="+mn-lt"/>
+                          <a:ea typeface="+mn-ea"/>
+                          <a:cs typeface="+mn-cs"/>
+                        </a:rPr>
+                        <a:t> &amp; </a:t>
+                      </a:r>
+                      <a:r>
+                        <a:rPr lang="es-PE" sz="1400" b="0" i="0" u="none" strike="noStrike" kern="1200" baseline="0" dirty="0" err="1" smtClean="0">
+                          <a:solidFill>
+                            <a:schemeClr val="dk1"/>
+                          </a:solidFill>
+                          <a:latin typeface="+mn-lt"/>
+                          <a:ea typeface="+mn-ea"/>
+                          <a:cs typeface="+mn-cs"/>
+                        </a:rPr>
+                        <a:t>Maftei</a:t>
+                      </a:r>
+                      <a:r>
+                        <a:rPr lang="es-PE" sz="1400" b="0" i="0" u="none" strike="noStrike" kern="1200" baseline="0" dirty="0" smtClean="0">
+                          <a:solidFill>
+                            <a:schemeClr val="dk1"/>
+                          </a:solidFill>
+                          <a:latin typeface="+mn-lt"/>
+                          <a:ea typeface="+mn-ea"/>
+                          <a:cs typeface="+mn-cs"/>
+                        </a:rPr>
+                        <a:t>, 2011)</a:t>
+                      </a:r>
+                      <a:endParaRPr lang="es-PE" sz="1400" b="0" i="0" u="none" strike="noStrike" kern="1200" baseline="0" dirty="0">
+                        <a:solidFill>
+                          <a:schemeClr val="dk1"/>
+                        </a:solidFill>
+                        <a:latin typeface="+mn-lt"/>
+                        <a:ea typeface="+mn-ea"/>
+                        <a:cs typeface="+mn-cs"/>
+                      </a:endParaRPr>
+                    </a:p>
+                  </a:txBody>
+                  <a:tcPr anchor="ctr"/>
+                </a:tc>
+              </a:tr>
+              <a:tr h="701864">
+                <a:tc>
+                  <a:txBody>
+                    <a:bodyPr/>
+                    <a:lstStyle/>
+                    <a:p>
+                      <a:pPr algn="just"/>
+                      <a:r>
+                        <a:rPr lang="es-PE" sz="1400" dirty="0" smtClean="0"/>
+                        <a:t>Se presentó el diseño, implementación</a:t>
+                      </a:r>
+                      <a:r>
+                        <a:rPr lang="es-PE" sz="1400" baseline="0" dirty="0" smtClean="0"/>
+                        <a:t> y evaluación de una estrategia de enseñanza basada en aprendizaje colaborativo para introducir el tema de álgebra relacional en un curso de base de datos.</a:t>
+                      </a:r>
+                      <a:endParaRPr lang="es-PE" sz="1400" dirty="0"/>
+                    </a:p>
+                  </a:txBody>
+                  <a:tcPr anchor="ctr"/>
+                </a:tc>
+                <a:tc>
+                  <a:txBody>
+                    <a:bodyPr/>
+                    <a:lstStyle/>
+                    <a:p>
+                      <a:pPr algn="just"/>
+                      <a:r>
+                        <a:rPr lang="es-PE" sz="1400" b="0" i="0" u="none" strike="noStrike" kern="1200" baseline="0" dirty="0" smtClean="0">
+                          <a:solidFill>
+                            <a:schemeClr val="dk1"/>
+                          </a:solidFill>
+                          <a:latin typeface="+mn-lt"/>
+                          <a:ea typeface="+mn-ea"/>
+                          <a:cs typeface="+mn-cs"/>
+                        </a:rPr>
+                        <a:t>(Martínez &amp; Camacho, 2011)</a:t>
+                      </a:r>
+                      <a:endParaRPr lang="es-PE" sz="1400" b="0" i="0" u="none" strike="noStrike" kern="1200" baseline="0" dirty="0">
+                        <a:solidFill>
+                          <a:schemeClr val="dk1"/>
+                        </a:solidFill>
+                        <a:latin typeface="+mn-lt"/>
+                        <a:ea typeface="+mn-ea"/>
+                        <a:cs typeface="+mn-cs"/>
+                      </a:endParaRPr>
+                    </a:p>
+                  </a:txBody>
+                  <a:tcPr anchor="ctr"/>
+                </a:tc>
+              </a:tr>
+              <a:tr h="701864">
+                <a:tc>
+                  <a:txBody>
+                    <a:bodyPr/>
+                    <a:lstStyle/>
+                    <a:p>
+                      <a:pPr algn="just"/>
+                      <a:r>
+                        <a:rPr lang="es-PE" sz="1400" b="0" i="0" u="none" strike="noStrike" kern="1200" baseline="0" dirty="0" smtClean="0">
+                          <a:solidFill>
+                            <a:schemeClr val="dk1"/>
+                          </a:solidFill>
+                          <a:latin typeface="+mn-lt"/>
+                          <a:ea typeface="+mn-ea"/>
+                          <a:cs typeface="+mn-cs"/>
+                        </a:rPr>
+                        <a:t>El aprendizaje colaborativo es un enfoque educacional de enseñanza y aprendizaje que involucra grupos de estudiantes trabajando juntos para resolver un problema, completar una tarea, o crear un producto.</a:t>
+                      </a:r>
+                      <a:endParaRPr lang="es-PE" sz="1400" dirty="0"/>
+                    </a:p>
+                  </a:txBody>
+                  <a:tcPr anchor="ctr"/>
+                </a:tc>
+                <a:tc>
+                  <a:txBody>
+                    <a:bodyPr/>
+                    <a:lstStyle/>
+                    <a:p>
+                      <a:pPr algn="just"/>
+                      <a:r>
+                        <a:rPr lang="es-PE" sz="1400" b="0" i="0" u="none" strike="noStrike" kern="1200" baseline="0" dirty="0" smtClean="0">
+                          <a:solidFill>
+                            <a:schemeClr val="dk1"/>
+                          </a:solidFill>
+                          <a:latin typeface="+mn-lt"/>
+                          <a:ea typeface="+mn-ea"/>
+                          <a:cs typeface="+mn-cs"/>
+                        </a:rPr>
+                        <a:t>(</a:t>
+                      </a:r>
+                      <a:r>
+                        <a:rPr lang="es-PE" sz="1400" b="0" i="0" u="none" strike="noStrike" kern="1200" baseline="0" dirty="0" err="1" smtClean="0">
+                          <a:solidFill>
+                            <a:schemeClr val="dk1"/>
+                          </a:solidFill>
+                          <a:latin typeface="+mn-lt"/>
+                          <a:ea typeface="+mn-ea"/>
+                          <a:cs typeface="+mn-cs"/>
+                        </a:rPr>
+                        <a:t>Laal</a:t>
+                      </a:r>
+                      <a:r>
+                        <a:rPr lang="es-PE" sz="1400" b="0" i="0" u="none" strike="noStrike" kern="1200" baseline="0" dirty="0" smtClean="0">
+                          <a:solidFill>
+                            <a:schemeClr val="dk1"/>
+                          </a:solidFill>
+                          <a:latin typeface="+mn-lt"/>
+                          <a:ea typeface="+mn-ea"/>
+                          <a:cs typeface="+mn-cs"/>
+                        </a:rPr>
+                        <a:t> &amp; </a:t>
+                      </a:r>
+                      <a:r>
+                        <a:rPr lang="es-PE" sz="1400" b="0" i="0" u="none" strike="noStrike" kern="1200" baseline="0" dirty="0" err="1" smtClean="0">
+                          <a:solidFill>
+                            <a:schemeClr val="dk1"/>
+                          </a:solidFill>
+                          <a:latin typeface="+mn-lt"/>
+                          <a:ea typeface="+mn-ea"/>
+                          <a:cs typeface="+mn-cs"/>
+                        </a:rPr>
+                        <a:t>Laal</a:t>
+                      </a:r>
+                      <a:r>
+                        <a:rPr lang="es-PE" sz="1400" b="0" i="0" u="none" strike="noStrike" kern="1200" baseline="0" dirty="0" smtClean="0">
+                          <a:solidFill>
+                            <a:schemeClr val="dk1"/>
+                          </a:solidFill>
+                          <a:latin typeface="+mn-lt"/>
+                          <a:ea typeface="+mn-ea"/>
+                          <a:cs typeface="+mn-cs"/>
+                        </a:rPr>
+                        <a:t>, 2012)</a:t>
+                      </a:r>
+                      <a:endParaRPr lang="es-PE" sz="1400" b="0" i="0" u="none" strike="noStrike" kern="1200" baseline="0" dirty="0">
+                        <a:solidFill>
+                          <a:schemeClr val="dk1"/>
+                        </a:solidFill>
+                        <a:latin typeface="+mn-lt"/>
+                        <a:ea typeface="+mn-ea"/>
+                        <a:cs typeface="+mn-cs"/>
+                      </a:endParaRPr>
+                    </a:p>
+                  </a:txBody>
+                  <a:tcPr anchor="ctr"/>
+                </a:tc>
+              </a:tr>
+              <a:tr h="738024">
+                <a:tc>
+                  <a:txBody>
+                    <a:bodyPr/>
+                    <a:lstStyle/>
+                    <a:p>
+                      <a:pPr algn="just"/>
+                      <a:r>
+                        <a:rPr lang="es-PE" sz="1400" dirty="0" smtClean="0"/>
+                        <a:t>Se desarrolló</a:t>
+                      </a:r>
+                      <a:r>
+                        <a:rPr lang="es-PE" sz="1400" baseline="0" dirty="0" smtClean="0"/>
+                        <a:t> el curso de Estructura de datos a través del aprendizaje basado en equipos y el aprendizaje tradicional con el fin de comparar resultados en las evaluaciones de los estudiantes.</a:t>
+                      </a:r>
+                      <a:endParaRPr lang="es-PE" sz="1400" dirty="0"/>
+                    </a:p>
+                  </a:txBody>
+                  <a:tcPr anchor="ctr"/>
+                </a:tc>
+                <a:tc>
+                  <a:txBody>
+                    <a:bodyPr/>
+                    <a:lstStyle/>
+                    <a:p>
+                      <a:pPr algn="just"/>
+                      <a:r>
+                        <a:rPr lang="es-PE" sz="1400" b="0" i="0" u="none" strike="noStrike" kern="1200" baseline="0" dirty="0" smtClean="0">
+                          <a:solidFill>
+                            <a:schemeClr val="dk1"/>
+                          </a:solidFill>
+                          <a:latin typeface="+mn-lt"/>
+                          <a:ea typeface="+mn-ea"/>
+                          <a:cs typeface="+mn-cs"/>
+                        </a:rPr>
+                        <a:t>(</a:t>
+                      </a:r>
+                      <a:r>
+                        <a:rPr lang="es-PE" sz="1400" b="0" i="0" u="none" strike="noStrike" kern="1200" baseline="0" dirty="0" err="1" smtClean="0">
+                          <a:solidFill>
+                            <a:schemeClr val="dk1"/>
+                          </a:solidFill>
+                          <a:latin typeface="+mn-lt"/>
+                          <a:ea typeface="+mn-ea"/>
+                          <a:cs typeface="+mn-cs"/>
+                        </a:rPr>
+                        <a:t>Ciburn</a:t>
+                      </a:r>
+                      <a:r>
+                        <a:rPr lang="es-PE" sz="1400" b="0" i="0" u="none" strike="noStrike" kern="1200" baseline="0" dirty="0" smtClean="0">
+                          <a:solidFill>
+                            <a:schemeClr val="dk1"/>
+                          </a:solidFill>
+                          <a:latin typeface="+mn-lt"/>
+                          <a:ea typeface="+mn-ea"/>
+                          <a:cs typeface="+mn-cs"/>
+                        </a:rPr>
+                        <a:t>, 2014)</a:t>
+                      </a:r>
+                      <a:endParaRPr lang="es-PE" sz="1400" b="0" i="0" u="none" strike="noStrike" kern="1200" baseline="0" dirty="0">
+                        <a:solidFill>
+                          <a:schemeClr val="dk1"/>
+                        </a:solidFill>
+                        <a:latin typeface="+mn-lt"/>
+                        <a:ea typeface="+mn-ea"/>
+                        <a:cs typeface="+mn-cs"/>
+                      </a:endParaRPr>
+                    </a:p>
+                  </a:txBody>
+                  <a:tcPr anchor="ctr"/>
+                </a:tc>
+              </a:tr>
+            </a:tbl>
+          </a:graphicData>
+        </a:graphic>
+      </p:graphicFrame>
     </p:spTree>
     <p:extLst>
       <p:ext uri="{BB962C8B-B14F-4D97-AF65-F5344CB8AC3E}">
@@ -11859,567 +11655,6 @@
 </file>
 
 <file path=ppt/slides/slide4.xml><?xml version="1.0" encoding="utf-8"?>
-<p:sld xmlns:a="http://schemas.openxmlformats.org/drawingml/2006/main" xmlns:r="http://schemas.openxmlformats.org/officeDocument/2006/relationships" xmlns:p="http://schemas.openxmlformats.org/presentationml/2006/main" show="0">
-  <p:cSld>
-    <p:spTree>
-      <p:nvGrpSpPr>
-        <p:cNvPr id="1" name=""/>
-        <p:cNvGrpSpPr/>
-        <p:nvPr/>
-      </p:nvGrpSpPr>
-      <p:grpSpPr>
-        <a:xfrm>
-          <a:off x="0" y="0"/>
-          <a:ext cx="0" cy="0"/>
-          <a:chOff x="0" y="0"/>
-          <a:chExt cx="0" cy="0"/>
-        </a:xfrm>
-      </p:grpSpPr>
-      <p:sp>
-        <p:nvSpPr>
-          <p:cNvPr id="9" name="8 Título"/>
-          <p:cNvSpPr>
-            <a:spLocks noGrp="1"/>
-          </p:cNvSpPr>
-          <p:nvPr>
-            <p:ph type="title"/>
-          </p:nvPr>
-        </p:nvSpPr>
-        <p:spPr>
-          <a:xfrm>
-            <a:off x="551280" y="436563"/>
-            <a:ext cx="8197184" cy="1048221"/>
-          </a:xfrm>
-        </p:spPr>
-        <p:txBody>
-          <a:bodyPr/>
-          <a:lstStyle/>
-          <a:p>
-            <a:r>
-              <a:rPr lang="es-PE" sz="4000" dirty="0" smtClean="0"/>
-              <a:t>ANTECEDENTES DEL PROBLEMA</a:t>
-            </a:r>
-            <a:endParaRPr lang="es-PE" sz="4000" dirty="0"/>
-          </a:p>
-        </p:txBody>
-      </p:sp>
-      <p:sp>
-        <p:nvSpPr>
-          <p:cNvPr id="10" name="9 Marcador de contenido"/>
-          <p:cNvSpPr>
-            <a:spLocks noGrp="1"/>
-          </p:cNvSpPr>
-          <p:nvPr>
-            <p:ph idx="1"/>
-          </p:nvPr>
-        </p:nvSpPr>
-        <p:spPr>
-          <a:xfrm>
-            <a:off x="838200" y="1700808"/>
-            <a:ext cx="7467600" cy="4608512"/>
-          </a:xfrm>
-        </p:spPr>
-        <p:txBody>
-          <a:bodyPr>
-            <a:normAutofit fontScale="92500"/>
-          </a:bodyPr>
-          <a:lstStyle/>
-          <a:p>
-            <a:pPr algn="just"/>
-            <a:r>
-              <a:rPr lang="es-PE" dirty="0" smtClean="0"/>
-              <a:t>Existen </a:t>
-            </a:r>
-            <a:r>
-              <a:rPr lang="es-PE" dirty="0"/>
-              <a:t>muchos </a:t>
-            </a:r>
-            <a:r>
-              <a:rPr lang="es-PE" dirty="0" smtClean="0"/>
-              <a:t>estudios </a:t>
-            </a:r>
-            <a:r>
-              <a:rPr lang="es-PE" dirty="0" err="1" smtClean="0"/>
-              <a:t>multi</a:t>
-            </a:r>
-            <a:r>
-              <a:rPr lang="es-PE" dirty="0" smtClean="0"/>
-              <a:t>-institucionales </a:t>
-            </a:r>
-            <a:r>
-              <a:rPr lang="es-PE" dirty="0"/>
-              <a:t>que indican que hay serias </a:t>
-            </a:r>
-            <a:r>
-              <a:rPr lang="es-PE" dirty="0" smtClean="0"/>
-              <a:t>deficiencias </a:t>
-            </a:r>
-            <a:r>
-              <a:rPr lang="es-PE" dirty="0"/>
-              <a:t>en el </a:t>
-            </a:r>
-            <a:r>
-              <a:rPr lang="es-PE" dirty="0" smtClean="0"/>
-              <a:t>aprendizaje de </a:t>
-            </a:r>
-            <a:r>
-              <a:rPr lang="es-PE" dirty="0"/>
-              <a:t>alumnos que han pasado uno o mas cursos de </a:t>
-            </a:r>
-            <a:r>
-              <a:rPr lang="es-PE" dirty="0" smtClean="0"/>
-              <a:t>programación (McCracken et </a:t>
-            </a:r>
-            <a:r>
-              <a:rPr lang="es-PE" dirty="0"/>
-              <a:t>al., 2001; </a:t>
-            </a:r>
-            <a:r>
-              <a:rPr lang="es-PE" dirty="0" err="1"/>
-              <a:t>Lister</a:t>
-            </a:r>
-            <a:r>
-              <a:rPr lang="es-PE" dirty="0"/>
-              <a:t> et al., 2004; </a:t>
-            </a:r>
-            <a:r>
-              <a:rPr lang="es-PE" dirty="0" err="1"/>
-              <a:t>Tenenberg</a:t>
-            </a:r>
-            <a:r>
-              <a:rPr lang="es-PE" dirty="0"/>
-              <a:t> et al., 2005</a:t>
-            </a:r>
-            <a:r>
-              <a:rPr lang="es-PE" dirty="0" smtClean="0"/>
-              <a:t>).</a:t>
-            </a:r>
-          </a:p>
-          <a:p>
-            <a:pPr algn="just"/>
-            <a:r>
-              <a:rPr lang="es-PE" dirty="0"/>
-              <a:t>Algunas </a:t>
-            </a:r>
-            <a:r>
-              <a:rPr lang="es-PE" dirty="0" smtClean="0"/>
-              <a:t>instituciones han </a:t>
-            </a:r>
-            <a:r>
-              <a:rPr lang="es-PE" dirty="0"/>
-              <a:t>logrado mejorar los cursos de </a:t>
-            </a:r>
-            <a:r>
-              <a:rPr lang="es-PE" dirty="0" smtClean="0"/>
-              <a:t>programación </a:t>
-            </a:r>
-            <a:r>
-              <a:rPr lang="es-PE" dirty="0"/>
-              <a:t>adoptando </a:t>
-            </a:r>
-            <a:r>
-              <a:rPr lang="es-PE" dirty="0" smtClean="0"/>
-              <a:t>Python como primer </a:t>
-            </a:r>
-            <a:r>
-              <a:rPr lang="es-PE" dirty="0"/>
-              <a:t>lenguaje de </a:t>
-            </a:r>
-            <a:r>
-              <a:rPr lang="es-PE" dirty="0" smtClean="0"/>
-              <a:t>programación (</a:t>
-            </a:r>
-            <a:r>
-              <a:rPr lang="es-PE" dirty="0" err="1" smtClean="0"/>
-              <a:t>Nikula</a:t>
-            </a:r>
-            <a:r>
-              <a:rPr lang="es-PE" dirty="0"/>
-              <a:t>, </a:t>
-            </a:r>
-            <a:r>
-              <a:rPr lang="es-PE" dirty="0" err="1"/>
-              <a:t>Sajaniemi</a:t>
-            </a:r>
-            <a:r>
-              <a:rPr lang="es-PE" dirty="0"/>
-              <a:t>, </a:t>
-            </a:r>
-            <a:r>
-              <a:rPr lang="es-PE" dirty="0" err="1"/>
-              <a:t>Tedre</a:t>
-            </a:r>
-            <a:r>
-              <a:rPr lang="es-PE" dirty="0"/>
-              <a:t>, &amp;</a:t>
-            </a:r>
-            <a:r>
-              <a:rPr lang="es-PE" dirty="0" smtClean="0"/>
-              <a:t> </a:t>
-            </a:r>
-            <a:r>
-              <a:rPr lang="es-PE" dirty="0" err="1" smtClean="0"/>
-              <a:t>Wray</a:t>
-            </a:r>
-            <a:r>
-              <a:rPr lang="es-PE" dirty="0" smtClean="0"/>
-              <a:t>, 2007).</a:t>
-            </a:r>
-          </a:p>
-          <a:p>
-            <a:r>
-              <a:rPr lang="es-PE" dirty="0" smtClean="0"/>
-              <a:t>Según </a:t>
-            </a:r>
-            <a:r>
-              <a:rPr lang="es-PE" dirty="0" err="1"/>
-              <a:t>Knobelsdorf</a:t>
-            </a:r>
-            <a:r>
-              <a:rPr lang="es-PE" dirty="0"/>
-              <a:t>, </a:t>
-            </a:r>
-            <a:r>
-              <a:rPr lang="es-PE" dirty="0" err="1"/>
-              <a:t>Kreitz</a:t>
-            </a:r>
-            <a:r>
-              <a:rPr lang="es-PE" dirty="0"/>
-              <a:t>, y </a:t>
-            </a:r>
-            <a:r>
-              <a:rPr lang="es-PE" dirty="0" err="1" smtClean="0"/>
-              <a:t>Böhne</a:t>
-            </a:r>
-            <a:r>
-              <a:rPr lang="es-PE" dirty="0" smtClean="0"/>
-              <a:t> </a:t>
-            </a:r>
-            <a:r>
-              <a:rPr lang="es-PE" dirty="0"/>
-              <a:t>(2014), los altos ratios de fracasos </a:t>
-            </a:r>
-            <a:r>
-              <a:rPr lang="es-PE" dirty="0" smtClean="0"/>
-              <a:t>en los </a:t>
-            </a:r>
-            <a:r>
-              <a:rPr lang="es-PE" dirty="0"/>
-              <a:t>cursos de </a:t>
-            </a:r>
-            <a:r>
-              <a:rPr lang="es-PE" dirty="0" smtClean="0"/>
-              <a:t>introducción </a:t>
-            </a:r>
-            <a:r>
-              <a:rPr lang="es-PE" dirty="0"/>
-              <a:t>a la </a:t>
-            </a:r>
-            <a:r>
-              <a:rPr lang="es-PE" dirty="0" smtClean="0"/>
-              <a:t>teoría </a:t>
-            </a:r>
-            <a:r>
-              <a:rPr lang="es-PE" dirty="0"/>
-              <a:t>de las ciencias de la </a:t>
-            </a:r>
-            <a:r>
-              <a:rPr lang="es-PE" dirty="0" smtClean="0"/>
-              <a:t>computación </a:t>
-            </a:r>
-            <a:r>
-              <a:rPr lang="es-PE" dirty="0"/>
-              <a:t>son </a:t>
-            </a:r>
-            <a:r>
-              <a:rPr lang="es-PE" dirty="0" smtClean="0"/>
-              <a:t>un problema común </a:t>
-            </a:r>
-            <a:r>
-              <a:rPr lang="es-PE" dirty="0"/>
-              <a:t>en las universidades de Alemania, Europa, y </a:t>
-            </a:r>
-            <a:r>
-              <a:rPr lang="es-PE" dirty="0" smtClean="0"/>
-              <a:t>Norte América.</a:t>
-            </a:r>
-            <a:endParaRPr lang="es-PE" dirty="0"/>
-          </a:p>
-        </p:txBody>
-      </p:sp>
-    </p:spTree>
-    <p:extLst>
-      <p:ext uri="{BB962C8B-B14F-4D97-AF65-F5344CB8AC3E}">
-        <p14:creationId xmlns:p14="http://schemas.microsoft.com/office/powerpoint/2010/main" val="926339175"/>
-      </p:ext>
-    </p:extLst>
-  </p:cSld>
-  <p:clrMapOvr>
-    <a:masterClrMapping/>
-  </p:clrMapOvr>
-  <mc:AlternateContent xmlns:mc="http://schemas.openxmlformats.org/markup-compatibility/2006">
-    <mc:Choice xmlns:p14="http://schemas.microsoft.com/office/powerpoint/2010/main" Requires="p14">
-      <p:transition spd="slow" p14:dur="2000"/>
-    </mc:Choice>
-    <mc:Fallback>
-      <p:transition spd="slow"/>
-    </mc:Fallback>
-  </mc:AlternateContent>
-  <p:timing>
-    <p:tnLst>
-      <p:par>
-        <p:cTn id="1" dur="indefinite" restart="never" nodeType="tmRoot"/>
-      </p:par>
-    </p:tnLst>
-  </p:timing>
-</p:sld>
-</file>
-
-<file path=ppt/slides/slide5.xml><?xml version="1.0" encoding="utf-8"?>
-<p:sld xmlns:a="http://schemas.openxmlformats.org/drawingml/2006/main" xmlns:r="http://schemas.openxmlformats.org/officeDocument/2006/relationships" xmlns:p="http://schemas.openxmlformats.org/presentationml/2006/main" show="0">
-  <p:cSld>
-    <p:spTree>
-      <p:nvGrpSpPr>
-        <p:cNvPr id="1" name=""/>
-        <p:cNvGrpSpPr/>
-        <p:nvPr/>
-      </p:nvGrpSpPr>
-      <p:grpSpPr>
-        <a:xfrm>
-          <a:off x="0" y="0"/>
-          <a:ext cx="0" cy="0"/>
-          <a:chOff x="0" y="0"/>
-          <a:chExt cx="0" cy="0"/>
-        </a:xfrm>
-      </p:grpSpPr>
-      <p:sp>
-        <p:nvSpPr>
-          <p:cNvPr id="2" name="1 Título"/>
-          <p:cNvSpPr>
-            <a:spLocks noGrp="1"/>
-          </p:cNvSpPr>
-          <p:nvPr>
-            <p:ph type="title"/>
-          </p:nvPr>
-        </p:nvSpPr>
-        <p:spPr>
-          <a:xfrm>
-            <a:off x="551280" y="436563"/>
-            <a:ext cx="8041440" cy="904205"/>
-          </a:xfrm>
-        </p:spPr>
-        <p:txBody>
-          <a:bodyPr/>
-          <a:lstStyle/>
-          <a:p>
-            <a:r>
-              <a:rPr lang="es-PE" sz="4000" dirty="0" smtClean="0"/>
-              <a:t>ANTECEDENTES DE LA TÉCNICA</a:t>
-            </a:r>
-            <a:endParaRPr lang="es-PE" sz="4000" dirty="0"/>
-          </a:p>
-        </p:txBody>
-      </p:sp>
-      <p:sp>
-        <p:nvSpPr>
-          <p:cNvPr id="3" name="2 Marcador de contenido"/>
-          <p:cNvSpPr>
-            <a:spLocks noGrp="1"/>
-          </p:cNvSpPr>
-          <p:nvPr>
-            <p:ph idx="1"/>
-          </p:nvPr>
-        </p:nvSpPr>
-        <p:spPr>
-          <a:xfrm>
-            <a:off x="838200" y="1556792"/>
-            <a:ext cx="7467600" cy="4680520"/>
-          </a:xfrm>
-        </p:spPr>
-        <p:txBody>
-          <a:bodyPr>
-            <a:normAutofit fontScale="85000" lnSpcReduction="10000"/>
-          </a:bodyPr>
-          <a:lstStyle/>
-          <a:p>
-            <a:pPr algn="just"/>
-            <a:r>
-              <a:rPr lang="es-PE" dirty="0"/>
-              <a:t>La técnica de </a:t>
-            </a:r>
-            <a:r>
-              <a:rPr lang="es-PE" dirty="0" err="1"/>
-              <a:t>Jigsaw</a:t>
-            </a:r>
-            <a:r>
-              <a:rPr lang="es-PE" dirty="0"/>
-              <a:t> fue creada en (1978) por </a:t>
-            </a:r>
-            <a:r>
-              <a:rPr lang="es-PE" dirty="0" err="1"/>
-              <a:t>Aronson</a:t>
-            </a:r>
-            <a:r>
-              <a:rPr lang="es-PE" dirty="0"/>
-              <a:t> et al. y </a:t>
-            </a:r>
-            <a:r>
-              <a:rPr lang="es-PE" dirty="0" smtClean="0"/>
-              <a:t>es </a:t>
-            </a:r>
-            <a:r>
-              <a:rPr lang="es-PE" dirty="0"/>
-              <a:t>una de las mas importantes técnicas para fomentar la cooperación y discusión entre miembros de una comunidad de aprendizaje (</a:t>
-            </a:r>
-            <a:r>
-              <a:rPr lang="es-PE" dirty="0" err="1"/>
-              <a:t>Blocher</a:t>
-            </a:r>
-            <a:r>
-              <a:rPr lang="es-PE" dirty="0"/>
-              <a:t>, 2005</a:t>
-            </a:r>
-            <a:r>
-              <a:rPr lang="es-PE" dirty="0" smtClean="0"/>
-              <a:t>).</a:t>
-            </a:r>
-          </a:p>
-          <a:p>
-            <a:pPr algn="just"/>
-            <a:r>
-              <a:rPr lang="es-PE" dirty="0"/>
-              <a:t>La técnica de </a:t>
-            </a:r>
-            <a:r>
-              <a:rPr lang="es-PE" dirty="0" err="1"/>
-              <a:t>Jigsaw</a:t>
-            </a:r>
-            <a:r>
-              <a:rPr lang="es-PE" dirty="0"/>
-              <a:t> ha sido usada en los procesos educacionales en países de todos los continentes y puede mejorar el rendimiento de los alumnos y estudiantes a través del aprendizaje colaborativo (</a:t>
-            </a:r>
-            <a:r>
-              <a:rPr lang="es-PE" dirty="0" err="1"/>
-              <a:t>Maftei</a:t>
-            </a:r>
-            <a:r>
-              <a:rPr lang="es-PE" dirty="0"/>
-              <a:t> &amp; </a:t>
-            </a:r>
-            <a:r>
-              <a:rPr lang="es-PE" dirty="0" err="1"/>
-              <a:t>Maftei</a:t>
-            </a:r>
-            <a:r>
-              <a:rPr lang="es-PE" dirty="0"/>
-              <a:t>, 2011).</a:t>
-            </a:r>
-          </a:p>
-          <a:p>
-            <a:pPr algn="just"/>
-            <a:r>
-              <a:rPr lang="es-PE" dirty="0" err="1" smtClean="0"/>
-              <a:t>Azizinezhad</a:t>
-            </a:r>
-            <a:r>
-              <a:rPr lang="es-PE" dirty="0"/>
-              <a:t>, </a:t>
-            </a:r>
-            <a:r>
-              <a:rPr lang="es-PE" dirty="0" err="1"/>
-              <a:t>Hashemi</a:t>
-            </a:r>
-            <a:r>
-              <a:rPr lang="es-PE" dirty="0"/>
-              <a:t>, y </a:t>
-            </a:r>
-            <a:r>
-              <a:rPr lang="es-PE" dirty="0" err="1"/>
-              <a:t>Darvishi</a:t>
-            </a:r>
-            <a:r>
-              <a:rPr lang="es-PE" dirty="0"/>
-              <a:t> (2013) realizaron un estudio para </a:t>
-            </a:r>
-            <a:r>
-              <a:rPr lang="es-PE" dirty="0" smtClean="0"/>
-              <a:t>investigar los </a:t>
-            </a:r>
-            <a:r>
-              <a:rPr lang="es-PE" dirty="0"/>
-              <a:t>efectos del aprendizaje colaborativo en el aprendizaje del </a:t>
-            </a:r>
-            <a:r>
-              <a:rPr lang="es-PE" dirty="0" smtClean="0"/>
-              <a:t>idioma inglés </a:t>
-            </a:r>
-            <a:r>
-              <a:rPr lang="es-PE" dirty="0"/>
-              <a:t>como lengua extranjera para los alumnos</a:t>
-            </a:r>
-            <a:r>
-              <a:rPr lang="es-PE" dirty="0" smtClean="0"/>
-              <a:t>.</a:t>
-            </a:r>
-          </a:p>
-          <a:p>
-            <a:pPr algn="just"/>
-            <a:r>
-              <a:rPr lang="es-PE" dirty="0"/>
-              <a:t>La técnica de </a:t>
-            </a:r>
-            <a:r>
-              <a:rPr lang="es-PE" dirty="0" err="1"/>
-              <a:t>Jigsaw</a:t>
-            </a:r>
-            <a:r>
-              <a:rPr lang="es-PE" dirty="0"/>
-              <a:t>, fue implementada en un sistema web en el  2013 en la Universidad Pontificia Católica del Perú con el n de automatizar los procesos que se requiere aplicar dicha técnica al aprendizaje colaborativo (Pinzas &amp; </a:t>
-            </a:r>
-            <a:r>
-              <a:rPr lang="es-PE" dirty="0" err="1"/>
-              <a:t>Yatsen</a:t>
-            </a:r>
-            <a:r>
-              <a:rPr lang="es-PE" dirty="0"/>
-              <a:t>, 2013).</a:t>
-            </a:r>
-          </a:p>
-          <a:p>
-            <a:pPr algn="just"/>
-            <a:endParaRPr lang="es-PE" dirty="0" smtClean="0"/>
-          </a:p>
-        </p:txBody>
-      </p:sp>
-    </p:spTree>
-    <p:extLst>
-      <p:ext uri="{BB962C8B-B14F-4D97-AF65-F5344CB8AC3E}">
-        <p14:creationId xmlns:p14="http://schemas.microsoft.com/office/powerpoint/2010/main" val="3487464985"/>
-      </p:ext>
-    </p:extLst>
-  </p:cSld>
-  <p:clrMapOvr>
-    <a:masterClrMapping/>
-  </p:clrMapOvr>
-  <mc:AlternateContent xmlns:mc="http://schemas.openxmlformats.org/markup-compatibility/2006">
-    <mc:Choice xmlns:p14="http://schemas.microsoft.com/office/powerpoint/2010/main" Requires="p14">
-      <p:transition spd="slow" p14:dur="2000"/>
-    </mc:Choice>
-    <mc:Fallback>
-      <p:transition spd="slow"/>
-    </mc:Fallback>
-  </mc:AlternateContent>
-  <p:timing>
-    <p:tnLst>
-      <p:par>
-        <p:cTn id="1" dur="indefinite" restart="never" nodeType="tmRoot"/>
-      </p:par>
-    </p:tnLst>
-  </p:timing>
-</p:sld>
-</file>
-
-<file path=ppt/slides/slide6.xml><?xml version="1.0" encoding="utf-8"?>
 <p:sld xmlns:a="http://schemas.openxmlformats.org/drawingml/2006/main" xmlns:r="http://schemas.openxmlformats.org/officeDocument/2006/relationships" xmlns:p="http://schemas.openxmlformats.org/presentationml/2006/main">
   <p:cSld>
     <p:spTree>
@@ -12542,24 +11777,28 @@
               <a:t>, muchos estudiantes tienen </a:t>
             </a:r>
             <a:r>
+              <a:rPr lang="es-PE" b="1" dirty="0" smtClean="0"/>
+              <a:t>dificultades </a:t>
+            </a:r>
+            <a:r>
+              <a:rPr lang="es-PE" b="1" dirty="0"/>
+              <a:t>para llevar con </a:t>
+            </a:r>
+            <a:r>
+              <a:rPr lang="es-PE" b="1" dirty="0" smtClean="0"/>
+              <a:t>éxito los </a:t>
+            </a:r>
+            <a:r>
+              <a:rPr lang="es-PE" b="1" dirty="0"/>
+              <a:t>cursos de algoritmos y </a:t>
+            </a:r>
+            <a:r>
+              <a:rPr lang="es-PE" b="1" dirty="0" smtClean="0"/>
+              <a:t>programación</a:t>
+            </a:r>
+            <a:r>
               <a:rPr lang="es-PE" dirty="0" smtClean="0"/>
-              <a:t>dificultades </a:t>
-            </a:r>
-            <a:r>
-              <a:rPr lang="es-PE" dirty="0"/>
-              <a:t>para llevar con </a:t>
-            </a:r>
-            <a:r>
-              <a:rPr lang="es-PE" dirty="0" smtClean="0"/>
-              <a:t>éxito los </a:t>
-            </a:r>
-            <a:r>
-              <a:rPr lang="es-PE" dirty="0"/>
-              <a:t>cursos de algoritmos y </a:t>
-            </a:r>
-            <a:r>
-              <a:rPr lang="es-PE" dirty="0" smtClean="0"/>
-              <a:t>programación, </a:t>
+              <a:t>, </a:t>
             </a:r>
             <a:r>
               <a:rPr lang="es-PE" dirty="0"/>
@@ -12617,7 +11856,7 @@
 </p:sld>
 </file>
 
-<file path=ppt/slides/slide7.xml><?xml version="1.0" encoding="utf-8"?>
+<file path=ppt/slides/slide5.xml><?xml version="1.0" encoding="utf-8"?>
 <p:sld xmlns:a="http://schemas.openxmlformats.org/drawingml/2006/main" xmlns:r="http://schemas.openxmlformats.org/officeDocument/2006/relationships" xmlns:p="http://schemas.openxmlformats.org/presentationml/2006/main">
   <p:cSld>
     <p:spTree>
@@ -12675,7 +11914,7 @@
         </p:spPr>
         <p:txBody>
           <a:bodyPr>
-            <a:normAutofit fontScale="85000" lnSpcReduction="20000"/>
+            <a:normAutofit fontScale="85000" lnSpcReduction="10000"/>
           </a:bodyPr>
           <a:lstStyle/>
           <a:p>
@@ -12718,70 +11957,26 @@
             </a:r>
             <a:r>
               <a:rPr lang="es-PE" dirty="0"/>
-              <a:t>de ratios de fracasos alrededor de 26% a 40 %. (</a:t>
-            </a:r>
-            <a:r>
-              <a:rPr lang="es-PE" dirty="0" err="1"/>
-              <a:t>Sheard</a:t>
-            </a:r>
-            <a:r>
-              <a:rPr lang="es-PE" dirty="0"/>
-              <a:t> &amp; Hagan</a:t>
-            </a:r>
-            <a:r>
-              <a:rPr lang="es-PE" dirty="0" smtClean="0"/>
-              <a:t>, 1998</a:t>
-            </a:r>
-            <a:r>
-              <a:rPr lang="es-PE" dirty="0"/>
-              <a:t>; </a:t>
-            </a:r>
-            <a:r>
-              <a:rPr lang="es-PE" dirty="0" err="1"/>
-              <a:t>Truong</a:t>
-            </a:r>
-            <a:r>
-              <a:rPr lang="es-PE" dirty="0"/>
-              <a:t>, </a:t>
-            </a:r>
-            <a:r>
-              <a:rPr lang="es-PE" dirty="0" err="1" smtClean="0"/>
-              <a:t>Bancroft</a:t>
-            </a:r>
-            <a:r>
-              <a:rPr lang="es-PE" dirty="0"/>
-              <a:t>, &amp; Roe, 2003; </a:t>
-            </a:r>
-            <a:r>
-              <a:rPr lang="es-PE" dirty="0" err="1"/>
-              <a:t>Lang</a:t>
-            </a:r>
-            <a:r>
-              <a:rPr lang="es-PE" dirty="0"/>
-              <a:t>, </a:t>
-            </a:r>
-            <a:r>
-              <a:rPr lang="es-PE" dirty="0" err="1"/>
-              <a:t>McKay</a:t>
-            </a:r>
-            <a:r>
-              <a:rPr lang="es-PE" dirty="0"/>
-              <a:t>, &amp; Lewis, 2007; Han </a:t>
-            </a:r>
-            <a:r>
-              <a:rPr lang="es-PE" dirty="0" smtClean="0"/>
+              <a:t>de ratios de fracasos alrededor de 26% a 40 %. </a:t>
+            </a:r>
+            <a:r>
+              <a:rPr lang="es-PE" b="1" dirty="0" smtClean="0"/>
+              <a:t>(Han </a:t>
+            </a:r>
+            <a:r>
+              <a:rPr lang="es-PE" b="1" dirty="0" smtClean="0"/>
               <a:t>&amp; </a:t>
             </a:r>
             <a:r>
-              <a:rPr lang="es-PE" dirty="0" err="1" smtClean="0"/>
+              <a:rPr lang="es-PE" b="1" dirty="0" err="1" smtClean="0"/>
               <a:t>Beheshti</a:t>
             </a:r>
             <a:r>
-              <a:rPr lang="es-PE" dirty="0"/>
+              <a:rPr lang="es-PE" b="1" dirty="0"/>
               <a:t>, 2010</a:t>
             </a:r>
             <a:r>
-              <a:rPr lang="es-PE" dirty="0" smtClean="0"/>
+              <a:rPr lang="es-PE" b="1" dirty="0" smtClean="0"/>
               <a:t>).</a:t>
             </a:r>
           </a:p>
@@ -12809,77 +12004,96 @@
             </a:r>
             <a:r>
               <a:rPr lang="es-PE" dirty="0" smtClean="0"/>
-              <a:t>Norte América, </a:t>
-            </a:r>
-            <a:r>
-              <a:rPr lang="es-PE" dirty="0"/>
-              <a:t>ya que los alumnos tiene problemas para entender los </a:t>
+              <a:t>Norte </a:t>
             </a:r>
             <a:r>
               <a:rPr lang="es-PE" dirty="0" smtClean="0"/>
-              <a:t>contenidos de </a:t>
-            </a:r>
-            <a:r>
-              <a:rPr lang="es-PE" dirty="0"/>
-              <a:t>tales cursos debido a su </a:t>
-            </a:r>
-            <a:r>
-              <a:rPr lang="es-PE" dirty="0" smtClean="0"/>
-              <a:t>abstracción </a:t>
-            </a:r>
-            <a:r>
-              <a:rPr lang="es-PE" dirty="0"/>
-              <a:t>y naturaleza </a:t>
-            </a:r>
-            <a:r>
-              <a:rPr lang="es-PE" dirty="0" smtClean="0"/>
-              <a:t>teórica </a:t>
-            </a:r>
-            <a:r>
-              <a:rPr lang="es-PE" dirty="0"/>
-              <a:t>(</a:t>
-            </a:r>
-            <a:r>
-              <a:rPr lang="es-PE" dirty="0" err="1"/>
-              <a:t>Knobelsdorf</a:t>
+              <a:t>América</a:t>
             </a:r>
             <a:r>
               <a:rPr lang="es-PE" dirty="0"/>
               <a:t> </a:t>
             </a:r>
             <a:r>
+              <a:rPr lang="es-PE" b="1" dirty="0" smtClean="0"/>
+              <a:t>(</a:t>
+            </a:r>
+            <a:r>
+              <a:rPr lang="es-PE" b="1" dirty="0" err="1" smtClean="0"/>
+              <a:t>Knobelsdorf</a:t>
+            </a:r>
+            <a:r>
+              <a:rPr lang="es-PE" b="1" dirty="0" smtClean="0"/>
+              <a:t> </a:t>
+            </a:r>
+            <a:r>
+              <a:rPr lang="es-PE" b="1" dirty="0" smtClean="0"/>
+              <a:t>et al</a:t>
+            </a:r>
+            <a:r>
+              <a:rPr lang="es-PE" b="1" dirty="0"/>
+              <a:t>., 2014</a:t>
+            </a:r>
+            <a:r>
+              <a:rPr lang="es-PE" b="1" dirty="0" smtClean="0"/>
+              <a:t>).</a:t>
+            </a:r>
+          </a:p>
+          <a:p>
+            <a:pPr algn="just">
+              <a:buFont typeface="Wingdings" panose="05000000000000000000" pitchFamily="2" charset="2"/>
+              <a:buChar char="v"/>
+            </a:pPr>
+            <a:r>
+              <a:rPr lang="es-PE" b="1" dirty="0"/>
+              <a:t>Martínez y Camacho (2011)</a:t>
+            </a:r>
+            <a:r>
+              <a:rPr lang="es-PE" dirty="0"/>
+              <a:t> presentaron </a:t>
+            </a:r>
+            <a:r>
               <a:rPr lang="es-PE" dirty="0" smtClean="0"/>
-              <a:t>et al</a:t>
+              <a:t>una </a:t>
             </a:r>
             <a:r>
               <a:rPr lang="es-PE" dirty="0"/>
-              <a:t>., 2014</a:t>
+              <a:t>estrategia de enseñanza basada en aprendizaje colaborativo </a:t>
             </a:r>
             <a:r>
               <a:rPr lang="es-PE" dirty="0" smtClean="0"/>
-              <a:t>).</a:t>
-            </a:r>
-          </a:p>
-          <a:p>
-            <a:pPr algn="just"/>
+              <a:t>para el </a:t>
+            </a:r>
             <a:r>
               <a:rPr lang="es-PE" dirty="0"/>
-              <a:t>Martínez y Camacho (2011) presentaron el diseño, implementación y evaluación de una estrategia de enseñanza basada en aprendizaje colaborativo para introducir el tema de algebra relacional en un curso de base de datos.</a:t>
-            </a:r>
-          </a:p>
-          <a:p>
-            <a:pPr algn="just"/>
-            <a:r>
-              <a:rPr lang="es-PE" dirty="0" err="1"/>
+              <a:t>tema de algebra relacional en un curso de base de datos</a:t>
+            </a:r>
+            <a:r>
+              <a:rPr lang="es-PE" dirty="0" smtClean="0"/>
+              <a:t>. Se obtuvo que entre un 78% y 92% de los estudiantes enriquecieron su aprendizaje.</a:t>
+            </a:r>
+            <a:endParaRPr lang="es-PE" dirty="0"/>
+          </a:p>
+          <a:p>
+            <a:pPr algn="just">
+              <a:buFont typeface="Wingdings" panose="05000000000000000000" pitchFamily="2" charset="2"/>
+              <a:buChar char="v"/>
+            </a:pPr>
+            <a:r>
+              <a:rPr lang="es-PE" b="1" dirty="0" err="1"/>
               <a:t>Cliburn</a:t>
             </a:r>
             <a:r>
+              <a:rPr lang="es-PE" b="1" dirty="0"/>
+              <a:t> (2014)</a:t>
+            </a:r>
+            <a:r>
               <a:rPr lang="es-PE" dirty="0"/>
-              <a:t> (2014) desarrolló el curso de Estructura de Datos a través del aprendizaje basado en equipos y el aprendizaje tradicional</a:t>
+              <a:t> desarrolló el curso de Estructura de Datos a través del aprendizaje basado en equipos y el aprendizaje tradicional</a:t>
             </a:r>
             <a:r>
               <a:rPr lang="es-PE" dirty="0" smtClean="0"/>
-              <a:t>.</a:t>
+              <a:t>. Se obtuvo una alta satisfacción de los alumnos hacia el aprendizaje colaborativo.</a:t>
             </a:r>
             <a:endParaRPr lang="es-PE" dirty="0"/>
           </a:p>
@@ -12905,201 +12119,7 @@
 </p:sld>
 </file>
 
-<file path=ppt/slides/slide8.xml><?xml version="1.0" encoding="utf-8"?>
-<p:sld xmlns:a="http://schemas.openxmlformats.org/drawingml/2006/main" xmlns:r="http://schemas.openxmlformats.org/officeDocument/2006/relationships" xmlns:p="http://schemas.openxmlformats.org/presentationml/2006/main" show="0">
-  <p:cSld>
-    <p:spTree>
-      <p:nvGrpSpPr>
-        <p:cNvPr id="1" name=""/>
-        <p:cNvGrpSpPr/>
-        <p:nvPr/>
-      </p:nvGrpSpPr>
-      <p:grpSpPr>
-        <a:xfrm>
-          <a:off x="0" y="0"/>
-          <a:ext cx="0" cy="0"/>
-          <a:chOff x="0" y="0"/>
-          <a:chExt cx="0" cy="0"/>
-        </a:xfrm>
-      </p:grpSpPr>
-      <p:sp>
-        <p:nvSpPr>
-          <p:cNvPr id="2" name="1 Título"/>
-          <p:cNvSpPr>
-            <a:spLocks noGrp="1"/>
-          </p:cNvSpPr>
-          <p:nvPr>
-            <p:ph type="title"/>
-          </p:nvPr>
-        </p:nvSpPr>
-        <p:spPr/>
-        <p:txBody>
-          <a:bodyPr/>
-          <a:lstStyle/>
-          <a:p>
-            <a:r>
-              <a:rPr lang="es-PE" dirty="0" smtClean="0"/>
-              <a:t>JUSTIFICACIÓN TEÓRICA</a:t>
-            </a:r>
-            <a:endParaRPr lang="es-PE" dirty="0"/>
-          </a:p>
-        </p:txBody>
-      </p:sp>
-      <p:sp>
-        <p:nvSpPr>
-          <p:cNvPr id="3" name="2 Marcador de contenido"/>
-          <p:cNvSpPr>
-            <a:spLocks noGrp="1"/>
-          </p:cNvSpPr>
-          <p:nvPr>
-            <p:ph idx="1"/>
-          </p:nvPr>
-        </p:nvSpPr>
-        <p:spPr>
-          <a:xfrm>
-            <a:off x="838200" y="1700808"/>
-            <a:ext cx="7467600" cy="4392488"/>
-          </a:xfrm>
-        </p:spPr>
-        <p:txBody>
-          <a:bodyPr>
-            <a:normAutofit/>
-          </a:bodyPr>
-          <a:lstStyle/>
-          <a:p>
-            <a:pPr algn="just"/>
-            <a:r>
-              <a:rPr lang="es-PE" dirty="0" smtClean="0"/>
-              <a:t>Martínez </a:t>
-            </a:r>
-            <a:r>
-              <a:rPr lang="es-PE" dirty="0"/>
-              <a:t>y Camacho (2011) presentaron el </a:t>
-            </a:r>
-            <a:r>
-              <a:rPr lang="es-PE" dirty="0" smtClean="0"/>
-              <a:t>diseño</a:t>
-            </a:r>
-            <a:r>
-              <a:rPr lang="es-PE" dirty="0"/>
-              <a:t>, </a:t>
-            </a:r>
-            <a:r>
-              <a:rPr lang="es-PE" dirty="0" smtClean="0"/>
-              <a:t>implementación </a:t>
-            </a:r>
-            <a:r>
-              <a:rPr lang="es-PE" dirty="0"/>
-              <a:t>y </a:t>
-            </a:r>
-            <a:r>
-              <a:rPr lang="es-PE" dirty="0" smtClean="0"/>
-              <a:t>evaluación </a:t>
-            </a:r>
-            <a:r>
-              <a:rPr lang="es-PE" dirty="0"/>
-              <a:t>de una estrategia de </a:t>
-            </a:r>
-            <a:r>
-              <a:rPr lang="es-PE" dirty="0" smtClean="0"/>
-              <a:t>enseñanza </a:t>
-            </a:r>
-            <a:r>
-              <a:rPr lang="es-PE" dirty="0"/>
-              <a:t>basada en </a:t>
-            </a:r>
-            <a:r>
-              <a:rPr lang="es-PE" dirty="0" smtClean="0"/>
-              <a:t>aprendizaje colaborativo para </a:t>
-            </a:r>
-            <a:r>
-              <a:rPr lang="es-PE" dirty="0"/>
-              <a:t>introducir el tema de algebra relacional en un curso de </a:t>
-            </a:r>
-            <a:r>
-              <a:rPr lang="es-PE" dirty="0" smtClean="0"/>
-              <a:t>base de </a:t>
-            </a:r>
-            <a:r>
-              <a:rPr lang="es-PE" dirty="0"/>
-              <a:t>datos</a:t>
-            </a:r>
-            <a:r>
-              <a:rPr lang="es-PE" dirty="0" smtClean="0"/>
-              <a:t>.</a:t>
-            </a:r>
-          </a:p>
-          <a:p>
-            <a:pPr algn="just"/>
-            <a:r>
-              <a:rPr lang="es-PE" dirty="0" err="1"/>
-              <a:t>Cliburn</a:t>
-            </a:r>
-            <a:r>
-              <a:rPr lang="es-PE" dirty="0"/>
-              <a:t> (2014) </a:t>
-            </a:r>
-            <a:r>
-              <a:rPr lang="es-PE" dirty="0" smtClean="0"/>
-              <a:t>desarrolló </a:t>
-            </a:r>
-            <a:r>
-              <a:rPr lang="es-PE" dirty="0"/>
-              <a:t>el curso de Estructura de Datos a </a:t>
-            </a:r>
-            <a:r>
-              <a:rPr lang="es-PE" dirty="0" smtClean="0"/>
-              <a:t>través </a:t>
-            </a:r>
-            <a:r>
-              <a:rPr lang="es-PE" dirty="0"/>
-              <a:t>del aprendizaje basado </a:t>
-            </a:r>
-            <a:r>
-              <a:rPr lang="es-PE" dirty="0" smtClean="0"/>
-              <a:t>en equipos </a:t>
-            </a:r>
-            <a:r>
-              <a:rPr lang="es-PE" dirty="0"/>
-              <a:t>y el aprendizaje </a:t>
-            </a:r>
-            <a:r>
-              <a:rPr lang="es-PE" dirty="0" smtClean="0"/>
-              <a:t>tradicional.</a:t>
-            </a:r>
-            <a:endParaRPr lang="es-PE" dirty="0"/>
-          </a:p>
-        </p:txBody>
-      </p:sp>
-    </p:spTree>
-    <p:extLst>
-      <p:ext uri="{BB962C8B-B14F-4D97-AF65-F5344CB8AC3E}">
-        <p14:creationId xmlns:p14="http://schemas.microsoft.com/office/powerpoint/2010/main" val="3462542453"/>
-      </p:ext>
-    </p:extLst>
-  </p:cSld>
-  <p:clrMapOvr>
-    <a:masterClrMapping/>
-  </p:clrMapOvr>
-  <mc:AlternateContent xmlns:mc="http://schemas.openxmlformats.org/markup-compatibility/2006">
-    <mc:Choice xmlns:p14="http://schemas.microsoft.com/office/powerpoint/2010/main" Requires="p14">
-      <p:transition spd="slow" p14:dur="2000"/>
-    </mc:Choice>
-    <mc:Fallback>
-      <p:transition spd="slow"/>
-    </mc:Fallback>
-  </mc:AlternateContent>
-  <p:timing>
-    <p:tnLst>
-      <p:par>
-        <p:cTn id="1" dur="indefinite" restart="never" nodeType="tmRoot"/>
-      </p:par>
-    </p:tnLst>
-  </p:timing>
-</p:sld>
-</file>
-
-<file path=ppt/slides/slide9.xml><?xml version="1.0" encoding="utf-8"?>
+<file path=ppt/slides/slide6.xml><?xml version="1.0" encoding="utf-8"?>
 <p:sld xmlns:a="http://schemas.openxmlformats.org/drawingml/2006/main" xmlns:r="http://schemas.openxmlformats.org/officeDocument/2006/relationships" xmlns:p="http://schemas.openxmlformats.org/presentationml/2006/main">
   <p:cSld>
     <p:spTree>
@@ -13198,15 +12218,15 @@
             <a:pPr algn="just"/>
             <a:r>
               <a:rPr lang="es-PE" dirty="0"/>
-              <a:t>Desarrollar un sistema web de tiempo real para promover el </a:t>
+              <a:t>Desarrollar un sistema web para promover el aprendizaje colaborativo </a:t>
             </a:r>
             <a:r>
               <a:rPr lang="es-PE" dirty="0" smtClean="0"/>
-              <a:t>aprendizaje colaborativo </a:t>
+              <a:t>de los </a:t>
             </a:r>
             <a:r>
               <a:rPr lang="es-PE" dirty="0"/>
-              <a:t>de los estudiantes a </a:t>
+              <a:t>estudiantes a </a:t>
             </a:r>
             <a:r>
               <a:rPr lang="es-PE" dirty="0" smtClean="0"/>
@@ -13234,11 +12254,11 @@
             </a:r>
             <a:r>
               <a:rPr lang="es-PE" dirty="0" smtClean="0"/>
-              <a:t>enfocándolo específicamente </a:t>
+              <a:t>enfocándolo específicamente a </a:t>
             </a:r>
             <a:r>
               <a:rPr lang="es-PE" dirty="0"/>
-              <a:t>a la </a:t>
+              <a:t>la </a:t>
             </a:r>
             <a:r>
               <a:rPr lang="es-PE" dirty="0" smtClean="0"/>
@@ -13260,6 +12280,529 @@
     <p:extLst>
       <p:ext uri="{BB962C8B-B14F-4D97-AF65-F5344CB8AC3E}">
         <p14:creationId xmlns:p14="http://schemas.microsoft.com/office/powerpoint/2010/main" val="3349435097"/>
+      </p:ext>
+    </p:extLst>
+  </p:cSld>
+  <p:clrMapOvr>
+    <a:masterClrMapping/>
+  </p:clrMapOvr>
+  <p:timing>
+    <p:tnLst>
+      <p:par>
+        <p:cTn id="1" dur="indefinite" restart="never" nodeType="tmRoot"/>
+      </p:par>
+    </p:tnLst>
+  </p:timing>
+</p:sld>
+</file>
+
+<file path=ppt/slides/slide7.xml><?xml version="1.0" encoding="utf-8"?>
+<p:sld xmlns:a="http://schemas.openxmlformats.org/drawingml/2006/main" xmlns:r="http://schemas.openxmlformats.org/officeDocument/2006/relationships" xmlns:p="http://schemas.openxmlformats.org/presentationml/2006/main">
+  <p:cSld>
+    <p:spTree>
+      <p:nvGrpSpPr>
+        <p:cNvPr id="1" name=""/>
+        <p:cNvGrpSpPr/>
+        <p:nvPr/>
+      </p:nvGrpSpPr>
+      <p:grpSpPr>
+        <a:xfrm>
+          <a:off x="0" y="0"/>
+          <a:ext cx="0" cy="0"/>
+          <a:chOff x="0" y="0"/>
+          <a:chExt cx="0" cy="0"/>
+        </a:xfrm>
+      </p:grpSpPr>
+      <p:pic>
+        <p:nvPicPr>
+          <p:cNvPr id="9222" name="Picture 6" descr="http://fivan.org/wp-content/uploads/2011/06/Diana.jpg"/>
+          <p:cNvPicPr>
+            <a:picLocks noChangeAspect="1" noChangeArrowheads="1"/>
+          </p:cNvPicPr>
+          <p:nvPr/>
+        </p:nvPicPr>
+        <p:blipFill>
+          <a:blip r:embed="rId2" cstate="print">
+            <a:lum bright="70000" contrast="-70000"/>
+            <a:extLst>
+              <a:ext uri="{28A0092B-C50C-407E-A947-70E740481C1C}">
+                <a14:useLocalDpi xmlns:a14="http://schemas.microsoft.com/office/drawing/2010/main" val="0"/>
+              </a:ext>
+            </a:extLst>
+          </a:blip>
+          <a:srcRect/>
+          <a:stretch>
+            <a:fillRect/>
+          </a:stretch>
+        </p:blipFill>
+        <p:spPr bwMode="auto">
+          <a:xfrm>
+            <a:off x="3347864" y="1478304"/>
+            <a:ext cx="5103958" cy="4746682"/>
+          </a:xfrm>
+          <a:prstGeom prst="rect">
+            <a:avLst/>
+          </a:prstGeom>
+          <a:noFill/>
+          <a:extLst>
+            <a:ext uri="{909E8E84-426E-40DD-AFC4-6F175D3DCCD1}">
+              <a14:hiddenFill xmlns:a14="http://schemas.microsoft.com/office/drawing/2010/main">
+                <a:solidFill>
+                  <a:srgbClr val="FFFFFF"/>
+                </a:solidFill>
+              </a14:hiddenFill>
+            </a:ext>
+          </a:extLst>
+        </p:spPr>
+      </p:pic>
+      <p:sp>
+        <p:nvSpPr>
+          <p:cNvPr id="2" name="1 Título"/>
+          <p:cNvSpPr>
+            <a:spLocks noGrp="1"/>
+          </p:cNvSpPr>
+          <p:nvPr>
+            <p:ph type="title"/>
+          </p:nvPr>
+        </p:nvSpPr>
+        <p:spPr/>
+        <p:txBody>
+          <a:bodyPr/>
+          <a:lstStyle/>
+          <a:p>
+            <a:r>
+              <a:rPr lang="es-PE" dirty="0" smtClean="0"/>
+              <a:t>OBJETIVOS ESPECÍFICOS</a:t>
+            </a:r>
+            <a:endParaRPr lang="es-PE" dirty="0"/>
+          </a:p>
+        </p:txBody>
+      </p:sp>
+      <p:sp>
+        <p:nvSpPr>
+          <p:cNvPr id="3" name="2 Marcador de contenido"/>
+          <p:cNvSpPr>
+            <a:spLocks noGrp="1"/>
+          </p:cNvSpPr>
+          <p:nvPr>
+            <p:ph idx="1"/>
+          </p:nvPr>
+        </p:nvSpPr>
+        <p:spPr/>
+        <p:txBody>
+          <a:bodyPr>
+            <a:normAutofit/>
+          </a:bodyPr>
+          <a:lstStyle/>
+          <a:p>
+            <a:r>
+              <a:rPr lang="es-PE" dirty="0"/>
+              <a:t>Investigar sobre diferentes </a:t>
+            </a:r>
+            <a:r>
+              <a:rPr lang="es-PE" dirty="0" smtClean="0"/>
+              <a:t>técnicas </a:t>
+            </a:r>
+            <a:r>
+              <a:rPr lang="es-PE" dirty="0"/>
+              <a:t>y herramientas </a:t>
+            </a:r>
+            <a:r>
+              <a:rPr lang="es-PE" dirty="0" smtClean="0"/>
+              <a:t>informáticas </a:t>
+            </a:r>
+            <a:r>
+              <a:rPr lang="es-PE" dirty="0"/>
+              <a:t>para </a:t>
+            </a:r>
+            <a:r>
+              <a:rPr lang="es-PE" dirty="0" smtClean="0"/>
+              <a:t>el aprendizaje colaborativo.</a:t>
+            </a:r>
+          </a:p>
+          <a:p>
+            <a:r>
+              <a:rPr lang="es-PE" dirty="0" smtClean="0"/>
+              <a:t>Definir </a:t>
+            </a:r>
+            <a:r>
+              <a:rPr lang="es-PE" dirty="0" smtClean="0"/>
+              <a:t>3 métricas de calidad para el desarrollo del sistema.</a:t>
+            </a:r>
+          </a:p>
+          <a:p>
+            <a:r>
+              <a:rPr lang="es-PE" dirty="0" smtClean="0"/>
+              <a:t>Aplicar el sistema web a la enseñanza de algoritmos y programación en la FISI – UNMSM.</a:t>
+            </a:r>
+            <a:endParaRPr lang="es-PE" dirty="0"/>
+          </a:p>
+        </p:txBody>
+      </p:sp>
+      <p:sp>
+        <p:nvSpPr>
+          <p:cNvPr id="4" name="AutoShape 2" descr="data:image/jpeg;base64,/9j/4AAQSkZJRgABAQAAAQABAAD/2wCEAAkGBxQQEhMUExMWEhUXFxcXGBQYFRQYGBgaFxUWFhcYFBgYHCggGBolGxYXITEhJSkrLi4vGR8zODMsNygtLisBCgoKDg0OGxAQGywkICQsLCwvLC8sLCw0LC4uLSwsLi8sLC8sLCwsLCwsLCwsLCwsLCwsLCwvLCwsLCwsLCwsLP/AABEIANgA6QMBEQACEQEDEQH/xAAcAAEAAwEBAQEBAAAAAAAAAAAABQYHBAMBAgj/xABFEAACAQICBgYGBwcCBgMAAAABAgADEQQFBhIhMUFREyJhcYGRBzJScqGxI0JigpLB8BQzQ6KywtFT4RUWVGOT8SRzw//EABsBAQACAwEBAAAAAAAAAAAAAAAEBQEDBgIH/8QAOBEAAgIAAgYJBAEDBAMBAAAAAAECAwQRBRIhMUFRE2FxgZGhscHRIjLh8EIUFfEGIzNSNFOSQ//aAAwDAQACEQMRAD8A3GAIAgCAIAgCAIAgCAIAgCAIAgCAIAgCAIAgCAIAgCAIAgCAIAgCAIAgCAIAgCAIB8LAb9kw5Jb2Msz6DMgQBAEAQBAEAQBAEAQBAEAQBAEAQBAEAQBAEAQBAEAQBAEAQCGr4nWN+HCc5fiuklrcCdCvVWR9wWO1XCk7G2dx4TZgcbq2KuT2P1/J5tqzjrLgTEvyGIAgCAeFfGU6fr1ET3mUfMzDaW89xrlLcmzm/wCO4b/qaH/lp/5mNePNHv8Aprv+j8Ge9HMKT+rVpt3Op+RmU09x4lXOO9NHQDMng+wBAEAQBAEAQBAEAQBAEAQBAEAQBAEAQDmzKrqUqjclPykXGzcMPZJb9V+hspWdiXWVvp+qD2D5TjOlyii01dpHYnEngds0u155o2KJeMHX6Smj+0oPmJ31FnS1xnzSZSzjqyceRD5/pfhcFcVKmtU/0k6z+I3L94iJ3QhvJWGwF9+2K2c3sX57ig5t6UMQ5IoU0or7TfSP38FXus0iyxUn9uwu6dC1R22Nt+C+fQqmOz7E1/3uIqv2a5C/gWy/CaJWTlvZZV4Wiv7YJd3u9pGag5CeCRmz7aDA1RyEGc2d2DzevRP0daovZrEr+Frr8J7Vko7mR7MLTZ98E+733lpyr0i4inYVQKg5jqt4g3U9w1Zuji5L7lmVl2hapba20+vavn1LzkmmVLE7FILcUPVcfdJ63epMl13QnuZSYjA3UfetnNbv3tyJ/D49H3Hwm0iHVAEAQBAEAQBAEAQBAEAQBAEA+M1t8xKSis2ZSzOd8fTG9reB/wASHLSOHh90vJ/BsVE3uRG55jErUKtOk6tUZbKusASfGab8Xh76ZRhNPNczbVVOE05J5EOcuq6i21WIABAYcBt32nMT0fe9scn2P5yJ6uhxIfG03Q9ZSvePlzkSdFlb+tNG2Moy3Mg9INLcSiLhqbdEgXa63121iTbW+oBu2bdm/hOmwGIk8NGK4ZomYTA0ybtks3ye5fPf4FOAueZJ8SSfiSZuLYtWTaAYzEWLIMOh+tVuGt2Ux1vxas3ww85dRW36Vw9WxPWfV87vDMuGXei3DpY1qtSseIFqa+Qu380kRwseLKu3Tdr+yKXm/jyJzDaD4CmLDDI3vl3/AKyZsVFa4EOWksVL+b7tnodH/KWB/wCjof8AiT/E9dFDkjx/X4n/ANkvFnNidBcBU34ZV9xnT+hhPLorfA2Q0nio/wA/HJ+pA5j6LKLXNCtUpHk4FRfyb4mapYSL3MmVabsX/JFPs2fK8inZzoTi8Lcmn0qD69K7W95baw8rdsi2YeceBa0aSw92xPJ8ns89xAIdxB7QR8CDI5Oa4MtmSaWstlxBLDhVHrr7/wDqD498l1Ytx2T2rmUuM0TGf1U7Hy4Ps5enYX7A50VCkkOjC6uDcEdhlipJrNHOzhKEnGSyaLBhcUtQXBmTye8AQBAEAQBAEAQBAEAQBAPLEUA4sb+BII7QRNV1MLo6svjwZ6hNxeaIfGZA7eriGX3lVvjsMqp6HUt0335P4JUcXlviivYvRmpRYO2JUjbs1CDYgg263bIGMwNeFrzlLeSqsT0jyUSAqYgoTZipHEEjd2ysqi8s0SmuZ7UtI6ybCRVXiri9/Hf85NjOeWTfia3VF7TkxeSpmFRKlJhQHq1Q121bXINMD1r3ItccN09V4urDPUs2J7c0syZRinTW01ny/Je9GsjwWCANKzVLbar7XPOxIso7FtLejSWA/jYu/Z6lRi78Ve/r3clu/PeWIYhD9ZfMSbHG4eW6yPiiD0cuTP10q8x5ibFfU90l4oxqvkfdccx5z0rIPivExkz9XnvMwIAgCAVjSXQmhjLso6Gt/qKNjH/uLubv2Htke3Dxnt3MscJpK2jY9seT9nw9DKc5yatg6nR1lsfqsNquOaHj3bxxlXZXKt5SOloxNd8daD+V2nRkWdNhjY9ekx61P+5OTfPjzHqm91Pq5GjG4KGJjylwfs+r0Lxhcd0erUptr022q3zB5MOIlvGSktaO45SyuVcnCayaLZleZrVG/bPZrJGAIAgCAIAgCAIAgCAIAgHwm0w3ks2CmZrjTVcnhwHZw/XbPnukMa8Tc5cOHZw+e8vcPSq4ZcSp4yntPeZvplsRtZw0MC9aotOmLuxsPzJ7ANp7pY0p2NRW9muclFZs0vDaJU6dNVR2VgBrNvDNbaxU/IGWWJ0JTct7T57/AC+MitWMnntWw4sXlmIpbdXpV5pv8V3+V5QYnQF9W2H1Lq+PjMkQxNct+w4aWZdtpUuuyDJGqmddPMDzmY3TieHWjqp5gZLhi5o1upHTSzISZVpFria3SeGY1Hca1Gu9KoO0MrdhVwQO8WlnRpXb9T2HlQ1d8U+35WTIGnp9XwrhMXRWop3VKfVJHuMSCfES3liJVvKSzXNEmrR9WKhrUyaa3p7cu9cO4ueS57Qxi61GoGtvXc6+8p2jv3SRXbCf2sr78LbQ8rFl6eJJTYRzizbK6WKpmnVXWU+angyngRPFlcZrVkbab50z14PaY1pJkFTA1dR+spuUqW2MPyYcR/mU11LqlkzrcJi4YmGst/Fcvwemjua9CxSptov632Twdfz7O6esNiOilk9z8us0aQwfTw1o/ct3X1fBaUqth6m/ZvB4EcCJcnKl1ynMBVUc5kwSEAQBAEAQBAEAQBAEAQDgzutq0jzYhPxG3yvK3S03HCyUd8so+L2+RIw0c7Fnw2lYqYacdPD5FtGwhcbgzrWAJJOwAbTflPdMJbIraz25LLNly0X0fGFUu1jVYbT7I9kfmf8AE7HAYPoI5y+5+XUU+JxHSPJbiXxuLSijVKjBEUXLE7B/v2Sc2ks2aYVyskoxWbZkWlun9XFE06BajR3XGypUH2iPUXsG3meEgW4hy2R2I6fBaKhT9Vn1S8l8/vaVPCY16XqNYezw8pBtors+5FjZTCz7l3k7gtIb7G6p+HnKu7R2W2O0rrcHOG2O1E1h85POQHh5R+0htIkaWcg7wp7xt8xMNy/lFM8anI/f/EALm9gNu/cJGylrfSZ1eZz6aZczYGg+oxcMhICkkBka+tYbBu8QJ3LqksLBPekvQ16LtjHEyzaSae95cUUPCYhqbh0Yo6nYymxH65SEpNPNbzo5xjOOUlmmapobpsMQRRxFlq7lfctTs+y/ZuPDlLLD4tT+me/1Obx+jXV/uVbY8uX4LrJpUEdn2UJjKLUqnHarcVYbmH62gkcZrtqVkdVm/DYiVFinH/KMUx+BfD1HpVBZkNjyPEEdhFiO+UM4OEnFnYVWxtgpx3MsWQ4rp6JpH95SF07U4r4f4llgbtaOo+G7s/BQaWwupPpY7nv7fz6knkuYmmw2yeVBoOErh1BEyYPaAIAgCAIAgCAIAgCAUv0j6QrhVo0wNZ2cPb2VQ7/FrDuDcpAx6U69Tjnn4Fpo3CSu1pLcll2t/vofjLM/w2LZEpOTUf8Ah6rXFhc6xA1QBzv8dkqlhXY8oo22UW1RcprJLiWrBZctM6xsW58u6WuEwEKPq3y5/BW23yns4HRicQtJGd2CooLMx3AAXJMnN5LNmqMXOSjFZtmH6aaVPmFTZdaCn6NN1/tuPaPLgNnMmtutdj6jr8BgY4aG3bJ737Lq9SuTSTyd0Z0TxGPN6Y1KV7Gs19XZvCje57tnMiba6ZT3biFi8fVhtktr5L35fuw03JvR5g6ABdP2l+JqbV8Kfq277ntk2GHhHftOfv0tiLPtequr53kjm+ieGxA9TomAsHpgKdm4EWsR3jyni7B1W71k+aIcMTZF78+0p+aaEYmipaiy4i31R1HPcGOqfOVs9ENvY0SljY8UR2UZVi3qDpMNVABvqMpVCQd7u1gw42GzvkjDaLrqlry2s024qU1kthI6eVaz9EadcirTBuikqCTa5DgjbYAbdndJl1c5NOLyyNmDvprTjbBPPjy/eoolTNa2IOrX2uhO0oofbb1mAu3jK/ESm9kuBfYGuqKcqtz680fVkRk81fQLSc4lehqm9VBsY/xFHH3hx57+ctsJiekWpLevM5jSWC6GXSQ+1+T+C4SaVRSPSXknSUxiUHWp7H7UJ2H7pPkTylfjqc4664en4LjRGJ1Z9E9z3dv5+DPcvxRo1EqD6pvbmOI8ReVldjrkpLgXt9KurcHxLLmICuHX1XAdT37/ANds6FNNZo4yUXFuL3otOi2Y36pM9HktcAQBAEAQBAEAQBAPhNoB/PulObnGYqrWvdSdWn2U12J5+t3sZVWz15Nnb4PD9BTGvjx7Xv8AjuNC9EmSdHSbFMOtV6qdlNTtI95h5KslYWGS1nxKPTOJ1pqlbltfb+F6s0GSykMp9KuknSP+yUz1EINUj6z7Cqdy7Ce23syDibc3qI6TQ+D1Y9PLe93Zxffu7O0z2RC8LroDoX+2EV64Iw4PVXcapB27eCA7zx3c5Joo1/qluKnSWkeg/wBuv7vT8+hsFGkqKFUBVAACgAAAbgANwlglkcs25PN7z9wYBMA/KuDuIPjBnJkVpLmPQUjb1jsEGDPcJhnxD2AJJO0zBktWY6D0q2HCiy1lF1qdvstzU/DeO3TfQrY9ZMwWNlh584vevjrMtxGGak7I6lXUkMp4EfrfKSacXkzrITjOKlF5pntgcU1GolRDZkOsD+R7CLg9hnmM3BqUd6PNlcbIOEtzNvyjMFxNGnVXc4vbkdzKe0EEeE6CqxWQUlxONvqdVjhLgdNekHVlYXVgVI5gixHlPbSayZrjJxaa3owzM8CcPWqUjvRiL8xvU+KkHxnO2w1JuPI7Sm1W1xmuKJnBVOkwlvrUm/lP/v8AllrgLNarLkc7pWrUv1l/Lb38TqyLFarDsPzk0rTTMFW10BmTB7wBAEAQBAEA/FVwqljuAJ8heZSzeRiTyWbKdjcyZmLax7LHd3SzhUksimsvbeeZHZ7pcVweIpm/SFdRGHJyFYk8CFJIPG0hY+h11Ocd3oXGg7434qFdj6115bcv3gZngMI1apTpJ61R1QdmsQL9wvfwlAlm8kd/ZYq4OctyWZ/ReCwq0aaU0FlRQqjkFFh8pbpZLJHCTm5ycpb3tOHSbNhg8NVrHaVXqg8XbqoPxEeF55snqRbN2Eod90a+fpxP59qVCxLMdZmJZmO8km5J7SSTKredukksluJnQ/ITj8StPaKY69VhwQHcDwZjsHieE2VV68siLjsUsNU58dy7fwbzQorTVURQqqAqqBYAAWAA5WlmlkskcXKTk3J7Wz9VHCgliAACSSbAAbSSeAmQk28kZjpR6S2JNPBAADYa7C9//qU7Lfaa/dxkKzE8IeJ0GE0Msta//wCfl+y8SgY/MKuIJNaq9W/tszDwB2DuAkWUnLey7rqrr+yKXYjnoDVN16pHEbD5ieGbJPNZPadtPSbEs6o1RqyL9V2JI7nO0eNx2SRC+UI7XmUWJwVV0/oWT6vjcbPoU+HqUQ9E3O5wfWU8mH57jJtVsbFnEpMRhp0T1Z/5LHNpHKH6TcjDIMUg6y2Wp2qTZW7wTbuPZK7H05rpFw3l1ojE5S6GW57V2/n93mdrKlnQGg+jDMf3tAn/ALi/BXH9J85ZaOt31vt+Si0xT9tq7H7e5f5alEZn6TsFqYinVG6olj7yHf5MvlKfSMMpqXNeh0eh7daqUOT9f8ENoy/XdDudCPL/AGJnnR08rHHmvQaXr1qVLk/X9R8wNTVqWPaPH/2JcnOmlaMYjWS0yYJyAIAgCAIAgHBnz6uGrnlSc+Skzdh1nbFdaNGKeVE31P0M1q43qA33gfKXar2nNuzNFZzTFXvNjrjKLjJbGK7pVzU4PJp5p9aJf0V4HpccHIuKSM9/tGyL8GY+E49Yd1YiUH/H9XkfTMVj44jR0bY/zy2dm9dzWRtElnPGZemPMv3GHB51WHmieH7zykPFy3ROg0HT91r7F6v2M0kI6A2j0X5R0GDWoR16/wBIT9jdTHdq9bvcyxw0NWGfM5PS9/SXuK3R2d/H47i4SQVZk/pQ0oNSocJSa1ND9KR9d9+p7q7L8z7u2Dibc3qI6XRGCUY9PNbXu6lz7X6dpnlSoFFzIqWZcykorNnI+YjgJsVbI0sXHgfg5gSLWmOjNUsU2skSeVBbbN/GR7W8zbRq5bCz6NZu2DrLUW5Xc6+0vEd43jt8ZrqudU9Zd54xeHjfW4PfwfJm2UaodVZTdWAIPMEXB8p0EWpLNHHSi4tp70fjF4daqPTYXV1KkdhFjMSipJp8TMJuElJb1tMLr4c03dG3ozKe9SQflObnHVbi+B20JqcVJcVmS+iGK6LGUG4FtQ9z9T5kHwmzCz1bovu8SLjq9fDyXVn4bTY50RyJT/Sbh9bDI/FKo8mVl+erIGkY51J8mW2h55XOPNGf5O+rWpn7VvMFfzlZhZZXRfX67C4x0dbDzXVn4bT2xx1K7dj38zrfnOhOSL3opVs1oMFvmQIAgCAIAgHjjKHSU3Q/WVl/ECPznqMtWSfI8yjrRa5mK4DA4mrRXVoubXU7LbiRsJtfwnRu6tPazlXhrc8lEjswyHFi5OHqHuXW/pvHT1vcz2sNat6Lb6GSEq4qm4K1StNgGBB1VLhth2ixZfOVekK1rK1cdhd4C+fRdBLcm2u/JP08zVJXE4wz0j4rpMwr8k1KY7ggJ/mZpWYh52M7DRcNTCx6835/CK9hqHS1Epg2LuqDvdgv5zUlm8ifOWpFz5JvwP6JXE0qShQ6gKAoFxsAFgLCXUa5cEfPZ3wzblJZnPjc3UU36Ihqmq2oDcAtY6oJtsF7T06bMtiPMMTTrLWezj2GMYrRPFi7FRVJJLFXUsSTckg2uSeUrpYG9bcs+862vTuAlsUsu1P2zIHHYFh1XUr3iR2pQe1E+NlWJj9Ek+wi62B1Re89KeZoswyis8zz/ZmAvaNdbiPKqSWZ15YxDi01WpOJmmTUthZ6YlfIsGaz6PsWamECnaabMnhsYfBreEutHz1qcuWw5fSlepfmuKz9vYssnFcY/pvQ1MdX5Eq34kUn43lBjFldL94HWaOnrYaPevMicNU1GVvZYN5EH8pFUtVp8iVNaya5m7TqTiSv6epfA1uzUPlUSRMas6Jd3qT9GPLEx7/RmU4Q2dD9pf6hKSt5WR7V6nS3rOqS6n6HRpAbV37l/pE6U4xFz0afrjwgF7mTAgCAIAgFQzvSV0LKoqUyCRboHJ8DqkHvEsacLBrN5PvXyVd+Lszaimu5/BTMwzjMqp+iGLI+zSqL8Qok1QwsFt1fEg54yb3y/e4iM2zLFIQKtR6bEbU17EWJB1tU77g75IrjU1nFEW12qWTZHDPaw3V6ni5PzM9OuHJCMrObO/K9MMTTqK2uHI4kDdxBtw5zXLD1zWq0bFdbX9UXtRYW9ImJO40x3IPzJmr+3UdfiHpXFdXgV7EY1KlR6joru5LMTtuTv2bhMf2vC556i7836m/+/wCktVQVrSXLJeiTPajm4TYqqvcAPlN8cLXD7Ul2IhW47EWvOyUpdrb9ToTPmMy6onhWyOlMzqncL+I/zPDhA2KVjPlfOKtMXYFRz4fCYVcHuMudkVm0fvKKqY+o1FxfWQsDxBUqDbt6wPhK3SOGjqp8y60NjrIz+l7VtXx2MpmY4ApVem2+m7Ke3VNr+O/xnMS+htH0uOV1cZ8Gkz2ppwkds2NLce9GiBuE1ykzXqpbjtpiaJBmkejL91W5a4/pF/yltov7Jdvsc9pj/kj2e5c5aFOZR6Qj/wDNb3E+Uosf/wAz7EdRor/xl2srwEgSLA3dZ1hw5Bacm2Br9yfGogkXGPKiX7xJujv/ACYd/ozJ8MOuvvL8xKKv749q9Tp7v+OXY/Q/ekb/AE7dy/0idMcYi6aODrjuEAv4mTAgCAIAgCAcOeY79noVanFV2e8eqvxIm2ivpLFE0Ym3oqpT5Lz4GAZpWNVmc7bn4bhOmSyWRyqk3LaRjrPLNyZp3oWycWr4o2Jv0K9gsrufG6eR5yo0hbm1WuG8u8BS1HpHx3dn+VkaLi8poVf3lClU96mh+JEgRtnH7W13kyVUJfck+4wTSCj0WKxKABQtaqFA3BddtUD7tpH/ALriq5Na2e3iv8PzOgj/AKd0fiKYy1Mm4ram1ty27Nq39RMaJZVTqK1WqNYX1UU7tguzHnvAA7+yWNekrbq92XZ+7Cuf+m8Nh7t7kstz4eG/wPbSHKKZUtSGo4+qPVbstwMk0YucXlN5o143/T9d0HKhZSXDg+rqf6ylnEGWmsca6cnkz5+0RrGOjL56M6KUTWxuJboqa0yia2y6khqlQjl1VC8+twIJpMdiVY9VbkXujsHKCzy2vgVvEaYviK1Q6lLVdmKh6FIsFJOqC1r3AttvKGyyW3YvA7OjC1pqKlJZZbmeVISuZcs6qYmpnhnVTE1M8s1TQDCdHhAx31GZ/DYo+C38ZeaOhq0583mcxpSzXvy5LL39yySeVxjml+I6TG4gjcG1fwKEPxUznsXLWukzrcBDUw8F1Z+O05Mro9JWpJ7VRF82Aketa04rrXqbrpatcpck/Q26dScYVj0i1tXBMPbdF8m1/wC2QtIPKlrm0WWio54hPkn8e5mmAW9RPeHwN/ylPh1rWxXWvkvsXLVom+pnLm7a+Jcc2C/ALOkOQNC0cS9SAXqZMCAIAgCAIBUfSXUP7MiD69QA9yqzfMCWGjkukcnwRWaVb6JRXF/LMrq5cZcqxMoejaIyvhiu+acTiIUVOyXDz6ifgMHZi740w48eS4vu/BqPoar/AEOJp8qivbsdAv8A+c5Si2VjlKW9vM7nS2HhR0UILKKjqruf5NEkgqDC/SLhejzCvyfUqDuZAD/MrSsxCysZ2Oi56+Fj1Zrz+Mj10dxdqOry/NmMs8JH/ZXf6s2X1ZyzPzj8beS0jZVUW3QejhsxoPSxFGnUqUuqHKLr9G19Sz2vssw+6J5nOcH9LazOc03gYV3KzVWUvVb/AB3ma5xljYKvUpOBrU22EgWYb1cd4sezdwlXZjMTm4ylmT6tF6PtrVsIZdjezmuO4g8xzSrX6rOSoOxeHeQN/jPLnJraeI0V1v6EdGWYS3WMi2z4IsMPTl9TJqmJEkSmdNMTSzyyXyLLGxVZaS8drH2VHrN+uJEVVO6agv1EXE3xprc33dbNloUgiqqiyqAoHIAWAnTxiopJHISk5Nye9nhmmNFCjUqtuRS1uZG4d5Nh4zzZNQg5Pge6a3bYoLizEWcsSzbSSSTzJNz8ZzLbe1naJJLJFj0DwfSYtDwphnPlqj4sD4STgIa1yfLb7FfpOzUw7XPZ7mqzoDlyh+lHFbKFLmWc+A1V/qbylXpOeyMe/wDfEu9DV7Zz7F7+xT8oX6QHkCfy/ORcBHWuT5Jv29yZpSerh2ubS9/YicsPTYkHm5fyu3ztL05k1PROldrwYLfMgQBAEAQBAKzp9hGeglRVLdDUDsoFyUsVewG8gNreBkvB2KM2nxWRDxtTnBNcHmVWhg0ravRMtTW9XVIN+636Emuxx+7YV/Q624hfSDkhwhw9zfXVybbgyldnkw+MotJ3ytlHkdr/AKZw0KoTeX1bM31cvH93HV6I8bqYx6Z3VaRt2tTOsB+Ev5SJhZZTy5k/TVetQp8n6/qNglgcuZj6Y8t20MQBzpMfN08P3nmJCxcd0joNB3fdU+1ej9ijZHTqOzrTpu+wX1VJtt4kbuO+ScDZ9Oq+BdzshF/W0u06cXlmJG/D1h29E9vMC0sE1zNtd9D3Tj4olPRzjzQx6KdgqBqTA7NpGstxz1lA+9PNqziRdMU9LhHJfx2+z8i0+lfJ0xKJq7MQNitzX2H7L7QeHibwLKlLbxOWwmNlRnH+L/c1+7TIRk1Sg+rXRqbjbqsLbOY4Edo2SBbJrYdHhYQnHXTzRIUxIsmTjqpiaZHhktk2U1cU2rSTW5tuVfebh3b5iumdrygiPfiK6Y6038vsNY0cyJMHT1V6zt6722k8hyUcBL3DYaNMclv4s5bF4uWInm9iW5EvJBFM+9JOdXK4ZDus1Tv3on9x+7KrSF//AOa7y+0Thss7pdi937eJR1lSy6Zpno6y3o6DVSNtU7PcW4HmSx7rS60dVq1ub4+hzmlrte1QX8fVltliVRkWmuO6fGVCDdUtTH3L638xac/jbNe59Wz97zq9HVdHh1nx2+P4yIp6vRYeq/FhqDx2bPP4SZo2vKMp89ngV2mLM5xr5bfE8dD6Fy9TlZB47T/b5yzKY1zRjD6qXmTBOQBAEAQBAEAQDzp0VUkqoUneQAL99t8zm2MioelbLulwWuBc0XV/unqN4ANrfdkbExzhnyLXQ92piNV/yWXuvgybJswOGxFGsP4bhj2rucDvUsPGQIS1ZJnTX1dNVKvmv8eZtmf5hXUKaFKpVRlBD0ujJ28wxBtaxuL75cxye05PC1UtvpZJNcHn7e5n+fU8wxSlOgxTKbdVxZdhuNmtbfMTlHLLVzLum3B0bU4580QOXYmth6dRWvRC1CpF7Nr2swtv2as01tuL1VkkyTNK1qSWezPuPv8AzBWHq12/Ff5zDskuJqdEeMT7/wA01rqz6tQqQykqNYFTcFTwIMwsTKO/aYVUUmlsT2MnE01Zqgq1KC1DwGuQB4WMmqtPiR/7FW91j8PydeZacDErqVcHSdeAYlrdq7AQe0TEsPCSye021aI6J60LWuzYVpzRLXFLUHshqhH8xJ+MjvR9PX4liq7EsnLPw9kjrw9eiv8ADU99z8zPawNC/iu/b6mqVVj4k1hdIyihVOqo3KDYDuAm6NcYrJLIiTwCk82s2d1HSph9c+ZjURolo6L4HZhNKKza6oVqMVJXWAFj3rvAJGw+c02xkk9XeVmIwSokpSz1c9vMoNYsXYuSXLHWJ3619t+285iees9bedNDV1Vq7stnYSOj+VNiqy0xcA7Xb2VG89/AdpE9UUu6aiu/sNGKxCorc33dpstGkEVVUWVQAAOAAsAJ0kUorJHISk5Nt72R+keZjC4epU+sBZBzY7F+O3uBmrEW9FW5G/CUdNaoePYYwLntJ8yZze1nYPJLqObSavbo6I+qNZveO78/OdJRX0dahyOPxFvS2ynz9OBbNGsu1Ep0+O9u87T/AI8JtNBp+Ao6iATJg6IAgCAIAgCAIAgHji8OtVHpuLq6lWHMMLEeRmGs1kz1CbhJSjvW0/nbM8A2GrVKL+tTYqTztubuIsfGVMouLaZ3VVqtgrI7ms/3s3GseirPOnw3QMevQsB20z6lu7avgvOTsNPOOq+BzWmMN0d3SLdL14+O8utSoFBYmwAJJ5AbTJJUpNvJGAaSZocVWeodgJJA5X/OwA8JK1MoNHfYbDKilQXIg2EgTieJRPIVTTZWChipBsdxtzkZ5RkmQ763KDiuJZ8sx+HxNhqhX40z1W+6RbW8PhJcLdYoZzxeHf3PLx9S+UtAKNekro9SixG42dfI2P8ANNqkzZXpi6P3JPy/fAhcx0CxdK5TVrj7J1W/C2zyJmddk+rS9cvuzRXKyNSbVqI1NvZZSp8jM9IT44lSWaeaPajjLcFPeAZnpEHOLPV8QGFtRB2qCD8DaZ10ZjJJ72Smh2HL42kAdiK7vysUamoPezC3unlMTkmiv0tdHodTiz9Z/gqdTF1RTrJrF9XUK1L6wABAKoQTcGUV+Hjba9Saz5GvDYqVNEdeEskt6y3F+0RyMYSiL7aj2Z2+Si/AX87ydhcOqY5cXvKrG4t4iefBbkTslEMy3T/O/wBordEhvTpEjsZ9zHw9X8UpMdfrz1VuXqdLozC9FXry3y9Pzv8AAruHIUNUb1UF+88B+uyYwNOvZrPcvX92mdKYjo6tRb5enH4ODR/DHE1zVfcp1jyLfVUd2/wHOXZzRqujGBudYwYLdMgQBAEAQBAEAQBAEAzT0t5DfVxaDdZKtuV+o57idU968pDxVf8ANF/oXFb6Jdq917+PMoej2cPgsQlZNursZfbQ+sv5jtAMi1zcJZousTh431OuXHyfB/vA2DSrNVqZZUq0W1lqoqqeyq60zfkQGII5iW9TUmmjmcBQ442MJ74tvwWfsZTWyuS8zrI4gjK2AYGwBOwnYCTYC5OzgACfCRbUo5tmJTiciLKec9Z5hRyPy1BTttPOszDri+BZMp0wxmGAVK7Mo+pUAcebdYdwM9xvsjuZFt0dhrN8cn1bPx5E7R9J2L+tToN92oP757/rJ8kQ5aFo4OXivg5sz06xGJUo9PDleRpFrdo12Iv22niWMsfI2V6KpreacvH4SK1q8jaeY4ua37SVKiPDYfTr8CP1ym2OOj/JMj20Wpf7eXfmdmGzmpQBp0FvVfe29r7tYns8hNn9U7NlaZU2YRxl0mIkn+/uxE3oblz06ysT0lQnad4F94H5njNtNCr28SJicVK3ZwNhXdJJDKtpzpH+y0+ipn6Zxw+op2Fu/gPPhIWMxHRx1Y735Fno7B9NPXl9q83y+TLqa3IAlJGLk1FbzpJzUIuUtyOXNqhqMuHpbdvW7W7ewfrdOioqVUFFHI4m932Ob7upFz0eykIqU1223nmTvP67JtI5pGX4YU0AmTB1QBAEAQBAEAQBAEAQDyxWHWqjI6hkYFWU7iCLEGYaTWTPUJOElKLyaMF0ryB8BXNM3KG7U39pe37Q3HwPESrtrcJZHZ4PFRxNeut/Fcn8Ph+D5lWdNTo1sMzfRVLMt72p1VZXR/dJUBhy2jaCDspucHlwM34dSsjdH7l5p7Gu3l4dl1wODOIC6tKorEC4NNrbRfZUtqMvJgSDLSNqazKuWJjXvkv3q3lx0f0fTC3Y2aoRYtyHsr2fOYlLMqsXjJX7P4ogtJ/R1RxJNSgRh6h2kW+jY9qj1D2r5GRLMNGW1bGSsJpeyr6bPqXmvnv8TNc40ZxWEJ6WiwUfxF69Pv1h6v3rGQ51TjvRf0Y2i77JbeT2Pw+MyKQ3mlkpnqs8s8nqs8MwdGGoNUbVRWdvZVSx8htnlJvYtp4nKMVnJ5LrLXl2g9YqalciggF7bGc9wGxfE+ElV4Gcts9i8yqxGlqobK/qfl+/uZ44HKwzlaKbzv3k9rGWddUa1lFFBdfO6WtNmjaP5IuGW52ud5m00njpVpMmCSws9Zh1Kf8Ac/Jfnw4kRsRiVUuvkTsFgpYiXKK3v2XX6GS4nEtVdqlRizsbsx4n8h2cJRTk5NylvOphCMIqMVkkeWNxXQLYbar+qOKg7L25ngJbYLDai15b35HPaSxvSvo4fat/W/hfvAl9GckNIazC9Vt/HVHLv5yeVRpmQZZ0Y1iNsyYJuAIAgCAIAgCAIAgCAIAgETpLkNPH0TSqbDvRwNqNwI+RHETxZWprJknC4qeHs14965owrOcqq4Sq1Ksuqw3H6rDgyHiD/tvlXODg8mdjRfC+CnB7PTqZOaG6aVMAQj3q4cnal+sl95pX+KnYew3vtqvcNj3EPHaOhiVrR2S58+35NjyrNKWKpipRcVFPLeDyYHap7DLCMlJZo5a6mymWrYsmdk9GoQCLxujuFrG9TDUmb2tRQ34htmuVUJb0iRXi761lGbS7SObQPAH+BbuqVh8nmt4Wp8PNkhaUxS/n5L4OjD6HYJN2GQ+9rP8A1kzKw1S/ieJaRxMt833bPQl8Ph6dIaqKtMclAUeQm5RUVkkRJTlN5yefaQGk+KNQihT2lt9uEyeSQyPJ1wyfa4mAV/SfTtKN6eGIq1Nxfeid3tt3bPlIOIxqj9MNrLfB6LlZ9VuxcuL+DN69dqjM7sXZjdmJuTKiUnJ5s6GEIwioxWSR8q1uits16repT379xYfISxwmE/nZ3L3ZR6Q0hnnVU+1+y92SuQZEwbpKvXrNt56t/wC75bhLMpDRsiybVszTJgsQFoB9gCAIAgCAIAgCAIAgCAIAgETpHo/Rx1Lo6o2jajj1kPNT8xuM8WVxmsmScLirMPPWh3rgzFtJdGq+Ae1QayE9WqoOo3YfZb7J8L75XWVSg9p1mExtWJjnHfxXH8rr9DhyzMquGfpKNRqbcxuI5MDsYdhE8Rk4vNG+2mu6OrYs0aHkfpSBsuLpap/1ae0d7Ido8C3cJLhiv+yKLEaEe+mXc/n5yLxlef4bFfua6VD7IazDvQ2YeIkmNkZbmU92Fup++LXp47iSns0HwwCjZ7pBXDsqgoB2TAK/ic7qLterqjmSB84bS3nqMXLYlmR2F09TDVNZb128h+Ij5AzTK+K3bSXXgpyf1bF+8D5nGl+IxwszalM/w0uAffO9vHZ2SruxFk9j2LkdBhcDTSlKKzfN+3L1IimhOwC8jxi5PKKzZLssjXHWm8ke2HVnOrRAduNQ/u07j9Zv1tlrh8GofVPa/Q53G6Slb9FeyPm/hFjyHR7UNxepUPrVDv7bchJpVF9yfJAli2+ZME4BaAfYAgCAIAgCAIAgCAIAgCAIAgCAeWJw61VKOodWFirAEEciDvmGs9jPUZOLUovJozrSP0Zg3fCNqceickr91t69xv4SLZhU9sS7w2mpR+m5Z9a3963PyM+zPKa2GNq1Jk7SLqe5hs+MiThKH3IvKcTVd/xyT6uPhvOEgHtngkZ5Hfhc4xFL1MRWQchVqAfhvaelZJbmzRPD0z+6CfciQXS3G/8AVVPNT8xHTWf9jT/QYb/ojmxec4ir+8r1W++w+RE8u6x8WZWDw8d0F4EEuH6VmJv3nafMxKbSNUaVJvZkj8tlb8No58u88J6hPX2JGi6pV7ZNJdZO5Tlj6oAUt3bF/Gdn4dabVg3N5y2ESWlY1x1a1m+b3fL8iw4PRwvsqdYf6aXCfePrP42HZJ1dUa1lFFRdiLLpa03mXDKtG9gFgqjcALAdwns0lpweXrTGwTJg64AgCAIAgCAIAgCAIAgCAIAgCAIAgCAIB418KrizAGAVnMtA8LVueiVTzW6H+W15qlRCXAm16QxNe6b79vqV/FejRL9Vqg7LqR8ReanhIPiyXHTd63qL8fk4W9HpH8RvITz/AEcebNn98s/6LxYXQI8WY+AhYOHNniWmrnujHz+Tqw+gyjgT3zZHDVrgRZ6SxMv5Zdmz8kthNDwLdQbOJFyO4nbN6SWxEKUnJ5t5smsNo2o3zJ5JXD5eibhAOoCAfYAgCAIAgCAIAgCAIAgCAIAgCAIAgCAIAgCAIAgCAfLQD7AEAQBAEAQBAEAQBAEAQBAEAQBAEAQBAEAQBAEAQBAEAQBAEAQBAEAQBAEAQBAEAQBAEAQBAEA//9k="/>
+          <p:cNvSpPr>
+            <a:spLocks noChangeAspect="1" noChangeArrowheads="1"/>
+          </p:cNvSpPr>
+          <p:nvPr/>
+        </p:nvSpPr>
+        <p:spPr bwMode="auto">
+          <a:xfrm>
+            <a:off x="155575" y="-144463"/>
+            <a:ext cx="304800" cy="304801"/>
+          </a:xfrm>
+          <a:prstGeom prst="rect">
+            <a:avLst/>
+          </a:prstGeom>
+          <a:noFill/>
+          <a:extLst>
+            <a:ext uri="{909E8E84-426E-40DD-AFC4-6F175D3DCCD1}">
+              <a14:hiddenFill xmlns:a14="http://schemas.microsoft.com/office/drawing/2010/main">
+                <a:solidFill>
+                  <a:srgbClr val="FFFFFF"/>
+                </a:solidFill>
+              </a14:hiddenFill>
+            </a:ext>
+          </a:extLst>
+        </p:spPr>
+        <p:txBody>
+          <a:bodyPr vert="horz" wrap="square" lIns="91440" tIns="45720" rIns="91440" bIns="45720" numCol="1" anchor="t" anchorCtr="0" compatLnSpc="1">
+            <a:prstTxWarp prst="textNoShape">
+              <a:avLst/>
+            </a:prstTxWarp>
+          </a:bodyPr>
+          <a:lstStyle/>
+          <a:p>
+            <a:endParaRPr lang="es-PE"/>
+          </a:p>
+        </p:txBody>
+      </p:sp>
+      <p:sp>
+        <p:nvSpPr>
+          <p:cNvPr id="5" name="AutoShape 4" descr="data:image/jpeg;base64,/9j/4AAQSkZJRgABAQAAAQABAAD/2wCEAAkGBxQQEhMUExMWEhUXFxcXGBQYFRQYGBgaFxUWFhcYFBgYHCggGBolGxYXITEhJSkrLi4vGR8zODMsNygtLisBCgoKDg0OGxAQGywkICQsLCwvLC8sLCw0LC4uLSwsLi8sLC8sLCwsLCwsLCwsLCwsLCwsLCwvLCwsLCwsLCwsLP/AABEIANgA6QMBEQACEQEDEQH/xAAcAAEAAwEBAQEBAAAAAAAAAAAABQYHBAMBAgj/xABFEAACAQICBgYGBwcCBgMAAAABAgADEQQFBhIhMUFREyJhcYGRBzJScqGxI0JigpLB8BQzQ6KywtFT4RUWVGOT8SRzw//EABsBAQACAwEBAAAAAAAAAAAAAAAEBQEDBgIH/8QAOBEAAgIAAgYJBAEDBAMBAAAAAAECAwQRBRIhMUFRE2FxgZGhscHRIjLh8EIUFfEGIzNSNFOSQ//aAAwDAQACEQMRAD8A3GAIAgCAIAgCAIAgCAIAgCAIAgCAIAgCAIAgCAIAgCAIAgCAIAgCAIAgCAIAgCAIB8LAb9kw5Jb2Msz6DMgQBAEAQBAEAQBAEAQBAEAQBAEAQBAEAQBAEAQBAEAQBAEAQCGr4nWN+HCc5fiuklrcCdCvVWR9wWO1XCk7G2dx4TZgcbq2KuT2P1/J5tqzjrLgTEvyGIAgCAeFfGU6fr1ET3mUfMzDaW89xrlLcmzm/wCO4b/qaH/lp/5mNePNHv8Aprv+j8Ge9HMKT+rVpt3Op+RmU09x4lXOO9NHQDMng+wBAEAQBAEAQBAEAQBAEAQBAEAQBAEAQDmzKrqUqjclPykXGzcMPZJb9V+hspWdiXWVvp+qD2D5TjOlyii01dpHYnEngds0u155o2KJeMHX6Smj+0oPmJ31FnS1xnzSZSzjqyceRD5/pfhcFcVKmtU/0k6z+I3L94iJ3QhvJWGwF9+2K2c3sX57ig5t6UMQ5IoU0or7TfSP38FXus0iyxUn9uwu6dC1R22Nt+C+fQqmOz7E1/3uIqv2a5C/gWy/CaJWTlvZZV4Wiv7YJd3u9pGag5CeCRmz7aDA1RyEGc2d2DzevRP0daovZrEr+Frr8J7Vko7mR7MLTZ98E+733lpyr0i4inYVQKg5jqt4g3U9w1Zuji5L7lmVl2hapba20+vavn1LzkmmVLE7FILcUPVcfdJ63epMl13QnuZSYjA3UfetnNbv3tyJ/D49H3Hwm0iHVAEAQBAEAQBAEAQBAEAQBAEA+M1t8xKSis2ZSzOd8fTG9reB/wASHLSOHh90vJ/BsVE3uRG55jErUKtOk6tUZbKusASfGab8Xh76ZRhNPNczbVVOE05J5EOcuq6i21WIABAYcBt32nMT0fe9scn2P5yJ6uhxIfG03Q9ZSvePlzkSdFlb+tNG2Moy3Mg9INLcSiLhqbdEgXa63121iTbW+oBu2bdm/hOmwGIk8NGK4ZomYTA0ybtks3ye5fPf4FOAueZJ8SSfiSZuLYtWTaAYzEWLIMOh+tVuGt2Ux1vxas3ww85dRW36Vw9WxPWfV87vDMuGXei3DpY1qtSseIFqa+Qu380kRwseLKu3Tdr+yKXm/jyJzDaD4CmLDDI3vl3/AKyZsVFa4EOWksVL+b7tnodH/KWB/wCjof8AiT/E9dFDkjx/X4n/ANkvFnNidBcBU34ZV9xnT+hhPLorfA2Q0nio/wA/HJ+pA5j6LKLXNCtUpHk4FRfyb4mapYSL3MmVabsX/JFPs2fK8inZzoTi8Lcmn0qD69K7W95baw8rdsi2YeceBa0aSw92xPJ8ns89xAIdxB7QR8CDI5Oa4MtmSaWstlxBLDhVHrr7/wDqD498l1Ytx2T2rmUuM0TGf1U7Hy4Ps5enYX7A50VCkkOjC6uDcEdhlipJrNHOzhKEnGSyaLBhcUtQXBmTye8AQBAEAQBAEAQBAEAQBAPLEUA4sb+BII7QRNV1MLo6svjwZ6hNxeaIfGZA7eriGX3lVvjsMqp6HUt0335P4JUcXlviivYvRmpRYO2JUjbs1CDYgg263bIGMwNeFrzlLeSqsT0jyUSAqYgoTZipHEEjd2ysqi8s0SmuZ7UtI6ybCRVXiri9/Hf85NjOeWTfia3VF7TkxeSpmFRKlJhQHq1Q121bXINMD1r3ItccN09V4urDPUs2J7c0syZRinTW01ny/Je9GsjwWCANKzVLbar7XPOxIso7FtLejSWA/jYu/Z6lRi78Ve/r3clu/PeWIYhD9ZfMSbHG4eW6yPiiD0cuTP10q8x5ibFfU90l4oxqvkfdccx5z0rIPivExkz9XnvMwIAgCAVjSXQmhjLso6Gt/qKNjH/uLubv2Htke3Dxnt3MscJpK2jY9seT9nw9DKc5yatg6nR1lsfqsNquOaHj3bxxlXZXKt5SOloxNd8daD+V2nRkWdNhjY9ekx61P+5OTfPjzHqm91Pq5GjG4KGJjylwfs+r0Lxhcd0erUptr022q3zB5MOIlvGSktaO45SyuVcnCayaLZleZrVG/bPZrJGAIAgCAIAgCAIAgCAIAgHwm0w3ks2CmZrjTVcnhwHZw/XbPnukMa8Tc5cOHZw+e8vcPSq4ZcSp4yntPeZvplsRtZw0MC9aotOmLuxsPzJ7ANp7pY0p2NRW9muclFZs0vDaJU6dNVR2VgBrNvDNbaxU/IGWWJ0JTct7T57/AC+MitWMnntWw4sXlmIpbdXpV5pv8V3+V5QYnQF9W2H1Lq+PjMkQxNct+w4aWZdtpUuuyDJGqmddPMDzmY3TieHWjqp5gZLhi5o1upHTSzISZVpFria3SeGY1Hca1Gu9KoO0MrdhVwQO8WlnRpXb9T2HlQ1d8U+35WTIGnp9XwrhMXRWop3VKfVJHuMSCfES3liJVvKSzXNEmrR9WKhrUyaa3p7cu9cO4ueS57Qxi61GoGtvXc6+8p2jv3SRXbCf2sr78LbQ8rFl6eJJTYRzizbK6WKpmnVXWU+angyngRPFlcZrVkbab50z14PaY1pJkFTA1dR+spuUqW2MPyYcR/mU11LqlkzrcJi4YmGst/Fcvwemjua9CxSptov632Twdfz7O6esNiOilk9z8us0aQwfTw1o/ct3X1fBaUqth6m/ZvB4EcCJcnKl1ynMBVUc5kwSEAQBAEAQBAEAQBAEAQDgzutq0jzYhPxG3yvK3S03HCyUd8so+L2+RIw0c7Fnw2lYqYacdPD5FtGwhcbgzrWAJJOwAbTflPdMJbIraz25LLNly0X0fGFUu1jVYbT7I9kfmf8AE7HAYPoI5y+5+XUU+JxHSPJbiXxuLSijVKjBEUXLE7B/v2Sc2ks2aYVyskoxWbZkWlun9XFE06BajR3XGypUH2iPUXsG3meEgW4hy2R2I6fBaKhT9Vn1S8l8/vaVPCY16XqNYezw8pBtors+5FjZTCz7l3k7gtIb7G6p+HnKu7R2W2O0rrcHOG2O1E1h85POQHh5R+0htIkaWcg7wp7xt8xMNy/lFM8anI/f/EALm9gNu/cJGylrfSZ1eZz6aZczYGg+oxcMhICkkBka+tYbBu8QJ3LqksLBPekvQ16LtjHEyzaSae95cUUPCYhqbh0Yo6nYymxH65SEpNPNbzo5xjOOUlmmapobpsMQRRxFlq7lfctTs+y/ZuPDlLLD4tT+me/1Obx+jXV/uVbY8uX4LrJpUEdn2UJjKLUqnHarcVYbmH62gkcZrtqVkdVm/DYiVFinH/KMUx+BfD1HpVBZkNjyPEEdhFiO+UM4OEnFnYVWxtgpx3MsWQ4rp6JpH95SF07U4r4f4llgbtaOo+G7s/BQaWwupPpY7nv7fz6knkuYmmw2yeVBoOErh1BEyYPaAIAgCAIAgCAIAgCAUv0j6QrhVo0wNZ2cPb2VQ7/FrDuDcpAx6U69Tjnn4Fpo3CSu1pLcll2t/vofjLM/w2LZEpOTUf8Ah6rXFhc6xA1QBzv8dkqlhXY8oo22UW1RcprJLiWrBZctM6xsW58u6WuEwEKPq3y5/BW23yns4HRicQtJGd2CooLMx3AAXJMnN5LNmqMXOSjFZtmH6aaVPmFTZdaCn6NN1/tuPaPLgNnMmtutdj6jr8BgY4aG3bJ737Lq9SuTSTyd0Z0TxGPN6Y1KV7Gs19XZvCje57tnMiba6ZT3biFi8fVhtktr5L35fuw03JvR5g6ABdP2l+JqbV8Kfq277ntk2GHhHftOfv0tiLPtequr53kjm+ieGxA9TomAsHpgKdm4EWsR3jyni7B1W71k+aIcMTZF78+0p+aaEYmipaiy4i31R1HPcGOqfOVs9ENvY0SljY8UR2UZVi3qDpMNVABvqMpVCQd7u1gw42GzvkjDaLrqlry2s024qU1kthI6eVaz9EadcirTBuikqCTa5DgjbYAbdndJl1c5NOLyyNmDvprTjbBPPjy/eoolTNa2IOrX2uhO0oofbb1mAu3jK/ESm9kuBfYGuqKcqtz680fVkRk81fQLSc4lehqm9VBsY/xFHH3hx57+ctsJiekWpLevM5jSWC6GXSQ+1+T+C4SaVRSPSXknSUxiUHWp7H7UJ2H7pPkTylfjqc4664en4LjRGJ1Z9E9z3dv5+DPcvxRo1EqD6pvbmOI8ReVldjrkpLgXt9KurcHxLLmICuHX1XAdT37/ANds6FNNZo4yUXFuL3otOi2Y36pM9HktcAQBAEAQBAEAQBAPhNoB/PulObnGYqrWvdSdWn2U12J5+t3sZVWz15Nnb4PD9BTGvjx7Xv8AjuNC9EmSdHSbFMOtV6qdlNTtI95h5KslYWGS1nxKPTOJ1pqlbltfb+F6s0GSykMp9KuknSP+yUz1EINUj6z7Cqdy7Ce23syDibc3qI6TQ+D1Y9PLe93Zxffu7O0z2RC8LroDoX+2EV64Iw4PVXcapB27eCA7zx3c5Joo1/qluKnSWkeg/wBuv7vT8+hsFGkqKFUBVAACgAAAbgANwlglkcs25PN7z9wYBMA/KuDuIPjBnJkVpLmPQUjb1jsEGDPcJhnxD2AJJO0zBktWY6D0q2HCiy1lF1qdvstzU/DeO3TfQrY9ZMwWNlh584vevjrMtxGGak7I6lXUkMp4EfrfKSacXkzrITjOKlF5pntgcU1GolRDZkOsD+R7CLg9hnmM3BqUd6PNlcbIOEtzNvyjMFxNGnVXc4vbkdzKe0EEeE6CqxWQUlxONvqdVjhLgdNekHVlYXVgVI5gixHlPbSayZrjJxaa3owzM8CcPWqUjvRiL8xvU+KkHxnO2w1JuPI7Sm1W1xmuKJnBVOkwlvrUm/lP/v8AllrgLNarLkc7pWrUv1l/Lb38TqyLFarDsPzk0rTTMFW10BmTB7wBAEAQBAEA/FVwqljuAJ8heZSzeRiTyWbKdjcyZmLax7LHd3SzhUksimsvbeeZHZ7pcVweIpm/SFdRGHJyFYk8CFJIPG0hY+h11Ocd3oXGg7434qFdj6115bcv3gZngMI1apTpJ61R1QdmsQL9wvfwlAlm8kd/ZYq4OctyWZ/ReCwq0aaU0FlRQqjkFFh8pbpZLJHCTm5ycpb3tOHSbNhg8NVrHaVXqg8XbqoPxEeF55snqRbN2Eod90a+fpxP59qVCxLMdZmJZmO8km5J7SSTKredukksluJnQ/ITj8StPaKY69VhwQHcDwZjsHieE2VV68siLjsUsNU58dy7fwbzQorTVURQqqAqqBYAAWAA5WlmlkskcXKTk3J7Wz9VHCgliAACSSbAAbSSeAmQk28kZjpR6S2JNPBAADYa7C9//qU7Lfaa/dxkKzE8IeJ0GE0Msta//wCfl+y8SgY/MKuIJNaq9W/tszDwB2DuAkWUnLey7rqrr+yKXYjnoDVN16pHEbD5ieGbJPNZPadtPSbEs6o1RqyL9V2JI7nO0eNx2SRC+UI7XmUWJwVV0/oWT6vjcbPoU+HqUQ9E3O5wfWU8mH57jJtVsbFnEpMRhp0T1Z/5LHNpHKH6TcjDIMUg6y2Wp2qTZW7wTbuPZK7H05rpFw3l1ojE5S6GW57V2/n93mdrKlnQGg+jDMf3tAn/ALi/BXH9J85ZaOt31vt+Si0xT9tq7H7e5f5alEZn6TsFqYinVG6olj7yHf5MvlKfSMMpqXNeh0eh7daqUOT9f8ENoy/XdDudCPL/AGJnnR08rHHmvQaXr1qVLk/X9R8wNTVqWPaPH/2JcnOmlaMYjWS0yYJyAIAgCAIAgHBnz6uGrnlSc+Skzdh1nbFdaNGKeVE31P0M1q43qA33gfKXar2nNuzNFZzTFXvNjrjKLjJbGK7pVzU4PJp5p9aJf0V4HpccHIuKSM9/tGyL8GY+E49Yd1YiUH/H9XkfTMVj44jR0bY/zy2dm9dzWRtElnPGZemPMv3GHB51WHmieH7zykPFy3ROg0HT91r7F6v2M0kI6A2j0X5R0GDWoR16/wBIT9jdTHdq9bvcyxw0NWGfM5PS9/SXuK3R2d/H47i4SQVZk/pQ0oNSocJSa1ND9KR9d9+p7q7L8z7u2Dibc3qI6XRGCUY9PNbXu6lz7X6dpnlSoFFzIqWZcykorNnI+YjgJsVbI0sXHgfg5gSLWmOjNUsU2skSeVBbbN/GR7W8zbRq5bCz6NZu2DrLUW5Xc6+0vEd43jt8ZrqudU9Zd54xeHjfW4PfwfJm2UaodVZTdWAIPMEXB8p0EWpLNHHSi4tp70fjF4daqPTYXV1KkdhFjMSipJp8TMJuElJb1tMLr4c03dG3ozKe9SQflObnHVbi+B20JqcVJcVmS+iGK6LGUG4FtQ9z9T5kHwmzCz1bovu8SLjq9fDyXVn4bTY50RyJT/Sbh9bDI/FKo8mVl+erIGkY51J8mW2h55XOPNGf5O+rWpn7VvMFfzlZhZZXRfX67C4x0dbDzXVn4bT2xx1K7dj38zrfnOhOSL3opVs1oMFvmQIAgCAIAgHjjKHSU3Q/WVl/ECPznqMtWSfI8yjrRa5mK4DA4mrRXVoubXU7LbiRsJtfwnRu6tPazlXhrc8lEjswyHFi5OHqHuXW/pvHT1vcz2sNat6Lb6GSEq4qm4K1StNgGBB1VLhth2ixZfOVekK1rK1cdhd4C+fRdBLcm2u/JP08zVJXE4wz0j4rpMwr8k1KY7ggJ/mZpWYh52M7DRcNTCx6835/CK9hqHS1Epg2LuqDvdgv5zUlm8ifOWpFz5JvwP6JXE0qShQ6gKAoFxsAFgLCXUa5cEfPZ3wzblJZnPjc3UU36Ihqmq2oDcAtY6oJtsF7T06bMtiPMMTTrLWezj2GMYrRPFi7FRVJJLFXUsSTckg2uSeUrpYG9bcs+862vTuAlsUsu1P2zIHHYFh1XUr3iR2pQe1E+NlWJj9Ek+wi62B1Re89KeZoswyis8zz/ZmAvaNdbiPKqSWZ15YxDi01WpOJmmTUthZ6YlfIsGaz6PsWamECnaabMnhsYfBreEutHz1qcuWw5fSlepfmuKz9vYssnFcY/pvQ1MdX5Eq34kUn43lBjFldL94HWaOnrYaPevMicNU1GVvZYN5EH8pFUtVp8iVNaya5m7TqTiSv6epfA1uzUPlUSRMas6Jd3qT9GPLEx7/RmU4Q2dD9pf6hKSt5WR7V6nS3rOqS6n6HRpAbV37l/pE6U4xFz0afrjwgF7mTAgCAIAgFQzvSV0LKoqUyCRboHJ8DqkHvEsacLBrN5PvXyVd+Lszaimu5/BTMwzjMqp+iGLI+zSqL8Qok1QwsFt1fEg54yb3y/e4iM2zLFIQKtR6bEbU17EWJB1tU77g75IrjU1nFEW12qWTZHDPaw3V6ni5PzM9OuHJCMrObO/K9MMTTqK2uHI4kDdxBtw5zXLD1zWq0bFdbX9UXtRYW9ImJO40x3IPzJmr+3UdfiHpXFdXgV7EY1KlR6joru5LMTtuTv2bhMf2vC556i7836m/+/wCktVQVrSXLJeiTPajm4TYqqvcAPlN8cLXD7Ul2IhW47EWvOyUpdrb9ToTPmMy6onhWyOlMzqncL+I/zPDhA2KVjPlfOKtMXYFRz4fCYVcHuMudkVm0fvKKqY+o1FxfWQsDxBUqDbt6wPhK3SOGjqp8y60NjrIz+l7VtXx2MpmY4ApVem2+m7Ke3VNr+O/xnMS+htH0uOV1cZ8Gkz2ppwkds2NLce9GiBuE1ykzXqpbjtpiaJBmkejL91W5a4/pF/yltov7Jdvsc9pj/kj2e5c5aFOZR6Qj/wDNb3E+Uosf/wAz7EdRor/xl2srwEgSLA3dZ1hw5Bacm2Br9yfGogkXGPKiX7xJujv/ACYd/ozJ8MOuvvL8xKKv749q9Tp7v+OXY/Q/ekb/AE7dy/0idMcYi6aODrjuEAv4mTAgCAIAgCAcOeY79noVanFV2e8eqvxIm2ivpLFE0Ym3oqpT5Lz4GAZpWNVmc7bn4bhOmSyWRyqk3LaRjrPLNyZp3oWycWr4o2Jv0K9gsrufG6eR5yo0hbm1WuG8u8BS1HpHx3dn+VkaLi8poVf3lClU96mh+JEgRtnH7W13kyVUJfck+4wTSCj0WKxKABQtaqFA3BddtUD7tpH/ALriq5Na2e3iv8PzOgj/AKd0fiKYy1Mm4ram1ty27Nq39RMaJZVTqK1WqNYX1UU7tguzHnvAA7+yWNekrbq92XZ+7Cuf+m8Nh7t7kstz4eG/wPbSHKKZUtSGo4+qPVbstwMk0YucXlN5o143/T9d0HKhZSXDg+rqf6ylnEGWmsca6cnkz5+0RrGOjL56M6KUTWxuJboqa0yia2y6khqlQjl1VC8+twIJpMdiVY9VbkXujsHKCzy2vgVvEaYviK1Q6lLVdmKh6FIsFJOqC1r3AttvKGyyW3YvA7OjC1pqKlJZZbmeVISuZcs6qYmpnhnVTE1M8s1TQDCdHhAx31GZ/DYo+C38ZeaOhq0583mcxpSzXvy5LL39yySeVxjml+I6TG4gjcG1fwKEPxUznsXLWukzrcBDUw8F1Z+O05Mro9JWpJ7VRF82Aketa04rrXqbrpatcpck/Q26dScYVj0i1tXBMPbdF8m1/wC2QtIPKlrm0WWio54hPkn8e5mmAW9RPeHwN/ylPh1rWxXWvkvsXLVom+pnLm7a+Jcc2C/ALOkOQNC0cS9SAXqZMCAIAgCAIBUfSXUP7MiD69QA9yqzfMCWGjkukcnwRWaVb6JRXF/LMrq5cZcqxMoejaIyvhiu+acTiIUVOyXDz6ifgMHZi740w48eS4vu/BqPoar/AEOJp8qivbsdAv8A+c5Si2VjlKW9vM7nS2HhR0UILKKjqruf5NEkgqDC/SLhejzCvyfUqDuZAD/MrSsxCysZ2Oi56+Fj1Zrz+Mj10dxdqOry/NmMs8JH/ZXf6s2X1ZyzPzj8beS0jZVUW3QejhsxoPSxFGnUqUuqHKLr9G19Sz2vssw+6J5nOcH9LazOc03gYV3KzVWUvVb/AB3ma5xljYKvUpOBrU22EgWYb1cd4sezdwlXZjMTm4ylmT6tF6PtrVsIZdjezmuO4g8xzSrX6rOSoOxeHeQN/jPLnJraeI0V1v6EdGWYS3WMi2z4IsMPTl9TJqmJEkSmdNMTSzyyXyLLGxVZaS8drH2VHrN+uJEVVO6agv1EXE3xprc33dbNloUgiqqiyqAoHIAWAnTxiopJHISk5Nye9nhmmNFCjUqtuRS1uZG4d5Nh4zzZNQg5Pge6a3bYoLizEWcsSzbSSSTzJNz8ZzLbe1naJJLJFj0DwfSYtDwphnPlqj4sD4STgIa1yfLb7FfpOzUw7XPZ7mqzoDlyh+lHFbKFLmWc+A1V/qbylXpOeyMe/wDfEu9DV7Zz7F7+xT8oX6QHkCfy/ORcBHWuT5Jv29yZpSerh2ubS9/YicsPTYkHm5fyu3ztL05k1PROldrwYLfMgQBAEAQBAKzp9hGeglRVLdDUDsoFyUsVewG8gNreBkvB2KM2nxWRDxtTnBNcHmVWhg0ravRMtTW9XVIN+636Emuxx+7YV/Q624hfSDkhwhw9zfXVybbgyldnkw+MotJ3ytlHkdr/AKZw0KoTeX1bM31cvH93HV6I8bqYx6Z3VaRt2tTOsB+Ev5SJhZZTy5k/TVetQp8n6/qNglgcuZj6Y8t20MQBzpMfN08P3nmJCxcd0joNB3fdU+1ej9ijZHTqOzrTpu+wX1VJtt4kbuO+ScDZ9Oq+BdzshF/W0u06cXlmJG/D1h29E9vMC0sE1zNtd9D3Tj4olPRzjzQx6KdgqBqTA7NpGstxz1lA+9PNqziRdMU9LhHJfx2+z8i0+lfJ0xKJq7MQNitzX2H7L7QeHibwLKlLbxOWwmNlRnH+L/c1+7TIRk1Sg+rXRqbjbqsLbOY4Edo2SBbJrYdHhYQnHXTzRIUxIsmTjqpiaZHhktk2U1cU2rSTW5tuVfebh3b5iumdrygiPfiK6Y6038vsNY0cyJMHT1V6zt6722k8hyUcBL3DYaNMclv4s5bF4uWInm9iW5EvJBFM+9JOdXK4ZDus1Tv3on9x+7KrSF//AOa7y+0Thss7pdi937eJR1lSy6Zpno6y3o6DVSNtU7PcW4HmSx7rS60dVq1ub4+hzmlrte1QX8fVltliVRkWmuO6fGVCDdUtTH3L638xac/jbNe59Wz97zq9HVdHh1nx2+P4yIp6vRYeq/FhqDx2bPP4SZo2vKMp89ngV2mLM5xr5bfE8dD6Fy9TlZB47T/b5yzKY1zRjD6qXmTBOQBAEAQBAEAQDzp0VUkqoUneQAL99t8zm2MioelbLulwWuBc0XV/unqN4ANrfdkbExzhnyLXQ92piNV/yWXuvgybJswOGxFGsP4bhj2rucDvUsPGQIS1ZJnTX1dNVKvmv8eZtmf5hXUKaFKpVRlBD0ujJ28wxBtaxuL75cxye05PC1UtvpZJNcHn7e5n+fU8wxSlOgxTKbdVxZdhuNmtbfMTlHLLVzLum3B0bU4580QOXYmth6dRWvRC1CpF7Nr2swtv2as01tuL1VkkyTNK1qSWezPuPv8AzBWHq12/Ff5zDskuJqdEeMT7/wA01rqz6tQqQykqNYFTcFTwIMwsTKO/aYVUUmlsT2MnE01Zqgq1KC1DwGuQB4WMmqtPiR/7FW91j8PydeZacDErqVcHSdeAYlrdq7AQe0TEsPCSye021aI6J60LWuzYVpzRLXFLUHshqhH8xJ+MjvR9PX4liq7EsnLPw9kjrw9eiv8ADU99z8zPawNC/iu/b6mqVVj4k1hdIyihVOqo3KDYDuAm6NcYrJLIiTwCk82s2d1HSph9c+ZjURolo6L4HZhNKKza6oVqMVJXWAFj3rvAJGw+c02xkk9XeVmIwSokpSz1c9vMoNYsXYuSXLHWJ3619t+285iees9bedNDV1Vq7stnYSOj+VNiqy0xcA7Xb2VG89/AdpE9UUu6aiu/sNGKxCorc33dpstGkEVVUWVQAAOAAsAJ0kUorJHISk5Nt72R+keZjC4epU+sBZBzY7F+O3uBmrEW9FW5G/CUdNaoePYYwLntJ8yZze1nYPJLqObSavbo6I+qNZveO78/OdJRX0dahyOPxFvS2ynz9OBbNGsu1Ep0+O9u87T/AI8JtNBp+Ao6iATJg6IAgCAIAgCAIAgHji8OtVHpuLq6lWHMMLEeRmGs1kz1CbhJSjvW0/nbM8A2GrVKL+tTYqTztubuIsfGVMouLaZ3VVqtgrI7ms/3s3GseirPOnw3QMevQsB20z6lu7avgvOTsNPOOq+BzWmMN0d3SLdL14+O8utSoFBYmwAJJ5AbTJJUpNvJGAaSZocVWeodgJJA5X/OwA8JK1MoNHfYbDKilQXIg2EgTieJRPIVTTZWChipBsdxtzkZ5RkmQ763KDiuJZ8sx+HxNhqhX40z1W+6RbW8PhJcLdYoZzxeHf3PLx9S+UtAKNekro9SixG42dfI2P8ANNqkzZXpi6P3JPy/fAhcx0CxdK5TVrj7J1W/C2zyJmddk+rS9cvuzRXKyNSbVqI1NvZZSp8jM9IT44lSWaeaPajjLcFPeAZnpEHOLPV8QGFtRB2qCD8DaZ10ZjJJ72Smh2HL42kAdiK7vysUamoPezC3unlMTkmiv0tdHodTiz9Z/gqdTF1RTrJrF9XUK1L6wABAKoQTcGUV+Hjba9Saz5GvDYqVNEdeEskt6y3F+0RyMYSiL7aj2Z2+Si/AX87ydhcOqY5cXvKrG4t4iefBbkTslEMy3T/O/wBordEhvTpEjsZ9zHw9X8UpMdfrz1VuXqdLozC9FXry3y9Pzv8AAruHIUNUb1UF+88B+uyYwNOvZrPcvX92mdKYjo6tRb5enH4ODR/DHE1zVfcp1jyLfVUd2/wHOXZzRqujGBudYwYLdMgQBAEAQBAEAQBAEAzT0t5DfVxaDdZKtuV+o57idU968pDxVf8ANF/oXFb6Jdq917+PMoej2cPgsQlZNursZfbQ+sv5jtAMi1zcJZousTh431OuXHyfB/vA2DSrNVqZZUq0W1lqoqqeyq60zfkQGII5iW9TUmmjmcBQ442MJ74tvwWfsZTWyuS8zrI4gjK2AYGwBOwnYCTYC5OzgACfCRbUo5tmJTiciLKec9Z5hRyPy1BTttPOszDri+BZMp0wxmGAVK7Mo+pUAcebdYdwM9xvsjuZFt0dhrN8cn1bPx5E7R9J2L+tToN92oP757/rJ8kQ5aFo4OXivg5sz06xGJUo9PDleRpFrdo12Iv22niWMsfI2V6KpreacvH4SK1q8jaeY4ua37SVKiPDYfTr8CP1ym2OOj/JMj20Wpf7eXfmdmGzmpQBp0FvVfe29r7tYns8hNn9U7NlaZU2YRxl0mIkn+/uxE3oblz06ysT0lQnad4F94H5njNtNCr28SJicVK3ZwNhXdJJDKtpzpH+y0+ipn6Zxw+op2Fu/gPPhIWMxHRx1Y735Fno7B9NPXl9q83y+TLqa3IAlJGLk1FbzpJzUIuUtyOXNqhqMuHpbdvW7W7ewfrdOioqVUFFHI4m932Ob7upFz0eykIqU1223nmTvP67JtI5pGX4YU0AmTB1QBAEAQBAEAQBAEAQDyxWHWqjI6hkYFWU7iCLEGYaTWTPUJOElKLyaMF0ryB8BXNM3KG7U39pe37Q3HwPESrtrcJZHZ4PFRxNeut/Fcn8Ph+D5lWdNTo1sMzfRVLMt72p1VZXR/dJUBhy2jaCDspucHlwM34dSsjdH7l5p7Gu3l4dl1wODOIC6tKorEC4NNrbRfZUtqMvJgSDLSNqazKuWJjXvkv3q3lx0f0fTC3Y2aoRYtyHsr2fOYlLMqsXjJX7P4ogtJ/R1RxJNSgRh6h2kW+jY9qj1D2r5GRLMNGW1bGSsJpeyr6bPqXmvnv8TNc40ZxWEJ6WiwUfxF69Pv1h6v3rGQ51TjvRf0Y2i77JbeT2Pw+MyKQ3mlkpnqs8s8nqs8MwdGGoNUbVRWdvZVSx8htnlJvYtp4nKMVnJ5LrLXl2g9YqalciggF7bGc9wGxfE+ElV4Gcts9i8yqxGlqobK/qfl+/uZ44HKwzlaKbzv3k9rGWddUa1lFFBdfO6WtNmjaP5IuGW52ud5m00njpVpMmCSws9Zh1Kf8Ac/Jfnw4kRsRiVUuvkTsFgpYiXKK3v2XX6GS4nEtVdqlRizsbsx4n8h2cJRTk5NylvOphCMIqMVkkeWNxXQLYbar+qOKg7L25ngJbYLDai15b35HPaSxvSvo4fat/W/hfvAl9GckNIazC9Vt/HVHLv5yeVRpmQZZ0Y1iNsyYJuAIAgCAIAgCAIAgCAIAgETpLkNPH0TSqbDvRwNqNwI+RHETxZWprJknC4qeHs14965owrOcqq4Sq1Ksuqw3H6rDgyHiD/tvlXODg8mdjRfC+CnB7PTqZOaG6aVMAQj3q4cnal+sl95pX+KnYew3vtqvcNj3EPHaOhiVrR2S58+35NjyrNKWKpipRcVFPLeDyYHap7DLCMlJZo5a6mymWrYsmdk9GoQCLxujuFrG9TDUmb2tRQ34htmuVUJb0iRXi761lGbS7SObQPAH+BbuqVh8nmt4Wp8PNkhaUxS/n5L4OjD6HYJN2GQ+9rP8A1kzKw1S/ieJaRxMt833bPQl8Ph6dIaqKtMclAUeQm5RUVkkRJTlN5yefaQGk+KNQihT2lt9uEyeSQyPJ1wyfa4mAV/SfTtKN6eGIq1Nxfeid3tt3bPlIOIxqj9MNrLfB6LlZ9VuxcuL+DN69dqjM7sXZjdmJuTKiUnJ5s6GEIwioxWSR8q1uits16repT379xYfISxwmE/nZ3L3ZR6Q0hnnVU+1+y92SuQZEwbpKvXrNt56t/wC75bhLMpDRsiybVszTJgsQFoB9gCAIAgCAIAgCAIAgCAIAgETpHo/Rx1Lo6o2jajj1kPNT8xuM8WVxmsmScLirMPPWh3rgzFtJdGq+Ae1QayE9WqoOo3YfZb7J8L75XWVSg9p1mExtWJjnHfxXH8rr9DhyzMquGfpKNRqbcxuI5MDsYdhE8Rk4vNG+2mu6OrYs0aHkfpSBsuLpap/1ae0d7Ido8C3cJLhiv+yKLEaEe+mXc/n5yLxlef4bFfua6VD7IazDvQ2YeIkmNkZbmU92Fup++LXp47iSns0HwwCjZ7pBXDsqgoB2TAK/ic7qLterqjmSB84bS3nqMXLYlmR2F09TDVNZb128h+Ij5AzTK+K3bSXXgpyf1bF+8D5nGl+IxwszalM/w0uAffO9vHZ2SruxFk9j2LkdBhcDTSlKKzfN+3L1IimhOwC8jxi5PKKzZLssjXHWm8ke2HVnOrRAduNQ/u07j9Zv1tlrh8GofVPa/Q53G6Slb9FeyPm/hFjyHR7UNxepUPrVDv7bchJpVF9yfJAli2+ZME4BaAfYAgCAIAgCAIAgCAIAgCAIAgCAeWJw61VKOodWFirAEEciDvmGs9jPUZOLUovJozrSP0Zg3fCNqceickr91t69xv4SLZhU9sS7w2mpR+m5Z9a3963PyM+zPKa2GNq1Jk7SLqe5hs+MiThKH3IvKcTVd/xyT6uPhvOEgHtngkZ5Hfhc4xFL1MRWQchVqAfhvaelZJbmzRPD0z+6CfciQXS3G/8AVVPNT8xHTWf9jT/QYb/ojmxec4ir+8r1W++w+RE8u6x8WZWDw8d0F4EEuH6VmJv3nafMxKbSNUaVJvZkj8tlb8No58u88J6hPX2JGi6pV7ZNJdZO5Tlj6oAUt3bF/Gdn4dabVg3N5y2ESWlY1x1a1m+b3fL8iw4PRwvsqdYf6aXCfePrP42HZJ1dUa1lFFRdiLLpa03mXDKtG9gFgqjcALAdwns0lpweXrTGwTJg64AgCAIAgCAIAgCAIAgCAIAgCAIAgCAIB418KrizAGAVnMtA8LVueiVTzW6H+W15qlRCXAm16QxNe6b79vqV/FejRL9Vqg7LqR8ReanhIPiyXHTd63qL8fk4W9HpH8RvITz/AEcebNn98s/6LxYXQI8WY+AhYOHNniWmrnujHz+Tqw+gyjgT3zZHDVrgRZ6SxMv5Zdmz8kthNDwLdQbOJFyO4nbN6SWxEKUnJ5t5smsNo2o3zJ5JXD5eibhAOoCAfYAgCAIAgCAIAgCAIAgCAIAgCAIAgCAIAgCAIAgCAfLQD7AEAQBAEAQBAEAQBAEAQBAEAQBAEAQBAEAQBAEAQBAEAQBAEAQBAEAQBAEAQBAEAQBAEAQBAEA//9k="/>
+          <p:cNvSpPr>
+            <a:spLocks noChangeAspect="1" noChangeArrowheads="1"/>
+          </p:cNvSpPr>
+          <p:nvPr/>
+        </p:nvSpPr>
+        <p:spPr bwMode="auto">
+          <a:xfrm>
+            <a:off x="307975" y="7937"/>
+            <a:ext cx="304800" cy="304801"/>
+          </a:xfrm>
+          <a:prstGeom prst="rect">
+            <a:avLst/>
+          </a:prstGeom>
+          <a:noFill/>
+          <a:extLst>
+            <a:ext uri="{909E8E84-426E-40DD-AFC4-6F175D3DCCD1}">
+              <a14:hiddenFill xmlns:a14="http://schemas.microsoft.com/office/drawing/2010/main">
+                <a:solidFill>
+                  <a:srgbClr val="FFFFFF"/>
+                </a:solidFill>
+              </a14:hiddenFill>
+            </a:ext>
+          </a:extLst>
+        </p:spPr>
+        <p:txBody>
+          <a:bodyPr vert="horz" wrap="square" lIns="91440" tIns="45720" rIns="91440" bIns="45720" numCol="1" anchor="t" anchorCtr="0" compatLnSpc="1">
+            <a:prstTxWarp prst="textNoShape">
+              <a:avLst/>
+            </a:prstTxWarp>
+          </a:bodyPr>
+          <a:lstStyle/>
+          <a:p>
+            <a:endParaRPr lang="es-PE"/>
+          </a:p>
+        </p:txBody>
+      </p:sp>
+    </p:spTree>
+    <p:extLst>
+      <p:ext uri="{BB962C8B-B14F-4D97-AF65-F5344CB8AC3E}">
+        <p14:creationId xmlns:p14="http://schemas.microsoft.com/office/powerpoint/2010/main" val="1139305875"/>
+      </p:ext>
+    </p:extLst>
+  </p:cSld>
+  <p:clrMapOvr>
+    <a:masterClrMapping/>
+  </p:clrMapOvr>
+  <p:timing>
+    <p:tnLst>
+      <p:par>
+        <p:cTn id="1" dur="indefinite" restart="never" nodeType="tmRoot"/>
+      </p:par>
+    </p:tnLst>
+  </p:timing>
+</p:sld>
+</file>
+
+<file path=ppt/slides/slide8.xml><?xml version="1.0" encoding="utf-8"?>
+<p:sld xmlns:a="http://schemas.openxmlformats.org/drawingml/2006/main" xmlns:r="http://schemas.openxmlformats.org/officeDocument/2006/relationships" xmlns:p="http://schemas.openxmlformats.org/presentationml/2006/main">
+  <p:cSld>
+    <p:spTree>
+      <p:nvGrpSpPr>
+        <p:cNvPr id="1" name=""/>
+        <p:cNvGrpSpPr/>
+        <p:nvPr/>
+      </p:nvGrpSpPr>
+      <p:grpSpPr>
+        <a:xfrm>
+          <a:off x="0" y="0"/>
+          <a:ext cx="0" cy="0"/>
+          <a:chOff x="0" y="0"/>
+          <a:chExt cx="0" cy="0"/>
+        </a:xfrm>
+      </p:grpSpPr>
+      <p:pic>
+        <p:nvPicPr>
+          <p:cNvPr id="8194" name="Picture 2" descr="http://www.liderandotuvida.com/wp-content/uploads/2014/05/alcances2.jpg"/>
+          <p:cNvPicPr>
+            <a:picLocks noChangeAspect="1" noChangeArrowheads="1"/>
+          </p:cNvPicPr>
+          <p:nvPr/>
+        </p:nvPicPr>
+        <p:blipFill>
+          <a:blip r:embed="rId2">
+            <a:duotone>
+              <a:schemeClr val="bg2">
+                <a:shade val="45000"/>
+                <a:satMod val="135000"/>
+              </a:schemeClr>
+              <a:prstClr val="white"/>
+            </a:duotone>
+            <a:extLst>
+              <a:ext uri="{28A0092B-C50C-407E-A947-70E740481C1C}">
+                <a14:useLocalDpi xmlns:a14="http://schemas.microsoft.com/office/drawing/2010/main" val="0"/>
+              </a:ext>
+            </a:extLst>
+          </a:blip>
+          <a:srcRect/>
+          <a:stretch>
+            <a:fillRect/>
+          </a:stretch>
+        </p:blipFill>
+        <p:spPr bwMode="auto">
+          <a:xfrm>
+            <a:off x="3995936" y="2634430"/>
+            <a:ext cx="4490442" cy="3561384"/>
+          </a:xfrm>
+          <a:prstGeom prst="rect">
+            <a:avLst/>
+          </a:prstGeom>
+          <a:noFill/>
+          <a:extLst>
+            <a:ext uri="{909E8E84-426E-40DD-AFC4-6F175D3DCCD1}">
+              <a14:hiddenFill xmlns:a14="http://schemas.microsoft.com/office/drawing/2010/main">
+                <a:solidFill>
+                  <a:srgbClr val="FFFFFF"/>
+                </a:solidFill>
+              </a14:hiddenFill>
+            </a:ext>
+          </a:extLst>
+        </p:spPr>
+      </p:pic>
+      <p:sp>
+        <p:nvSpPr>
+          <p:cNvPr id="2" name="1 Título"/>
+          <p:cNvSpPr>
+            <a:spLocks noGrp="1"/>
+          </p:cNvSpPr>
+          <p:nvPr>
+            <p:ph type="title"/>
+          </p:nvPr>
+        </p:nvSpPr>
+        <p:spPr/>
+        <p:txBody>
+          <a:bodyPr/>
+          <a:lstStyle/>
+          <a:p>
+            <a:r>
+              <a:rPr lang="es-PE" dirty="0" smtClean="0"/>
+              <a:t>ALCANCES</a:t>
+            </a:r>
+            <a:endParaRPr lang="es-PE" dirty="0"/>
+          </a:p>
+        </p:txBody>
+      </p:sp>
+      <p:sp>
+        <p:nvSpPr>
+          <p:cNvPr id="3" name="2 Marcador de contenido"/>
+          <p:cNvSpPr>
+            <a:spLocks noGrp="1"/>
+          </p:cNvSpPr>
+          <p:nvPr>
+            <p:ph idx="1"/>
+          </p:nvPr>
+        </p:nvSpPr>
+        <p:spPr>
+          <a:xfrm>
+            <a:off x="838200" y="1700808"/>
+            <a:ext cx="7467600" cy="4248472"/>
+          </a:xfrm>
+        </p:spPr>
+        <p:txBody>
+          <a:bodyPr>
+            <a:normAutofit/>
+          </a:bodyPr>
+          <a:lstStyle/>
+          <a:p>
+            <a:pPr algn="just"/>
+            <a:r>
+              <a:rPr lang="es-PE" dirty="0" smtClean="0"/>
+              <a:t>Se investigará sobre las diferentes técnicas y herramientas informáticas usadas para el aprendizaje colaborativo</a:t>
+            </a:r>
+            <a:r>
+              <a:rPr lang="es-PE" dirty="0" smtClean="0"/>
+              <a:t>.</a:t>
+            </a:r>
+            <a:endParaRPr lang="es-PE" dirty="0" smtClean="0"/>
+          </a:p>
+          <a:p>
+            <a:pPr algn="just"/>
+            <a:r>
+              <a:rPr lang="es-PE" dirty="0" smtClean="0"/>
+              <a:t>Se evaluará el sistema a desarrollar en base a las métricas definidas.</a:t>
+            </a:r>
+          </a:p>
+          <a:p>
+            <a:pPr algn="just"/>
+            <a:r>
+              <a:rPr lang="es-PE" dirty="0" smtClean="0"/>
+              <a:t>Se implementará el sistema en la FISI.</a:t>
+            </a:r>
+            <a:endParaRPr lang="es-PE" dirty="0"/>
+          </a:p>
+        </p:txBody>
+      </p:sp>
+    </p:spTree>
+    <p:extLst>
+      <p:ext uri="{BB962C8B-B14F-4D97-AF65-F5344CB8AC3E}">
+        <p14:creationId xmlns:p14="http://schemas.microsoft.com/office/powerpoint/2010/main" val="172080525"/>
+      </p:ext>
+    </p:extLst>
+  </p:cSld>
+  <p:clrMapOvr>
+    <a:masterClrMapping/>
+  </p:clrMapOvr>
+  <p:timing>
+    <p:tnLst>
+      <p:par>
+        <p:cTn id="1" dur="indefinite" restart="never" nodeType="tmRoot"/>
+      </p:par>
+    </p:tnLst>
+  </p:timing>
+</p:sld>
+</file>
+
+<file path=ppt/slides/slide9.xml><?xml version="1.0" encoding="utf-8"?>
+<p:sld xmlns:a="http://schemas.openxmlformats.org/drawingml/2006/main" xmlns:r="http://schemas.openxmlformats.org/officeDocument/2006/relationships" xmlns:p="http://schemas.openxmlformats.org/presentationml/2006/main">
+  <p:cSld>
+    <p:spTree>
+      <p:nvGrpSpPr>
+        <p:cNvPr id="1" name=""/>
+        <p:cNvGrpSpPr/>
+        <p:nvPr/>
+      </p:nvGrpSpPr>
+      <p:grpSpPr>
+        <a:xfrm>
+          <a:off x="0" y="0"/>
+          <a:ext cx="0" cy="0"/>
+          <a:chOff x="0" y="0"/>
+          <a:chExt cx="0" cy="0"/>
+        </a:xfrm>
+      </p:grpSpPr>
+      <p:pic>
+        <p:nvPicPr>
+          <p:cNvPr id="5122" name="Picture 2" descr="http://www.posicionamiento-eficaz.org/blog/wp-content/uploads/definiciones-rrpp1.jpg"/>
+          <p:cNvPicPr>
+            <a:picLocks noChangeAspect="1" noChangeArrowheads="1"/>
+          </p:cNvPicPr>
+          <p:nvPr/>
+        </p:nvPicPr>
+        <p:blipFill>
+          <a:blip r:embed="rId2">
+            <a:extLst>
+              <a:ext uri="{28A0092B-C50C-407E-A947-70E740481C1C}">
+                <a14:useLocalDpi xmlns:a14="http://schemas.microsoft.com/office/drawing/2010/main" val="0"/>
+              </a:ext>
+            </a:extLst>
+          </a:blip>
+          <a:srcRect/>
+          <a:stretch>
+            <a:fillRect/>
+          </a:stretch>
+        </p:blipFill>
+        <p:spPr bwMode="auto">
+          <a:xfrm>
+            <a:off x="4371319" y="1484784"/>
+            <a:ext cx="4261470" cy="4810104"/>
+          </a:xfrm>
+          <a:prstGeom prst="rect">
+            <a:avLst/>
+          </a:prstGeom>
+          <a:noFill/>
+          <a:extLst>
+            <a:ext uri="{909E8E84-426E-40DD-AFC4-6F175D3DCCD1}">
+              <a14:hiddenFill xmlns:a14="http://schemas.microsoft.com/office/drawing/2010/main">
+                <a:solidFill>
+                  <a:srgbClr val="FFFFFF"/>
+                </a:solidFill>
+              </a14:hiddenFill>
+            </a:ext>
+          </a:extLst>
+        </p:spPr>
+      </p:pic>
+      <p:sp>
+        <p:nvSpPr>
+          <p:cNvPr id="2" name="1 Título"/>
+          <p:cNvSpPr>
+            <a:spLocks noGrp="1"/>
+          </p:cNvSpPr>
+          <p:nvPr>
+            <p:ph type="title"/>
+          </p:nvPr>
+        </p:nvSpPr>
+        <p:spPr/>
+        <p:txBody>
+          <a:bodyPr/>
+          <a:lstStyle/>
+          <a:p>
+            <a:r>
+              <a:rPr lang="es-PE" dirty="0" smtClean="0"/>
+              <a:t>MARCO TEÓRICO</a:t>
+            </a:r>
+            <a:endParaRPr lang="es-PE" dirty="0"/>
+          </a:p>
+        </p:txBody>
+      </p:sp>
+      <p:sp>
+        <p:nvSpPr>
+          <p:cNvPr id="3" name="2 Marcador de texto"/>
+          <p:cNvSpPr>
+            <a:spLocks noGrp="1"/>
+          </p:cNvSpPr>
+          <p:nvPr>
+            <p:ph type="body" idx="1"/>
+          </p:nvPr>
+        </p:nvSpPr>
+        <p:spPr/>
+        <p:txBody>
+          <a:bodyPr/>
+          <a:lstStyle/>
+          <a:p>
+            <a:r>
+              <a:rPr lang="es-PE" dirty="0" smtClean="0"/>
+              <a:t>CAPÍTULO 2</a:t>
+            </a:r>
+            <a:endParaRPr lang="es-PE" dirty="0"/>
+          </a:p>
+        </p:txBody>
+      </p:sp>
+    </p:spTree>
+    <p:extLst>
+      <p:ext uri="{BB962C8B-B14F-4D97-AF65-F5344CB8AC3E}">
+        <p14:creationId xmlns:p14="http://schemas.microsoft.com/office/powerpoint/2010/main" val="204655190"/>
       </p:ext>
     </p:extLst>
   </p:cSld>

</xml_diff>

<commit_message>
Tesis, version exposicion final del 20141210
</commit_message>
<xml_diff>
--- a/tesis.pptx
+++ b/tesis.pptx
@@ -15,23 +15,24 @@
     <p:sldId id="265" r:id="rId9"/>
     <p:sldId id="268" r:id="rId10"/>
     <p:sldId id="266" r:id="rId11"/>
-    <p:sldId id="271" r:id="rId12"/>
-    <p:sldId id="285" r:id="rId13"/>
-    <p:sldId id="284" r:id="rId14"/>
-    <p:sldId id="286" r:id="rId15"/>
-    <p:sldId id="290" r:id="rId16"/>
-    <p:sldId id="294" r:id="rId17"/>
-    <p:sldId id="291" r:id="rId18"/>
-    <p:sldId id="295" r:id="rId19"/>
-    <p:sldId id="292" r:id="rId20"/>
-    <p:sldId id="296" r:id="rId21"/>
-    <p:sldId id="297" r:id="rId22"/>
-    <p:sldId id="298" r:id="rId23"/>
-    <p:sldId id="293" r:id="rId24"/>
-    <p:sldId id="299" r:id="rId25"/>
-    <p:sldId id="300" r:id="rId26"/>
-    <p:sldId id="289" r:id="rId27"/>
-    <p:sldId id="288" r:id="rId28"/>
+    <p:sldId id="301" r:id="rId12"/>
+    <p:sldId id="271" r:id="rId13"/>
+    <p:sldId id="285" r:id="rId14"/>
+    <p:sldId id="284" r:id="rId15"/>
+    <p:sldId id="286" r:id="rId16"/>
+    <p:sldId id="290" r:id="rId17"/>
+    <p:sldId id="294" r:id="rId18"/>
+    <p:sldId id="291" r:id="rId19"/>
+    <p:sldId id="295" r:id="rId20"/>
+    <p:sldId id="292" r:id="rId21"/>
+    <p:sldId id="296" r:id="rId22"/>
+    <p:sldId id="297" r:id="rId23"/>
+    <p:sldId id="298" r:id="rId24"/>
+    <p:sldId id="293" r:id="rId25"/>
+    <p:sldId id="299" r:id="rId26"/>
+    <p:sldId id="300" r:id="rId27"/>
+    <p:sldId id="289" r:id="rId28"/>
+    <p:sldId id="288" r:id="rId29"/>
   </p:sldIdLst>
   <p:sldSz cx="9144000" cy="6858000" type="screen4x3"/>
   <p:notesSz cx="6858000" cy="9144000"/>
@@ -9295,6 +9296,231 @@
           <a:chExt cx="0" cy="0"/>
         </a:xfrm>
       </p:grpSpPr>
+      <p:sp>
+        <p:nvSpPr>
+          <p:cNvPr id="2" name="1 Título"/>
+          <p:cNvSpPr>
+            <a:spLocks noGrp="1"/>
+          </p:cNvSpPr>
+          <p:nvPr>
+            <p:ph type="title"/>
+          </p:nvPr>
+        </p:nvSpPr>
+        <p:spPr/>
+        <p:txBody>
+          <a:bodyPr/>
+          <a:lstStyle/>
+          <a:p>
+            <a:r>
+              <a:rPr lang="es-PE" dirty="0" err="1" smtClean="0"/>
+              <a:t>Jigsaw</a:t>
+            </a:r>
+            <a:endParaRPr lang="es-PE" dirty="0"/>
+          </a:p>
+        </p:txBody>
+      </p:sp>
+      <p:pic>
+        <p:nvPicPr>
+          <p:cNvPr id="1026" name="Picture 2"/>
+          <p:cNvPicPr>
+            <a:picLocks noChangeAspect="1" noChangeArrowheads="1"/>
+          </p:cNvPicPr>
+          <p:nvPr/>
+        </p:nvPicPr>
+        <p:blipFill>
+          <a:blip r:embed="rId2">
+            <a:extLst>
+              <a:ext uri="{28A0092B-C50C-407E-A947-70E740481C1C}">
+                <a14:useLocalDpi xmlns:a14="http://schemas.microsoft.com/office/drawing/2010/main" val="0"/>
+              </a:ext>
+            </a:extLst>
+          </a:blip>
+          <a:srcRect/>
+          <a:stretch>
+            <a:fillRect/>
+          </a:stretch>
+        </p:blipFill>
+        <p:spPr bwMode="auto">
+          <a:xfrm>
+            <a:off x="539552" y="1714500"/>
+            <a:ext cx="4371975" cy="1714500"/>
+          </a:xfrm>
+          <a:prstGeom prst="rect">
+            <a:avLst/>
+          </a:prstGeom>
+          <a:noFill/>
+          <a:ln>
+            <a:noFill/>
+          </a:ln>
+          <a:extLst>
+            <a:ext uri="{909E8E84-426E-40DD-AFC4-6F175D3DCCD1}">
+              <a14:hiddenFill xmlns:a14="http://schemas.microsoft.com/office/drawing/2010/main">
+                <a:solidFill>
+                  <a:schemeClr val="accent1"/>
+                </a:solidFill>
+              </a14:hiddenFill>
+            </a:ext>
+            <a:ext uri="{91240B29-F687-4F45-9708-019B960494DF}">
+              <a14:hiddenLine xmlns:a14="http://schemas.microsoft.com/office/drawing/2010/main" w="9525">
+                <a:solidFill>
+                  <a:schemeClr val="tx1"/>
+                </a:solidFill>
+                <a:miter lim="800000"/>
+                <a:headEnd/>
+                <a:tailEnd/>
+              </a14:hiddenLine>
+            </a:ext>
+          </a:extLst>
+        </p:spPr>
+      </p:pic>
+      <p:pic>
+        <p:nvPicPr>
+          <p:cNvPr id="1027" name="Picture 3"/>
+          <p:cNvPicPr>
+            <a:picLocks noChangeAspect="1" noChangeArrowheads="1"/>
+          </p:cNvPicPr>
+          <p:nvPr/>
+        </p:nvPicPr>
+        <p:blipFill>
+          <a:blip r:embed="rId3">
+            <a:extLst>
+              <a:ext uri="{28A0092B-C50C-407E-A947-70E740481C1C}">
+                <a14:useLocalDpi xmlns:a14="http://schemas.microsoft.com/office/drawing/2010/main" val="0"/>
+              </a:ext>
+            </a:extLst>
+          </a:blip>
+          <a:srcRect/>
+          <a:stretch>
+            <a:fillRect/>
+          </a:stretch>
+        </p:blipFill>
+        <p:spPr bwMode="auto">
+          <a:xfrm>
+            <a:off x="4139952" y="3411731"/>
+            <a:ext cx="4391025" cy="1609725"/>
+          </a:xfrm>
+          <a:prstGeom prst="rect">
+            <a:avLst/>
+          </a:prstGeom>
+          <a:noFill/>
+          <a:ln>
+            <a:noFill/>
+          </a:ln>
+          <a:extLst>
+            <a:ext uri="{909E8E84-426E-40DD-AFC4-6F175D3DCCD1}">
+              <a14:hiddenFill xmlns:a14="http://schemas.microsoft.com/office/drawing/2010/main">
+                <a:solidFill>
+                  <a:schemeClr val="accent1"/>
+                </a:solidFill>
+              </a14:hiddenFill>
+            </a:ext>
+            <a:ext uri="{91240B29-F687-4F45-9708-019B960494DF}">
+              <a14:hiddenLine xmlns:a14="http://schemas.microsoft.com/office/drawing/2010/main" w="9525">
+                <a:solidFill>
+                  <a:schemeClr val="tx1"/>
+                </a:solidFill>
+                <a:miter lim="800000"/>
+                <a:headEnd/>
+                <a:tailEnd/>
+              </a14:hiddenLine>
+            </a:ext>
+          </a:extLst>
+        </p:spPr>
+      </p:pic>
+      <p:pic>
+        <p:nvPicPr>
+          <p:cNvPr id="1028" name="Picture 4"/>
+          <p:cNvPicPr>
+            <a:picLocks noChangeAspect="1" noChangeArrowheads="1"/>
+          </p:cNvPicPr>
+          <p:nvPr/>
+        </p:nvPicPr>
+        <p:blipFill>
+          <a:blip r:embed="rId4">
+            <a:extLst>
+              <a:ext uri="{28A0092B-C50C-407E-A947-70E740481C1C}">
+                <a14:useLocalDpi xmlns:a14="http://schemas.microsoft.com/office/drawing/2010/main" val="0"/>
+              </a:ext>
+            </a:extLst>
+          </a:blip>
+          <a:srcRect/>
+          <a:stretch>
+            <a:fillRect/>
+          </a:stretch>
+        </p:blipFill>
+        <p:spPr bwMode="auto">
+          <a:xfrm>
+            <a:off x="620514" y="4653136"/>
+            <a:ext cx="4210050" cy="1619250"/>
+          </a:xfrm>
+          <a:prstGeom prst="rect">
+            <a:avLst/>
+          </a:prstGeom>
+          <a:noFill/>
+          <a:ln>
+            <a:noFill/>
+          </a:ln>
+          <a:extLst>
+            <a:ext uri="{909E8E84-426E-40DD-AFC4-6F175D3DCCD1}">
+              <a14:hiddenFill xmlns:a14="http://schemas.microsoft.com/office/drawing/2010/main">
+                <a:solidFill>
+                  <a:schemeClr val="accent1"/>
+                </a:solidFill>
+              </a14:hiddenFill>
+            </a:ext>
+            <a:ext uri="{91240B29-F687-4F45-9708-019B960494DF}">
+              <a14:hiddenLine xmlns:a14="http://schemas.microsoft.com/office/drawing/2010/main" w="9525">
+                <a:solidFill>
+                  <a:schemeClr val="tx1"/>
+                </a:solidFill>
+                <a:miter lim="800000"/>
+                <a:headEnd/>
+                <a:tailEnd/>
+              </a14:hiddenLine>
+            </a:ext>
+          </a:extLst>
+        </p:spPr>
+      </p:pic>
+    </p:spTree>
+    <p:extLst>
+      <p:ext uri="{BB962C8B-B14F-4D97-AF65-F5344CB8AC3E}">
+        <p14:creationId xmlns:p14="http://schemas.microsoft.com/office/powerpoint/2010/main" val="4184381172"/>
+      </p:ext>
+    </p:extLst>
+  </p:cSld>
+  <p:clrMapOvr>
+    <a:masterClrMapping/>
+  </p:clrMapOvr>
+  <p:transition spd="slow">
+    <p:cover/>
+  </p:transition>
+  <p:timing>
+    <p:tnLst>
+      <p:par>
+        <p:cTn id="1" dur="indefinite" restart="never" nodeType="tmRoot"/>
+      </p:par>
+    </p:tnLst>
+  </p:timing>
+</p:sld>
+</file>
+
+<file path=ppt/slides/slide12.xml><?xml version="1.0" encoding="utf-8"?>
+<p:sld xmlns:a="http://schemas.openxmlformats.org/drawingml/2006/main" xmlns:r="http://schemas.openxmlformats.org/officeDocument/2006/relationships" xmlns:p="http://schemas.openxmlformats.org/presentationml/2006/main">
+  <p:cSld>
+    <p:spTree>
+      <p:nvGrpSpPr>
+        <p:cNvPr id="1" name=""/>
+        <p:cNvGrpSpPr/>
+        <p:nvPr/>
+      </p:nvGrpSpPr>
+      <p:grpSpPr>
+        <a:xfrm>
+          <a:off x="0" y="0"/>
+          <a:ext cx="0" cy="0"/>
+          <a:chOff x="0" y="0"/>
+          <a:chExt cx="0" cy="0"/>
+        </a:xfrm>
+      </p:grpSpPr>
       <p:pic>
         <p:nvPicPr>
           <p:cNvPr id="7170" name="Picture 2" descr="http://www.fedesarrollo.org.co/wp-content/uploads/2011/08/investigaciones.jpg"/>
@@ -9412,7 +9638,7 @@
 </p:sld>
 </file>
 
-<file path=ppt/slides/slide12.xml><?xml version="1.0" encoding="utf-8"?>
+<file path=ppt/slides/slide13.xml><?xml version="1.0" encoding="utf-8"?>
 <p:sld xmlns:a="http://schemas.openxmlformats.org/drawingml/2006/main" xmlns:r="http://schemas.openxmlformats.org/officeDocument/2006/relationships" xmlns:p="http://schemas.openxmlformats.org/presentationml/2006/main">
   <p:cSld>
     <p:spTree>
@@ -9534,7 +9760,7 @@
 </p:sld>
 </file>
 
-<file path=ppt/slides/slide13.xml><?xml version="1.0" encoding="utf-8"?>
+<file path=ppt/slides/slide14.xml><?xml version="1.0" encoding="utf-8"?>
 <p:sld xmlns:a="http://schemas.openxmlformats.org/drawingml/2006/main" xmlns:r="http://schemas.openxmlformats.org/officeDocument/2006/relationships" xmlns:p="http://schemas.openxmlformats.org/presentationml/2006/main">
   <p:cSld>
     <p:spTree>
@@ -9656,7 +9882,7 @@
 </p:sld>
 </file>
 
-<file path=ppt/slides/slide14.xml><?xml version="1.0" encoding="utf-8"?>
+<file path=ppt/slides/slide15.xml><?xml version="1.0" encoding="utf-8"?>
 <p:sld xmlns:a="http://schemas.openxmlformats.org/drawingml/2006/main" xmlns:r="http://schemas.openxmlformats.org/officeDocument/2006/relationships" xmlns:p="http://schemas.openxmlformats.org/presentationml/2006/main">
   <p:cSld>
     <p:spTree>
@@ -9782,7 +10008,7 @@
 </p:sld>
 </file>
 
-<file path=ppt/slides/slide15.xml><?xml version="1.0" encoding="utf-8"?>
+<file path=ppt/slides/slide16.xml><?xml version="1.0" encoding="utf-8"?>
 <p:sld xmlns:a="http://schemas.openxmlformats.org/drawingml/2006/main" xmlns:r="http://schemas.openxmlformats.org/officeDocument/2006/relationships" xmlns:p="http://schemas.openxmlformats.org/presentationml/2006/main">
   <p:cSld>
     <p:spTree>
@@ -9910,7 +10136,7 @@
 </p:sld>
 </file>
 
-<file path=ppt/slides/slide16.xml><?xml version="1.0" encoding="utf-8"?>
+<file path=ppt/slides/slide17.xml><?xml version="1.0" encoding="utf-8"?>
 <p:sld xmlns:a="http://schemas.openxmlformats.org/drawingml/2006/main" xmlns:r="http://schemas.openxmlformats.org/officeDocument/2006/relationships" xmlns:p="http://schemas.openxmlformats.org/presentationml/2006/main">
   <p:cSld>
     <p:spTree>
@@ -10179,7 +10405,7 @@
 </p:sld>
 </file>
 
-<file path=ppt/slides/slide17.xml><?xml version="1.0" encoding="utf-8"?>
+<file path=ppt/slides/slide18.xml><?xml version="1.0" encoding="utf-8"?>
 <p:sld xmlns:a="http://schemas.openxmlformats.org/drawingml/2006/main" xmlns:r="http://schemas.openxmlformats.org/officeDocument/2006/relationships" xmlns:p="http://schemas.openxmlformats.org/presentationml/2006/main">
   <p:cSld>
     <p:spTree>
@@ -10315,7 +10541,7 @@
 </p:sld>
 </file>
 
-<file path=ppt/slides/slide18.xml><?xml version="1.0" encoding="utf-8"?>
+<file path=ppt/slides/slide19.xml><?xml version="1.0" encoding="utf-8"?>
 <p:sld xmlns:a="http://schemas.openxmlformats.org/drawingml/2006/main" xmlns:r="http://schemas.openxmlformats.org/officeDocument/2006/relationships" xmlns:p="http://schemas.openxmlformats.org/presentationml/2006/main">
   <p:cSld>
     <p:spTree>
@@ -10809,134 +11035,6 @@
 </p:sld>
 </file>
 
-<file path=ppt/slides/slide19.xml><?xml version="1.0" encoding="utf-8"?>
-<p:sld xmlns:a="http://schemas.openxmlformats.org/drawingml/2006/main" xmlns:r="http://schemas.openxmlformats.org/officeDocument/2006/relationships" xmlns:p="http://schemas.openxmlformats.org/presentationml/2006/main">
-  <p:cSld>
-    <p:spTree>
-      <p:nvGrpSpPr>
-        <p:cNvPr id="1" name=""/>
-        <p:cNvGrpSpPr/>
-        <p:nvPr/>
-      </p:nvGrpSpPr>
-      <p:grpSpPr>
-        <a:xfrm>
-          <a:off x="0" y="0"/>
-          <a:ext cx="0" cy="0"/>
-          <a:chOff x="0" y="0"/>
-          <a:chExt cx="0" cy="0"/>
-        </a:xfrm>
-      </p:grpSpPr>
-      <p:pic>
-        <p:nvPicPr>
-          <p:cNvPr id="10244" name="Picture 4" descr="https://encrypted-tbn2.gstatic.com/images?q=tbn:ANd9GcT2Gh_KTVjfipXe8Xti7ctju__4sEauZp2v8-dEg44BIVn8flMaCw"/>
-          <p:cNvPicPr>
-            <a:picLocks noChangeAspect="1" noChangeArrowheads="1"/>
-          </p:cNvPicPr>
-          <p:nvPr/>
-        </p:nvPicPr>
-        <p:blipFill>
-          <a:blip r:embed="rId2">
-            <a:lum bright="70000" contrast="-70000"/>
-            <a:extLst>
-              <a:ext uri="{28A0092B-C50C-407E-A947-70E740481C1C}">
-                <a14:useLocalDpi xmlns:a14="http://schemas.microsoft.com/office/drawing/2010/main" val="0"/>
-              </a:ext>
-            </a:extLst>
-          </a:blip>
-          <a:srcRect/>
-          <a:stretch>
-            <a:fillRect/>
-          </a:stretch>
-        </p:blipFill>
-        <p:spPr bwMode="auto">
-          <a:xfrm>
-            <a:off x="956078" y="1844824"/>
-            <a:ext cx="7734680" cy="4263008"/>
-          </a:xfrm>
-          <a:prstGeom prst="rect">
-            <a:avLst/>
-          </a:prstGeom>
-          <a:noFill/>
-          <a:extLst>
-            <a:ext uri="{909E8E84-426E-40DD-AFC4-6F175D3DCCD1}">
-              <a14:hiddenFill xmlns:a14="http://schemas.microsoft.com/office/drawing/2010/main">
-                <a:solidFill>
-                  <a:srgbClr val="FFFFFF"/>
-                </a:solidFill>
-              </a14:hiddenFill>
-            </a:ext>
-          </a:extLst>
-        </p:spPr>
-      </p:pic>
-      <p:sp>
-        <p:nvSpPr>
-          <p:cNvPr id="2" name="1 Título"/>
-          <p:cNvSpPr>
-            <a:spLocks noGrp="1"/>
-          </p:cNvSpPr>
-          <p:nvPr>
-            <p:ph type="title"/>
-          </p:nvPr>
-        </p:nvSpPr>
-        <p:spPr/>
-        <p:txBody>
-          <a:bodyPr/>
-          <a:lstStyle/>
-          <a:p>
-            <a:r>
-              <a:rPr lang="es-PE" dirty="0" smtClean="0"/>
-              <a:t>ANÁLISIS DE RESULTADOS</a:t>
-            </a:r>
-            <a:endParaRPr lang="es-PE" dirty="0"/>
-          </a:p>
-        </p:txBody>
-      </p:sp>
-      <p:sp>
-        <p:nvSpPr>
-          <p:cNvPr id="3" name="2 Marcador de texto"/>
-          <p:cNvSpPr>
-            <a:spLocks noGrp="1"/>
-          </p:cNvSpPr>
-          <p:nvPr>
-            <p:ph type="body" idx="1"/>
-          </p:nvPr>
-        </p:nvSpPr>
-        <p:spPr/>
-        <p:txBody>
-          <a:bodyPr/>
-          <a:lstStyle/>
-          <a:p>
-            <a:r>
-              <a:rPr lang="es-PE" dirty="0" smtClean="0"/>
-              <a:t>CAPÍTULO 6</a:t>
-            </a:r>
-            <a:endParaRPr lang="es-PE" dirty="0"/>
-          </a:p>
-        </p:txBody>
-      </p:sp>
-    </p:spTree>
-    <p:extLst>
-      <p:ext uri="{BB962C8B-B14F-4D97-AF65-F5344CB8AC3E}">
-        <p14:creationId xmlns:p14="http://schemas.microsoft.com/office/powerpoint/2010/main" val="2280589442"/>
-      </p:ext>
-    </p:extLst>
-  </p:cSld>
-  <p:clrMapOvr>
-    <a:masterClrMapping/>
-  </p:clrMapOvr>
-  <p:transition spd="slow">
-    <p:cover/>
-  </p:transition>
-  <p:timing>
-    <p:tnLst>
-      <p:par>
-        <p:cTn id="1" dur="indefinite" restart="never" nodeType="tmRoot"/>
-      </p:par>
-    </p:tnLst>
-  </p:timing>
-</p:sld>
-</file>
-
 <file path=ppt/slides/slide2.xml><?xml version="1.0" encoding="utf-8"?>
 <p:sld xmlns:a="http://schemas.openxmlformats.org/drawingml/2006/main" xmlns:r="http://schemas.openxmlformats.org/officeDocument/2006/relationships" xmlns:p="http://schemas.openxmlformats.org/presentationml/2006/main">
   <p:cSld>
@@ -11074,6 +11172,134 @@
 </file>
 
 <file path=ppt/slides/slide20.xml><?xml version="1.0" encoding="utf-8"?>
+<p:sld xmlns:a="http://schemas.openxmlformats.org/drawingml/2006/main" xmlns:r="http://schemas.openxmlformats.org/officeDocument/2006/relationships" xmlns:p="http://schemas.openxmlformats.org/presentationml/2006/main">
+  <p:cSld>
+    <p:spTree>
+      <p:nvGrpSpPr>
+        <p:cNvPr id="1" name=""/>
+        <p:cNvGrpSpPr/>
+        <p:nvPr/>
+      </p:nvGrpSpPr>
+      <p:grpSpPr>
+        <a:xfrm>
+          <a:off x="0" y="0"/>
+          <a:ext cx="0" cy="0"/>
+          <a:chOff x="0" y="0"/>
+          <a:chExt cx="0" cy="0"/>
+        </a:xfrm>
+      </p:grpSpPr>
+      <p:pic>
+        <p:nvPicPr>
+          <p:cNvPr id="10244" name="Picture 4" descr="https://encrypted-tbn2.gstatic.com/images?q=tbn:ANd9GcT2Gh_KTVjfipXe8Xti7ctju__4sEauZp2v8-dEg44BIVn8flMaCw"/>
+          <p:cNvPicPr>
+            <a:picLocks noChangeAspect="1" noChangeArrowheads="1"/>
+          </p:cNvPicPr>
+          <p:nvPr/>
+        </p:nvPicPr>
+        <p:blipFill>
+          <a:blip r:embed="rId2">
+            <a:lum bright="70000" contrast="-70000"/>
+            <a:extLst>
+              <a:ext uri="{28A0092B-C50C-407E-A947-70E740481C1C}">
+                <a14:useLocalDpi xmlns:a14="http://schemas.microsoft.com/office/drawing/2010/main" val="0"/>
+              </a:ext>
+            </a:extLst>
+          </a:blip>
+          <a:srcRect/>
+          <a:stretch>
+            <a:fillRect/>
+          </a:stretch>
+        </p:blipFill>
+        <p:spPr bwMode="auto">
+          <a:xfrm>
+            <a:off x="956078" y="1844824"/>
+            <a:ext cx="7734680" cy="4263008"/>
+          </a:xfrm>
+          <a:prstGeom prst="rect">
+            <a:avLst/>
+          </a:prstGeom>
+          <a:noFill/>
+          <a:extLst>
+            <a:ext uri="{909E8E84-426E-40DD-AFC4-6F175D3DCCD1}">
+              <a14:hiddenFill xmlns:a14="http://schemas.microsoft.com/office/drawing/2010/main">
+                <a:solidFill>
+                  <a:srgbClr val="FFFFFF"/>
+                </a:solidFill>
+              </a14:hiddenFill>
+            </a:ext>
+          </a:extLst>
+        </p:spPr>
+      </p:pic>
+      <p:sp>
+        <p:nvSpPr>
+          <p:cNvPr id="2" name="1 Título"/>
+          <p:cNvSpPr>
+            <a:spLocks noGrp="1"/>
+          </p:cNvSpPr>
+          <p:nvPr>
+            <p:ph type="title"/>
+          </p:nvPr>
+        </p:nvSpPr>
+        <p:spPr/>
+        <p:txBody>
+          <a:bodyPr/>
+          <a:lstStyle/>
+          <a:p>
+            <a:r>
+              <a:rPr lang="es-PE" dirty="0" smtClean="0"/>
+              <a:t>ANÁLISIS DE RESULTADOS</a:t>
+            </a:r>
+            <a:endParaRPr lang="es-PE" dirty="0"/>
+          </a:p>
+        </p:txBody>
+      </p:sp>
+      <p:sp>
+        <p:nvSpPr>
+          <p:cNvPr id="3" name="2 Marcador de texto"/>
+          <p:cNvSpPr>
+            <a:spLocks noGrp="1"/>
+          </p:cNvSpPr>
+          <p:nvPr>
+            <p:ph type="body" idx="1"/>
+          </p:nvPr>
+        </p:nvSpPr>
+        <p:spPr/>
+        <p:txBody>
+          <a:bodyPr/>
+          <a:lstStyle/>
+          <a:p>
+            <a:r>
+              <a:rPr lang="es-PE" dirty="0" smtClean="0"/>
+              <a:t>CAPÍTULO 6</a:t>
+            </a:r>
+            <a:endParaRPr lang="es-PE" dirty="0"/>
+          </a:p>
+        </p:txBody>
+      </p:sp>
+    </p:spTree>
+    <p:extLst>
+      <p:ext uri="{BB962C8B-B14F-4D97-AF65-F5344CB8AC3E}">
+        <p14:creationId xmlns:p14="http://schemas.microsoft.com/office/powerpoint/2010/main" val="2280589442"/>
+      </p:ext>
+    </p:extLst>
+  </p:cSld>
+  <p:clrMapOvr>
+    <a:masterClrMapping/>
+  </p:clrMapOvr>
+  <p:transition spd="slow">
+    <p:cover/>
+  </p:transition>
+  <p:timing>
+    <p:tnLst>
+      <p:par>
+        <p:cTn id="1" dur="indefinite" restart="never" nodeType="tmRoot"/>
+      </p:par>
+    </p:tnLst>
+  </p:timing>
+</p:sld>
+</file>
+
+<file path=ppt/slides/slide21.xml><?xml version="1.0" encoding="utf-8"?>
 <p:sld xmlns:a="http://schemas.openxmlformats.org/drawingml/2006/main" xmlns:r="http://schemas.openxmlformats.org/officeDocument/2006/relationships" xmlns:p="http://schemas.openxmlformats.org/presentationml/2006/main">
   <p:cSld>
     <p:spTree>
@@ -11195,7 +11421,7 @@
 </p:sld>
 </file>
 
-<file path=ppt/slides/slide21.xml><?xml version="1.0" encoding="utf-8"?>
+<file path=ppt/slides/slide22.xml><?xml version="1.0" encoding="utf-8"?>
 <p:sld xmlns:a="http://schemas.openxmlformats.org/drawingml/2006/main" xmlns:r="http://schemas.openxmlformats.org/officeDocument/2006/relationships" xmlns:p="http://schemas.openxmlformats.org/presentationml/2006/main">
   <p:cSld>
     <p:spTree>
@@ -11317,7 +11543,7 @@
 </p:sld>
 </file>
 
-<file path=ppt/slides/slide22.xml><?xml version="1.0" encoding="utf-8"?>
+<file path=ppt/slides/slide23.xml><?xml version="1.0" encoding="utf-8"?>
 <p:sld xmlns:a="http://schemas.openxmlformats.org/drawingml/2006/main" xmlns:r="http://schemas.openxmlformats.org/officeDocument/2006/relationships" xmlns:p="http://schemas.openxmlformats.org/presentationml/2006/main">
   <p:cSld>
     <p:spTree>
@@ -11435,7 +11661,7 @@
 </p:sld>
 </file>
 
-<file path=ppt/slides/slide23.xml><?xml version="1.0" encoding="utf-8"?>
+<file path=ppt/slides/slide24.xml><?xml version="1.0" encoding="utf-8"?>
 <p:sld xmlns:a="http://schemas.openxmlformats.org/drawingml/2006/main" xmlns:r="http://schemas.openxmlformats.org/officeDocument/2006/relationships" xmlns:p="http://schemas.openxmlformats.org/presentationml/2006/main">
   <p:cSld>
     <p:spTree>
@@ -11569,7 +11795,7 @@
 </p:sld>
 </file>
 
-<file path=ppt/slides/slide24.xml><?xml version="1.0" encoding="utf-8"?>
+<file path=ppt/slides/slide25.xml><?xml version="1.0" encoding="utf-8"?>
 <p:sld xmlns:a="http://schemas.openxmlformats.org/drawingml/2006/main" xmlns:r="http://schemas.openxmlformats.org/officeDocument/2006/relationships" xmlns:p="http://schemas.openxmlformats.org/presentationml/2006/main">
   <p:cSld>
     <p:spTree>
@@ -11798,131 +12024,6 @@
     <p:extLst>
       <p:ext uri="{BB962C8B-B14F-4D97-AF65-F5344CB8AC3E}">
         <p14:creationId xmlns:p14="http://schemas.microsoft.com/office/powerpoint/2010/main" val="1715929023"/>
-      </p:ext>
-    </p:extLst>
-  </p:cSld>
-  <p:clrMapOvr>
-    <a:masterClrMapping/>
-  </p:clrMapOvr>
-  <p:transition spd="slow">
-    <p:cover/>
-  </p:transition>
-  <p:timing>
-    <p:tnLst>
-      <p:par>
-        <p:cTn id="1" dur="indefinite" restart="never" nodeType="tmRoot"/>
-      </p:par>
-    </p:tnLst>
-  </p:timing>
-</p:sld>
-</file>
-
-<file path=ppt/slides/slide25.xml><?xml version="1.0" encoding="utf-8"?>
-<p:sld xmlns:a="http://schemas.openxmlformats.org/drawingml/2006/main" xmlns:r="http://schemas.openxmlformats.org/officeDocument/2006/relationships" xmlns:p="http://schemas.openxmlformats.org/presentationml/2006/main">
-  <p:cSld>
-    <p:spTree>
-      <p:nvGrpSpPr>
-        <p:cNvPr id="1" name=""/>
-        <p:cNvGrpSpPr/>
-        <p:nvPr/>
-      </p:nvGrpSpPr>
-      <p:grpSpPr>
-        <a:xfrm>
-          <a:off x="0" y="0"/>
-          <a:ext cx="0" cy="0"/>
-          <a:chOff x="0" y="0"/>
-          <a:chExt cx="0" cy="0"/>
-        </a:xfrm>
-      </p:grpSpPr>
-      <p:sp>
-        <p:nvSpPr>
-          <p:cNvPr id="2" name="1 Título"/>
-          <p:cNvSpPr>
-            <a:spLocks noGrp="1"/>
-          </p:cNvSpPr>
-          <p:nvPr>
-            <p:ph type="title"/>
-          </p:nvPr>
-        </p:nvSpPr>
-        <p:spPr/>
-        <p:txBody>
-          <a:bodyPr/>
-          <a:lstStyle/>
-          <a:p>
-            <a:r>
-              <a:rPr lang="es-PE" dirty="0" smtClean="0"/>
-              <a:t>Trabajos futuros</a:t>
-            </a:r>
-            <a:endParaRPr lang="es-PE" dirty="0"/>
-          </a:p>
-        </p:txBody>
-      </p:sp>
-      <p:sp>
-        <p:nvSpPr>
-          <p:cNvPr id="3" name="2 Marcador de contenido"/>
-          <p:cNvSpPr>
-            <a:spLocks noGrp="1"/>
-          </p:cNvSpPr>
-          <p:nvPr>
-            <p:ph idx="1"/>
-          </p:nvPr>
-        </p:nvSpPr>
-        <p:spPr/>
-        <p:txBody>
-          <a:bodyPr/>
-          <a:lstStyle/>
-          <a:p>
-            <a:pPr algn="just"/>
-            <a:r>
-              <a:rPr lang="es-PE" dirty="0" smtClean="0"/>
-              <a:t>Agregar al Sistema </a:t>
-            </a:r>
-            <a:r>
-              <a:rPr lang="es-PE" dirty="0" err="1" smtClean="0"/>
-              <a:t>Jigsaw</a:t>
-            </a:r>
-            <a:r>
-              <a:rPr lang="es-PE" dirty="0" smtClean="0"/>
-              <a:t> </a:t>
-            </a:r>
-            <a:r>
-              <a:rPr lang="es-PE" dirty="0" err="1" smtClean="0"/>
-              <a:t>Coding</a:t>
-            </a:r>
-            <a:r>
-              <a:rPr lang="es-PE" dirty="0" smtClean="0"/>
-              <a:t> la funcionalidad de poder realizar conversaciones vía un chat de audio.</a:t>
-            </a:r>
-          </a:p>
-          <a:p>
-            <a:pPr algn="just"/>
-            <a:r>
-              <a:rPr lang="es-PE" dirty="0" smtClean="0"/>
-              <a:t>Clasificar los problemas según el tipo de tema y que el examen se genere aleatoriamente.</a:t>
-            </a:r>
-          </a:p>
-          <a:p>
-            <a:pPr algn="just"/>
-            <a:r>
-              <a:rPr lang="es-PE" dirty="0"/>
-              <a:t>Aplicar a los alumnos un test para determinar su estilo de aprendizaje y generar los grupos expertos y grupos </a:t>
-            </a:r>
-            <a:r>
-              <a:rPr lang="es-PE" dirty="0" err="1"/>
-              <a:t>jigsaw</a:t>
-            </a:r>
-            <a:r>
-              <a:rPr lang="es-PE" dirty="0"/>
-              <a:t> según dichos estilos.</a:t>
-            </a:r>
-            <a:endParaRPr lang="es-PE" dirty="0" smtClean="0"/>
-          </a:p>
-        </p:txBody>
-      </p:sp>
-    </p:spTree>
-    <p:extLst>
-      <p:ext uri="{BB962C8B-B14F-4D97-AF65-F5344CB8AC3E}">
-        <p14:creationId xmlns:p14="http://schemas.microsoft.com/office/powerpoint/2010/main" val="3647549674"/>
       </p:ext>
     </p:extLst>
   </p:cSld>
@@ -11969,6 +12070,131 @@
             <p:ph type="title"/>
           </p:nvPr>
         </p:nvSpPr>
+        <p:spPr/>
+        <p:txBody>
+          <a:bodyPr/>
+          <a:lstStyle/>
+          <a:p>
+            <a:r>
+              <a:rPr lang="es-PE" dirty="0" smtClean="0"/>
+              <a:t>Trabajos futuros</a:t>
+            </a:r>
+            <a:endParaRPr lang="es-PE" dirty="0"/>
+          </a:p>
+        </p:txBody>
+      </p:sp>
+      <p:sp>
+        <p:nvSpPr>
+          <p:cNvPr id="3" name="2 Marcador de contenido"/>
+          <p:cNvSpPr>
+            <a:spLocks noGrp="1"/>
+          </p:cNvSpPr>
+          <p:nvPr>
+            <p:ph idx="1"/>
+          </p:nvPr>
+        </p:nvSpPr>
+        <p:spPr/>
+        <p:txBody>
+          <a:bodyPr/>
+          <a:lstStyle/>
+          <a:p>
+            <a:pPr algn="just"/>
+            <a:r>
+              <a:rPr lang="es-PE" dirty="0" smtClean="0"/>
+              <a:t>Agregar al Sistema </a:t>
+            </a:r>
+            <a:r>
+              <a:rPr lang="es-PE" dirty="0" err="1" smtClean="0"/>
+              <a:t>Jigsaw</a:t>
+            </a:r>
+            <a:r>
+              <a:rPr lang="es-PE" dirty="0" smtClean="0"/>
+              <a:t> </a:t>
+            </a:r>
+            <a:r>
+              <a:rPr lang="es-PE" dirty="0" err="1" smtClean="0"/>
+              <a:t>Coding</a:t>
+            </a:r>
+            <a:r>
+              <a:rPr lang="es-PE" dirty="0" smtClean="0"/>
+              <a:t> la funcionalidad de poder realizar conversaciones vía un chat de audio.</a:t>
+            </a:r>
+          </a:p>
+          <a:p>
+            <a:pPr algn="just"/>
+            <a:r>
+              <a:rPr lang="es-PE" dirty="0" smtClean="0"/>
+              <a:t>Clasificar los problemas según el tipo de tema y que el examen se genere aleatoriamente.</a:t>
+            </a:r>
+          </a:p>
+          <a:p>
+            <a:pPr algn="just"/>
+            <a:r>
+              <a:rPr lang="es-PE" dirty="0"/>
+              <a:t>Aplicar a los alumnos un test para determinar su estilo de aprendizaje y generar los grupos expertos y grupos </a:t>
+            </a:r>
+            <a:r>
+              <a:rPr lang="es-PE" dirty="0" err="1"/>
+              <a:t>jigsaw</a:t>
+            </a:r>
+            <a:r>
+              <a:rPr lang="es-PE" dirty="0"/>
+              <a:t> según dichos estilos.</a:t>
+            </a:r>
+            <a:endParaRPr lang="es-PE" dirty="0" smtClean="0"/>
+          </a:p>
+        </p:txBody>
+      </p:sp>
+    </p:spTree>
+    <p:extLst>
+      <p:ext uri="{BB962C8B-B14F-4D97-AF65-F5344CB8AC3E}">
+        <p14:creationId xmlns:p14="http://schemas.microsoft.com/office/powerpoint/2010/main" val="3647549674"/>
+      </p:ext>
+    </p:extLst>
+  </p:cSld>
+  <p:clrMapOvr>
+    <a:masterClrMapping/>
+  </p:clrMapOvr>
+  <p:transition spd="slow">
+    <p:cover/>
+  </p:transition>
+  <p:timing>
+    <p:tnLst>
+      <p:par>
+        <p:cTn id="1" dur="indefinite" restart="never" nodeType="tmRoot"/>
+      </p:par>
+    </p:tnLst>
+  </p:timing>
+</p:sld>
+</file>
+
+<file path=ppt/slides/slide27.xml><?xml version="1.0" encoding="utf-8"?>
+<p:sld xmlns:a="http://schemas.openxmlformats.org/drawingml/2006/main" xmlns:r="http://schemas.openxmlformats.org/officeDocument/2006/relationships" xmlns:p="http://schemas.openxmlformats.org/presentationml/2006/main">
+  <p:cSld>
+    <p:spTree>
+      <p:nvGrpSpPr>
+        <p:cNvPr id="1" name=""/>
+        <p:cNvGrpSpPr/>
+        <p:nvPr/>
+      </p:nvGrpSpPr>
+      <p:grpSpPr>
+        <a:xfrm>
+          <a:off x="0" y="0"/>
+          <a:ext cx="0" cy="0"/>
+          <a:chOff x="0" y="0"/>
+          <a:chExt cx="0" cy="0"/>
+        </a:xfrm>
+      </p:grpSpPr>
+      <p:sp>
+        <p:nvSpPr>
+          <p:cNvPr id="2" name="1 Título"/>
+          <p:cNvSpPr>
+            <a:spLocks noGrp="1"/>
+          </p:cNvSpPr>
+          <p:nvPr>
+            <p:ph type="title"/>
+          </p:nvPr>
+        </p:nvSpPr>
         <p:spPr>
           <a:xfrm>
             <a:off x="551280" y="476672"/>
@@ -12475,7 +12701,7 @@
 </p:sld>
 </file>
 
-<file path=ppt/slides/slide27.xml><?xml version="1.0" encoding="utf-8"?>
+<file path=ppt/slides/slide28.xml><?xml version="1.0" encoding="utf-8"?>
 <p:sld xmlns:a="http://schemas.openxmlformats.org/drawingml/2006/main" xmlns:r="http://schemas.openxmlformats.org/officeDocument/2006/relationships" xmlns:p="http://schemas.openxmlformats.org/presentationml/2006/main">
   <p:cSld>
     <p:spTree>

</xml_diff>